<commit_message>
Update final PowerPoint presentation
</commit_message>
<xml_diff>
--- a/Project.pptx
+++ b/Project.pptx
@@ -7,21 +7,23 @@
   <p:sldIdLst>
     <p:sldId id="256" r:id="rId2"/>
     <p:sldId id="257" r:id="rId3"/>
-    <p:sldId id="259" r:id="rId4"/>
-    <p:sldId id="261" r:id="rId5"/>
-    <p:sldId id="271" r:id="rId6"/>
-    <p:sldId id="260" r:id="rId7"/>
-    <p:sldId id="262" r:id="rId8"/>
-    <p:sldId id="263" r:id="rId9"/>
-    <p:sldId id="264" r:id="rId10"/>
-    <p:sldId id="265" r:id="rId11"/>
-    <p:sldId id="266" r:id="rId12"/>
-    <p:sldId id="267" r:id="rId13"/>
-    <p:sldId id="268" r:id="rId14"/>
-    <p:sldId id="269" r:id="rId15"/>
-    <p:sldId id="270" r:id="rId16"/>
-    <p:sldId id="272" r:id="rId17"/>
-    <p:sldId id="273" r:id="rId18"/>
+    <p:sldId id="274" r:id="rId4"/>
+    <p:sldId id="275" r:id="rId5"/>
+    <p:sldId id="259" r:id="rId6"/>
+    <p:sldId id="261" r:id="rId7"/>
+    <p:sldId id="271" r:id="rId8"/>
+    <p:sldId id="260" r:id="rId9"/>
+    <p:sldId id="262" r:id="rId10"/>
+    <p:sldId id="263" r:id="rId11"/>
+    <p:sldId id="264" r:id="rId12"/>
+    <p:sldId id="265" r:id="rId13"/>
+    <p:sldId id="266" r:id="rId14"/>
+    <p:sldId id="267" r:id="rId15"/>
+    <p:sldId id="268" r:id="rId16"/>
+    <p:sldId id="269" r:id="rId17"/>
+    <p:sldId id="270" r:id="rId18"/>
+    <p:sldId id="272" r:id="rId19"/>
+    <p:sldId id="273" r:id="rId20"/>
   </p:sldIdLst>
   <p:sldSz cx="12192000" cy="6858000"/>
   <p:notesSz cx="6858000" cy="9144000"/>
@@ -4595,6 +4597,524 @@
           <p:cNvPr id="2" name="Title 1">
             <a:extLst>
               <a:ext uri="{FF2B5EF4-FFF2-40B4-BE49-F238E27FC236}">
+                <a16:creationId xmlns:a16="http://schemas.microsoft.com/office/drawing/2014/main" id="{44CF171D-2B56-4ED9-151A-7775F4853279}"/>
+              </a:ext>
+            </a:extLst>
+          </p:cNvPr>
+          <p:cNvSpPr>
+            <a:spLocks noGrp="1"/>
+          </p:cNvSpPr>
+          <p:nvPr>
+            <p:ph type="title"/>
+          </p:nvPr>
+        </p:nvSpPr>
+        <p:spPr>
+          <a:xfrm>
+            <a:off x="609600" y="173320"/>
+            <a:ext cx="10972800" cy="844989"/>
+          </a:xfrm>
+        </p:spPr>
+        <p:txBody>
+          <a:bodyPr/>
+          <a:lstStyle/>
+          <a:p>
+            <a:pPr algn="ctr"/>
+            <a:r>
+              <a:rPr lang="en-US" dirty="0"/>
+              <a:t>Peak Season Analysis (2019 vs 2020)</a:t>
+            </a:r>
+          </a:p>
+        </p:txBody>
+      </p:sp>
+      <p:grpSp>
+        <p:nvGrpSpPr>
+          <p:cNvPr id="28" name="Group 27">
+            <a:extLst>
+              <a:ext uri="{FF2B5EF4-FFF2-40B4-BE49-F238E27FC236}">
+                <a16:creationId xmlns:a16="http://schemas.microsoft.com/office/drawing/2014/main" id="{A4AA3BA3-9499-73CA-987F-E0911B2B66C0}"/>
+              </a:ext>
+            </a:extLst>
+          </p:cNvPr>
+          <p:cNvGrpSpPr/>
+          <p:nvPr/>
+        </p:nvGrpSpPr>
+        <p:grpSpPr>
+          <a:xfrm>
+            <a:off x="431440" y="1018309"/>
+            <a:ext cx="11495376" cy="5839691"/>
+            <a:chOff x="265185" y="928117"/>
+            <a:chExt cx="11495376" cy="5929883"/>
+          </a:xfrm>
+        </p:grpSpPr>
+        <p:pic>
+          <p:nvPicPr>
+            <p:cNvPr id="26" name="Picture 25">
+              <a:extLst>
+                <a:ext uri="{FF2B5EF4-FFF2-40B4-BE49-F238E27FC236}">
+                  <a16:creationId xmlns:a16="http://schemas.microsoft.com/office/drawing/2014/main" id="{DEBB884E-886A-074B-B9D5-796C5FEB7A45}"/>
+                </a:ext>
+              </a:extLst>
+            </p:cNvPr>
+            <p:cNvPicPr>
+              <a:picLocks noChangeAspect="1"/>
+            </p:cNvPicPr>
+            <p:nvPr/>
+          </p:nvPicPr>
+          <p:blipFill>
+            <a:blip r:embed="rId2"/>
+            <a:stretch>
+              <a:fillRect/>
+            </a:stretch>
+          </p:blipFill>
+          <p:spPr>
+            <a:xfrm>
+              <a:off x="265185" y="928117"/>
+              <a:ext cx="11495376" cy="5839691"/>
+            </a:xfrm>
+            <a:prstGeom prst="rect">
+              <a:avLst/>
+            </a:prstGeom>
+          </p:spPr>
+        </p:pic>
+        <p:pic>
+          <p:nvPicPr>
+            <p:cNvPr id="16" name="Picture 15">
+              <a:extLst>
+                <a:ext uri="{FF2B5EF4-FFF2-40B4-BE49-F238E27FC236}">
+                  <a16:creationId xmlns:a16="http://schemas.microsoft.com/office/drawing/2014/main" id="{8B344489-F898-A33F-CECF-C21735A8005B}"/>
+                </a:ext>
+              </a:extLst>
+            </p:cNvPr>
+            <p:cNvPicPr>
+              <a:picLocks noChangeAspect="1"/>
+            </p:cNvPicPr>
+            <p:nvPr/>
+          </p:nvPicPr>
+          <p:blipFill>
+            <a:blip r:embed="rId3"/>
+            <a:stretch>
+              <a:fillRect/>
+            </a:stretch>
+          </p:blipFill>
+          <p:spPr>
+            <a:xfrm>
+              <a:off x="6729846" y="5638938"/>
+              <a:ext cx="3143250" cy="1219062"/>
+            </a:xfrm>
+            <a:prstGeom prst="rect">
+              <a:avLst/>
+            </a:prstGeom>
+          </p:spPr>
+        </p:pic>
+      </p:grpSp>
+    </p:spTree>
+    <p:extLst>
+      <p:ext uri="{BB962C8B-B14F-4D97-AF65-F5344CB8AC3E}">
+        <p14:creationId xmlns:p14="http://schemas.microsoft.com/office/powerpoint/2010/main" val="3306896646"/>
+      </p:ext>
+    </p:extLst>
+  </p:cSld>
+  <p:clrMapOvr>
+    <a:masterClrMapping/>
+  </p:clrMapOvr>
+  <p:timing>
+    <p:tnLst>
+      <p:par>
+        <p:cTn id="1" dur="indefinite" restart="never" nodeType="tmRoot">
+          <p:childTnLst>
+            <p:seq concurrent="1" nextAc="seek">
+              <p:cTn id="2" dur="indefinite" nodeType="mainSeq">
+                <p:childTnLst>
+                  <p:par>
+                    <p:cTn id="3" fill="hold">
+                      <p:stCondLst>
+                        <p:cond delay="indefinite"/>
+                      </p:stCondLst>
+                      <p:childTnLst>
+                        <p:par>
+                          <p:cTn id="4" fill="hold">
+                            <p:stCondLst>
+                              <p:cond delay="0"/>
+                            </p:stCondLst>
+                            <p:childTnLst>
+                              <p:par>
+                                <p:cTn id="5" presetID="16" presetClass="entr" presetSubtype="21" fill="hold" grpId="0" nodeType="clickEffect">
+                                  <p:stCondLst>
+                                    <p:cond delay="0"/>
+                                  </p:stCondLst>
+                                  <p:childTnLst>
+                                    <p:set>
+                                      <p:cBhvr>
+                                        <p:cTn id="6" dur="1" fill="hold">
+                                          <p:stCondLst>
+                                            <p:cond delay="0"/>
+                                          </p:stCondLst>
+                                        </p:cTn>
+                                        <p:tgtEl>
+                                          <p:spTgt spid="2"/>
+                                        </p:tgtEl>
+                                        <p:attrNameLst>
+                                          <p:attrName>style.visibility</p:attrName>
+                                        </p:attrNameLst>
+                                      </p:cBhvr>
+                                      <p:to>
+                                        <p:strVal val="visible"/>
+                                      </p:to>
+                                    </p:set>
+                                    <p:animEffect transition="in" filter="barn(inVertical)">
+                                      <p:cBhvr>
+                                        <p:cTn id="7" dur="500"/>
+                                        <p:tgtEl>
+                                          <p:spTgt spid="2"/>
+                                        </p:tgtEl>
+                                      </p:cBhvr>
+                                    </p:animEffect>
+                                  </p:childTnLst>
+                                </p:cTn>
+                              </p:par>
+                            </p:childTnLst>
+                          </p:cTn>
+                        </p:par>
+                      </p:childTnLst>
+                    </p:cTn>
+                  </p:par>
+                  <p:par>
+                    <p:cTn id="8" fill="hold">
+                      <p:stCondLst>
+                        <p:cond delay="indefinite"/>
+                      </p:stCondLst>
+                      <p:childTnLst>
+                        <p:par>
+                          <p:cTn id="9" fill="hold">
+                            <p:stCondLst>
+                              <p:cond delay="0"/>
+                            </p:stCondLst>
+                            <p:childTnLst>
+                              <p:par>
+                                <p:cTn id="10" presetID="10" presetClass="entr" presetSubtype="0" fill="hold" nodeType="clickEffect">
+                                  <p:stCondLst>
+                                    <p:cond delay="0"/>
+                                  </p:stCondLst>
+                                  <p:childTnLst>
+                                    <p:set>
+                                      <p:cBhvr>
+                                        <p:cTn id="11" dur="1" fill="hold">
+                                          <p:stCondLst>
+                                            <p:cond delay="0"/>
+                                          </p:stCondLst>
+                                        </p:cTn>
+                                        <p:tgtEl>
+                                          <p:spTgt spid="28"/>
+                                        </p:tgtEl>
+                                        <p:attrNameLst>
+                                          <p:attrName>style.visibility</p:attrName>
+                                        </p:attrNameLst>
+                                      </p:cBhvr>
+                                      <p:to>
+                                        <p:strVal val="visible"/>
+                                      </p:to>
+                                    </p:set>
+                                    <p:animEffect transition="in" filter="fade">
+                                      <p:cBhvr>
+                                        <p:cTn id="12" dur="500"/>
+                                        <p:tgtEl>
+                                          <p:spTgt spid="28"/>
+                                        </p:tgtEl>
+                                      </p:cBhvr>
+                                    </p:animEffect>
+                                  </p:childTnLst>
+                                </p:cTn>
+                              </p:par>
+                            </p:childTnLst>
+                          </p:cTn>
+                        </p:par>
+                      </p:childTnLst>
+                    </p:cTn>
+                  </p:par>
+                </p:childTnLst>
+              </p:cTn>
+              <p:prevCondLst>
+                <p:cond evt="onPrev" delay="0">
+                  <p:tgtEl>
+                    <p:sldTgt/>
+                  </p:tgtEl>
+                </p:cond>
+              </p:prevCondLst>
+              <p:nextCondLst>
+                <p:cond evt="onNext" delay="0">
+                  <p:tgtEl>
+                    <p:sldTgt/>
+                  </p:tgtEl>
+                </p:cond>
+              </p:nextCondLst>
+            </p:seq>
+          </p:childTnLst>
+        </p:cTn>
+      </p:par>
+    </p:tnLst>
+    <p:bldLst>
+      <p:bldP spid="2" grpId="0"/>
+    </p:bldLst>
+  </p:timing>
+</p:sld>
+</file>
+
+<file path=ppt/slides/slide11.xml><?xml version="1.0" encoding="utf-8"?>
+<p:sld xmlns:a="http://schemas.openxmlformats.org/drawingml/2006/main" xmlns:r="http://schemas.openxmlformats.org/officeDocument/2006/relationships" xmlns:p="http://schemas.openxmlformats.org/presentationml/2006/main">
+  <p:cSld>
+    <p:spTree>
+      <p:nvGrpSpPr>
+        <p:cNvPr id="1" name=""/>
+        <p:cNvGrpSpPr/>
+        <p:nvPr/>
+      </p:nvGrpSpPr>
+      <p:grpSpPr>
+        <a:xfrm>
+          <a:off x="0" y="0"/>
+          <a:ext cx="0" cy="0"/>
+          <a:chOff x="0" y="0"/>
+          <a:chExt cx="0" cy="0"/>
+        </a:xfrm>
+      </p:grpSpPr>
+      <p:sp>
+        <p:nvSpPr>
+          <p:cNvPr id="2" name="Title 1">
+            <a:extLst>
+              <a:ext uri="{FF2B5EF4-FFF2-40B4-BE49-F238E27FC236}">
+                <a16:creationId xmlns:a16="http://schemas.microsoft.com/office/drawing/2014/main" id="{F588A945-E1A5-C740-0749-7206BB505B89}"/>
+              </a:ext>
+            </a:extLst>
+          </p:cNvPr>
+          <p:cNvSpPr>
+            <a:spLocks noGrp="1"/>
+          </p:cNvSpPr>
+          <p:nvPr>
+            <p:ph type="title"/>
+          </p:nvPr>
+        </p:nvSpPr>
+        <p:spPr>
+          <a:xfrm>
+            <a:off x="609600" y="557784"/>
+            <a:ext cx="10972800" cy="1094371"/>
+          </a:xfrm>
+        </p:spPr>
+        <p:txBody>
+          <a:bodyPr>
+            <a:normAutofit fontScale="90000"/>
+          </a:bodyPr>
+          <a:lstStyle/>
+          <a:p>
+            <a:r>
+              <a:rPr lang="en-US" dirty="0"/>
+              <a:t>Peak Season Analysis (Pre-COVID and COVID Observation Period )</a:t>
+            </a:r>
+          </a:p>
+        </p:txBody>
+      </p:sp>
+      <p:pic>
+        <p:nvPicPr>
+          <p:cNvPr id="5" name="Picture 4">
+            <a:extLst>
+              <a:ext uri="{FF2B5EF4-FFF2-40B4-BE49-F238E27FC236}">
+                <a16:creationId xmlns:a16="http://schemas.microsoft.com/office/drawing/2014/main" id="{0A3A4FBF-BF19-CEEA-5C3A-EC711C3957F2}"/>
+              </a:ext>
+            </a:extLst>
+          </p:cNvPr>
+          <p:cNvPicPr>
+            <a:picLocks noChangeAspect="1"/>
+          </p:cNvPicPr>
+          <p:nvPr/>
+        </p:nvPicPr>
+        <p:blipFill>
+          <a:blip r:embed="rId2"/>
+          <a:stretch>
+            <a:fillRect/>
+          </a:stretch>
+        </p:blipFill>
+        <p:spPr>
+          <a:xfrm>
+            <a:off x="249382" y="1652154"/>
+            <a:ext cx="11565082" cy="5205845"/>
+          </a:xfrm>
+          <a:prstGeom prst="rect">
+            <a:avLst/>
+          </a:prstGeom>
+        </p:spPr>
+      </p:pic>
+    </p:spTree>
+    <p:extLst>
+      <p:ext uri="{BB962C8B-B14F-4D97-AF65-F5344CB8AC3E}">
+        <p14:creationId xmlns:p14="http://schemas.microsoft.com/office/powerpoint/2010/main" val="524735799"/>
+      </p:ext>
+    </p:extLst>
+  </p:cSld>
+  <p:clrMapOvr>
+    <a:masterClrMapping/>
+  </p:clrMapOvr>
+  <p:timing>
+    <p:tnLst>
+      <p:par>
+        <p:cTn id="1" dur="indefinite" restart="never" nodeType="tmRoot">
+          <p:childTnLst>
+            <p:seq concurrent="1" nextAc="seek">
+              <p:cTn id="2" dur="indefinite" nodeType="mainSeq">
+                <p:childTnLst>
+                  <p:par>
+                    <p:cTn id="3" fill="hold">
+                      <p:stCondLst>
+                        <p:cond delay="indefinite"/>
+                      </p:stCondLst>
+                      <p:childTnLst>
+                        <p:par>
+                          <p:cTn id="4" fill="hold">
+                            <p:stCondLst>
+                              <p:cond delay="0"/>
+                            </p:stCondLst>
+                            <p:childTnLst>
+                              <p:par>
+                                <p:cTn id="5" presetID="16" presetClass="entr" presetSubtype="21" fill="hold" grpId="0" nodeType="clickEffect">
+                                  <p:stCondLst>
+                                    <p:cond delay="0"/>
+                                  </p:stCondLst>
+                                  <p:childTnLst>
+                                    <p:set>
+                                      <p:cBhvr>
+                                        <p:cTn id="6" dur="1" fill="hold">
+                                          <p:stCondLst>
+                                            <p:cond delay="0"/>
+                                          </p:stCondLst>
+                                        </p:cTn>
+                                        <p:tgtEl>
+                                          <p:spTgt spid="2"/>
+                                        </p:tgtEl>
+                                        <p:attrNameLst>
+                                          <p:attrName>style.visibility</p:attrName>
+                                        </p:attrNameLst>
+                                      </p:cBhvr>
+                                      <p:to>
+                                        <p:strVal val="visible"/>
+                                      </p:to>
+                                    </p:set>
+                                    <p:animEffect transition="in" filter="barn(inVertical)">
+                                      <p:cBhvr>
+                                        <p:cTn id="7" dur="500"/>
+                                        <p:tgtEl>
+                                          <p:spTgt spid="2"/>
+                                        </p:tgtEl>
+                                      </p:cBhvr>
+                                    </p:animEffect>
+                                  </p:childTnLst>
+                                </p:cTn>
+                              </p:par>
+                            </p:childTnLst>
+                          </p:cTn>
+                        </p:par>
+                      </p:childTnLst>
+                    </p:cTn>
+                  </p:par>
+                  <p:par>
+                    <p:cTn id="8" fill="hold">
+                      <p:stCondLst>
+                        <p:cond delay="indefinite"/>
+                      </p:stCondLst>
+                      <p:childTnLst>
+                        <p:par>
+                          <p:cTn id="9" fill="hold">
+                            <p:stCondLst>
+                              <p:cond delay="0"/>
+                            </p:stCondLst>
+                            <p:childTnLst>
+                              <p:par>
+                                <p:cTn id="10" presetID="10" presetClass="entr" presetSubtype="0" fill="hold" nodeType="clickEffect">
+                                  <p:stCondLst>
+                                    <p:cond delay="0"/>
+                                  </p:stCondLst>
+                                  <p:childTnLst>
+                                    <p:set>
+                                      <p:cBhvr>
+                                        <p:cTn id="11" dur="1" fill="hold">
+                                          <p:stCondLst>
+                                            <p:cond delay="0"/>
+                                          </p:stCondLst>
+                                        </p:cTn>
+                                        <p:tgtEl>
+                                          <p:spTgt spid="5"/>
+                                        </p:tgtEl>
+                                        <p:attrNameLst>
+                                          <p:attrName>style.visibility</p:attrName>
+                                        </p:attrNameLst>
+                                      </p:cBhvr>
+                                      <p:to>
+                                        <p:strVal val="visible"/>
+                                      </p:to>
+                                    </p:set>
+                                    <p:animEffect transition="in" filter="fade">
+                                      <p:cBhvr>
+                                        <p:cTn id="12" dur="500"/>
+                                        <p:tgtEl>
+                                          <p:spTgt spid="5"/>
+                                        </p:tgtEl>
+                                      </p:cBhvr>
+                                    </p:animEffect>
+                                  </p:childTnLst>
+                                </p:cTn>
+                              </p:par>
+                            </p:childTnLst>
+                          </p:cTn>
+                        </p:par>
+                      </p:childTnLst>
+                    </p:cTn>
+                  </p:par>
+                </p:childTnLst>
+              </p:cTn>
+              <p:prevCondLst>
+                <p:cond evt="onPrev" delay="0">
+                  <p:tgtEl>
+                    <p:sldTgt/>
+                  </p:tgtEl>
+                </p:cond>
+              </p:prevCondLst>
+              <p:nextCondLst>
+                <p:cond evt="onNext" delay="0">
+                  <p:tgtEl>
+                    <p:sldTgt/>
+                  </p:tgtEl>
+                </p:cond>
+              </p:nextCondLst>
+            </p:seq>
+          </p:childTnLst>
+        </p:cTn>
+      </p:par>
+    </p:tnLst>
+    <p:bldLst>
+      <p:bldP spid="2" grpId="0"/>
+    </p:bldLst>
+  </p:timing>
+</p:sld>
+</file>
+
+<file path=ppt/slides/slide12.xml><?xml version="1.0" encoding="utf-8"?>
+<p:sld xmlns:a="http://schemas.openxmlformats.org/drawingml/2006/main" xmlns:r="http://schemas.openxmlformats.org/officeDocument/2006/relationships" xmlns:p="http://schemas.openxmlformats.org/presentationml/2006/main">
+  <p:cSld>
+    <p:spTree>
+      <p:nvGrpSpPr>
+        <p:cNvPr id="1" name=""/>
+        <p:cNvGrpSpPr/>
+        <p:nvPr/>
+      </p:nvGrpSpPr>
+      <p:grpSpPr>
+        <a:xfrm>
+          <a:off x="0" y="0"/>
+          <a:ext cx="0" cy="0"/>
+          <a:chOff x="0" y="0"/>
+          <a:chExt cx="0" cy="0"/>
+        </a:xfrm>
+      </p:grpSpPr>
+      <p:sp>
+        <p:nvSpPr>
+          <p:cNvPr id="2" name="Title 1">
+            <a:extLst>
+              <a:ext uri="{FF2B5EF4-FFF2-40B4-BE49-F238E27FC236}">
                 <a16:creationId xmlns:a16="http://schemas.microsoft.com/office/drawing/2014/main" id="{F13E0346-52B1-DF36-E0FB-015BB0BC147A}"/>
               </a:ext>
             </a:extLst>
@@ -4767,7 +5287,7 @@
 </p:sld>
 </file>
 
-<file path=ppt/slides/slide11.xml><?xml version="1.0" encoding="utf-8"?>
+<file path=ppt/slides/slide13.xml><?xml version="1.0" encoding="utf-8"?>
 <p:sld xmlns:a="http://schemas.openxmlformats.org/drawingml/2006/main" xmlns:r="http://schemas.openxmlformats.org/officeDocument/2006/relationships" xmlns:p="http://schemas.openxmlformats.org/presentationml/2006/main">
   <p:cSld>
     <p:spTree>
@@ -5149,7 +5669,7 @@
 </p:sld>
 </file>
 
-<file path=ppt/slides/slide12.xml><?xml version="1.0" encoding="utf-8"?>
+<file path=ppt/slides/slide14.xml><?xml version="1.0" encoding="utf-8"?>
 <p:sld xmlns:a="http://schemas.openxmlformats.org/drawingml/2006/main" xmlns:r="http://schemas.openxmlformats.org/officeDocument/2006/relationships" xmlns:p="http://schemas.openxmlformats.org/presentationml/2006/main">
   <p:cSld>
     <p:spTree>
@@ -5410,7 +5930,7 @@
 </p:sld>
 </file>
 
-<file path=ppt/slides/slide13.xml><?xml version="1.0" encoding="utf-8"?>
+<file path=ppt/slides/slide15.xml><?xml version="1.0" encoding="utf-8"?>
 <p:sld xmlns:a="http://schemas.openxmlformats.org/drawingml/2006/main" xmlns:r="http://schemas.openxmlformats.org/officeDocument/2006/relationships" xmlns:p="http://schemas.openxmlformats.org/presentationml/2006/main">
   <p:cSld>
     <p:spTree>
@@ -6018,7 +6538,7 @@
 </p:sld>
 </file>
 
-<file path=ppt/slides/slide14.xml><?xml version="1.0" encoding="utf-8"?>
+<file path=ppt/slides/slide16.xml><?xml version="1.0" encoding="utf-8"?>
 <p:sld xmlns:a="http://schemas.openxmlformats.org/drawingml/2006/main" xmlns:r="http://schemas.openxmlformats.org/officeDocument/2006/relationships" xmlns:p="http://schemas.openxmlformats.org/presentationml/2006/main">
   <p:cSld>
     <p:spTree>
@@ -6113,7 +6633,7 @@
 </p:sld>
 </file>
 
-<file path=ppt/slides/slide15.xml><?xml version="1.0" encoding="utf-8"?>
+<file path=ppt/slides/slide17.xml><?xml version="1.0" encoding="utf-8"?>
 <p:sld xmlns:a="http://schemas.openxmlformats.org/drawingml/2006/main" xmlns:r="http://schemas.openxmlformats.org/officeDocument/2006/relationships" xmlns:p="http://schemas.openxmlformats.org/presentationml/2006/main">
   <p:cSld>
     <p:spTree>
@@ -7272,7 +7792,7 @@
 </p:sld>
 </file>
 
-<file path=ppt/slides/slide16.xml><?xml version="1.0" encoding="utf-8"?>
+<file path=ppt/slides/slide18.xml><?xml version="1.0" encoding="utf-8"?>
 <p:sld xmlns:a="http://schemas.openxmlformats.org/drawingml/2006/main" xmlns:r="http://schemas.openxmlformats.org/officeDocument/2006/relationships" xmlns:p="http://schemas.openxmlformats.org/presentationml/2006/main">
   <p:cSld>
     <p:spTree>
@@ -7658,7 +8178,7 @@
 </p:sld>
 </file>
 
-<file path=ppt/slides/slide17.xml><?xml version="1.0" encoding="utf-8"?>
+<file path=ppt/slides/slide19.xml><?xml version="1.0" encoding="utf-8"?>
 <p:sld xmlns:a="http://schemas.openxmlformats.org/drawingml/2006/main" xmlns:r="http://schemas.openxmlformats.org/officeDocument/2006/relationships" xmlns:p="http://schemas.openxmlformats.org/presentationml/2006/main">
   <p:cSld>
     <p:bg>
@@ -8402,13 +8922,13 @@
   <p:clrMapOvr>
     <a:masterClrMapping/>
   </p:clrMapOvr>
-  <mc:AlternateContent xmlns:mc="http://schemas.openxmlformats.org/markup-compatibility/2006">
-    <mc:Choice xmlns:p14="http://schemas.microsoft.com/office/powerpoint/2010/main" Requires="p14">
+  <mc:AlternateContent xmlns:mc="http://schemas.openxmlformats.org/markup-compatibility/2006" xmlns:p14="http://schemas.microsoft.com/office/powerpoint/2010/main">
+    <mc:Choice Requires="p14">
       <p:transition spd="med" p14:dur="700">
         <p:fade/>
       </p:transition>
     </mc:Choice>
-    <mc:Fallback>
+    <mc:Fallback xmlns="">
       <p:transition spd="med">
         <p:fade/>
       </p:transition>
@@ -9185,6 +9705,480 @@
           <p:cNvPr id="2" name="Title 1">
             <a:extLst>
               <a:ext uri="{FF2B5EF4-FFF2-40B4-BE49-F238E27FC236}">
+                <a16:creationId xmlns:a16="http://schemas.microsoft.com/office/drawing/2014/main" id="{099C2767-8938-DF8F-377D-2BA158D45BFB}"/>
+              </a:ext>
+            </a:extLst>
+          </p:cNvPr>
+          <p:cNvSpPr>
+            <a:spLocks noGrp="1"/>
+          </p:cNvSpPr>
+          <p:nvPr>
+            <p:ph type="title"/>
+          </p:nvPr>
+        </p:nvSpPr>
+        <p:spPr>
+          <a:xfrm>
+            <a:off x="609600" y="292313"/>
+            <a:ext cx="10972800" cy="838397"/>
+          </a:xfrm>
+        </p:spPr>
+        <p:txBody>
+          <a:bodyPr>
+            <a:normAutofit/>
+          </a:bodyPr>
+          <a:lstStyle/>
+          <a:p>
+            <a:r>
+              <a:rPr lang="en-US" dirty="0"/>
+              <a:t>Business Overview</a:t>
+            </a:r>
+          </a:p>
+        </p:txBody>
+      </p:sp>
+      <p:pic>
+        <p:nvPicPr>
+          <p:cNvPr id="7" name="Picture 6">
+            <a:extLst>
+              <a:ext uri="{FF2B5EF4-FFF2-40B4-BE49-F238E27FC236}">
+                <a16:creationId xmlns:a16="http://schemas.microsoft.com/office/drawing/2014/main" id="{7BBFC01E-84F6-F02F-00AE-3989096AF6B0}"/>
+              </a:ext>
+            </a:extLst>
+          </p:cNvPr>
+          <p:cNvPicPr>
+            <a:picLocks noChangeAspect="1"/>
+          </p:cNvPicPr>
+          <p:nvPr/>
+        </p:nvPicPr>
+        <p:blipFill>
+          <a:blip r:embed="rId2"/>
+          <a:stretch>
+            <a:fillRect/>
+          </a:stretch>
+        </p:blipFill>
+        <p:spPr>
+          <a:xfrm>
+            <a:off x="753627" y="1130709"/>
+            <a:ext cx="10619224" cy="5651928"/>
+          </a:xfrm>
+          <a:prstGeom prst="rect">
+            <a:avLst/>
+          </a:prstGeom>
+        </p:spPr>
+      </p:pic>
+    </p:spTree>
+    <p:extLst>
+      <p:ext uri="{BB962C8B-B14F-4D97-AF65-F5344CB8AC3E}">
+        <p14:creationId xmlns:p14="http://schemas.microsoft.com/office/powerpoint/2010/main" val="1909840194"/>
+      </p:ext>
+    </p:extLst>
+  </p:cSld>
+  <p:clrMapOvr>
+    <a:masterClrMapping/>
+  </p:clrMapOvr>
+  <p:timing>
+    <p:tnLst>
+      <p:par>
+        <p:cTn id="1" dur="indefinite" restart="never" nodeType="tmRoot">
+          <p:childTnLst>
+            <p:seq concurrent="1" nextAc="seek">
+              <p:cTn id="2" dur="indefinite" nodeType="mainSeq">
+                <p:childTnLst>
+                  <p:par>
+                    <p:cTn id="3" fill="hold">
+                      <p:stCondLst>
+                        <p:cond delay="indefinite"/>
+                      </p:stCondLst>
+                      <p:childTnLst>
+                        <p:par>
+                          <p:cTn id="4" fill="hold">
+                            <p:stCondLst>
+                              <p:cond delay="0"/>
+                            </p:stCondLst>
+                            <p:childTnLst>
+                              <p:par>
+                                <p:cTn id="5" presetID="16" presetClass="entr" presetSubtype="21" fill="hold" grpId="0" nodeType="clickEffect">
+                                  <p:stCondLst>
+                                    <p:cond delay="0"/>
+                                  </p:stCondLst>
+                                  <p:childTnLst>
+                                    <p:set>
+                                      <p:cBhvr>
+                                        <p:cTn id="6" dur="1" fill="hold">
+                                          <p:stCondLst>
+                                            <p:cond delay="0"/>
+                                          </p:stCondLst>
+                                        </p:cTn>
+                                        <p:tgtEl>
+                                          <p:spTgt spid="2"/>
+                                        </p:tgtEl>
+                                        <p:attrNameLst>
+                                          <p:attrName>style.visibility</p:attrName>
+                                        </p:attrNameLst>
+                                      </p:cBhvr>
+                                      <p:to>
+                                        <p:strVal val="visible"/>
+                                      </p:to>
+                                    </p:set>
+                                    <p:animEffect transition="in" filter="barn(inVertical)">
+                                      <p:cBhvr>
+                                        <p:cTn id="7" dur="500"/>
+                                        <p:tgtEl>
+                                          <p:spTgt spid="2"/>
+                                        </p:tgtEl>
+                                      </p:cBhvr>
+                                    </p:animEffect>
+                                  </p:childTnLst>
+                                </p:cTn>
+                              </p:par>
+                            </p:childTnLst>
+                          </p:cTn>
+                        </p:par>
+                      </p:childTnLst>
+                    </p:cTn>
+                  </p:par>
+                  <p:par>
+                    <p:cTn id="8" fill="hold">
+                      <p:stCondLst>
+                        <p:cond delay="indefinite"/>
+                      </p:stCondLst>
+                      <p:childTnLst>
+                        <p:par>
+                          <p:cTn id="9" fill="hold">
+                            <p:stCondLst>
+                              <p:cond delay="0"/>
+                            </p:stCondLst>
+                            <p:childTnLst>
+                              <p:par>
+                                <p:cTn id="10" presetID="10" presetClass="entr" presetSubtype="0" fill="hold" nodeType="clickEffect">
+                                  <p:stCondLst>
+                                    <p:cond delay="0"/>
+                                  </p:stCondLst>
+                                  <p:childTnLst>
+                                    <p:set>
+                                      <p:cBhvr>
+                                        <p:cTn id="11" dur="1" fill="hold">
+                                          <p:stCondLst>
+                                            <p:cond delay="0"/>
+                                          </p:stCondLst>
+                                        </p:cTn>
+                                        <p:tgtEl>
+                                          <p:spTgt spid="7"/>
+                                        </p:tgtEl>
+                                        <p:attrNameLst>
+                                          <p:attrName>style.visibility</p:attrName>
+                                        </p:attrNameLst>
+                                      </p:cBhvr>
+                                      <p:to>
+                                        <p:strVal val="visible"/>
+                                      </p:to>
+                                    </p:set>
+                                    <p:animEffect transition="in" filter="fade">
+                                      <p:cBhvr>
+                                        <p:cTn id="12" dur="500"/>
+                                        <p:tgtEl>
+                                          <p:spTgt spid="7"/>
+                                        </p:tgtEl>
+                                      </p:cBhvr>
+                                    </p:animEffect>
+                                  </p:childTnLst>
+                                </p:cTn>
+                              </p:par>
+                            </p:childTnLst>
+                          </p:cTn>
+                        </p:par>
+                      </p:childTnLst>
+                    </p:cTn>
+                  </p:par>
+                </p:childTnLst>
+              </p:cTn>
+              <p:prevCondLst>
+                <p:cond evt="onPrev" delay="0">
+                  <p:tgtEl>
+                    <p:sldTgt/>
+                  </p:tgtEl>
+                </p:cond>
+              </p:prevCondLst>
+              <p:nextCondLst>
+                <p:cond evt="onNext" delay="0">
+                  <p:tgtEl>
+                    <p:sldTgt/>
+                  </p:tgtEl>
+                </p:cond>
+              </p:nextCondLst>
+            </p:seq>
+          </p:childTnLst>
+        </p:cTn>
+      </p:par>
+    </p:tnLst>
+    <p:bldLst>
+      <p:bldP spid="2" grpId="0"/>
+    </p:bldLst>
+  </p:timing>
+</p:sld>
+</file>
+
+<file path=ppt/slides/slide4.xml><?xml version="1.0" encoding="utf-8"?>
+<p:sld xmlns:a="http://schemas.openxmlformats.org/drawingml/2006/main" xmlns:r="http://schemas.openxmlformats.org/officeDocument/2006/relationships" xmlns:p="http://schemas.openxmlformats.org/presentationml/2006/main">
+  <p:cSld>
+    <p:spTree>
+      <p:nvGrpSpPr>
+        <p:cNvPr id="1" name="">
+          <a:extLst>
+            <a:ext uri="{FF2B5EF4-FFF2-40B4-BE49-F238E27FC236}">
+              <a16:creationId xmlns:a16="http://schemas.microsoft.com/office/drawing/2014/main" id="{1962DAA4-FCBA-B58A-535F-73E92EE86F71}"/>
+            </a:ext>
+          </a:extLst>
+        </p:cNvPr>
+        <p:cNvGrpSpPr/>
+        <p:nvPr/>
+      </p:nvGrpSpPr>
+      <p:grpSpPr>
+        <a:xfrm>
+          <a:off x="0" y="0"/>
+          <a:ext cx="0" cy="0"/>
+          <a:chOff x="0" y="0"/>
+          <a:chExt cx="0" cy="0"/>
+        </a:xfrm>
+      </p:grpSpPr>
+      <p:sp>
+        <p:nvSpPr>
+          <p:cNvPr id="2" name="Title 1">
+            <a:extLst>
+              <a:ext uri="{FF2B5EF4-FFF2-40B4-BE49-F238E27FC236}">
+                <a16:creationId xmlns:a16="http://schemas.microsoft.com/office/drawing/2014/main" id="{0E7D0B1F-17CE-7200-0B25-DF3163CD9264}"/>
+              </a:ext>
+            </a:extLst>
+          </p:cNvPr>
+          <p:cNvSpPr>
+            <a:spLocks noGrp="1"/>
+          </p:cNvSpPr>
+          <p:nvPr>
+            <p:ph type="title"/>
+          </p:nvPr>
+        </p:nvSpPr>
+        <p:spPr>
+          <a:xfrm>
+            <a:off x="609600" y="292313"/>
+            <a:ext cx="10972800" cy="838397"/>
+          </a:xfrm>
+        </p:spPr>
+        <p:txBody>
+          <a:bodyPr>
+            <a:normAutofit/>
+          </a:bodyPr>
+          <a:lstStyle/>
+          <a:p>
+            <a:r>
+              <a:rPr lang="en-US" dirty="0"/>
+              <a:t>Business Overview</a:t>
+            </a:r>
+          </a:p>
+        </p:txBody>
+      </p:sp>
+      <p:pic>
+        <p:nvPicPr>
+          <p:cNvPr id="4" name="Picture 3">
+            <a:extLst>
+              <a:ext uri="{FF2B5EF4-FFF2-40B4-BE49-F238E27FC236}">
+                <a16:creationId xmlns:a16="http://schemas.microsoft.com/office/drawing/2014/main" id="{88D2E00C-7116-AFE7-78F7-8EC5EEAB2B20}"/>
+              </a:ext>
+            </a:extLst>
+          </p:cNvPr>
+          <p:cNvPicPr>
+            <a:picLocks noChangeAspect="1"/>
+          </p:cNvPicPr>
+          <p:nvPr/>
+        </p:nvPicPr>
+        <p:blipFill>
+          <a:blip r:embed="rId2"/>
+          <a:stretch>
+            <a:fillRect/>
+          </a:stretch>
+        </p:blipFill>
+        <p:spPr>
+          <a:xfrm>
+            <a:off x="795337" y="1130710"/>
+            <a:ext cx="10601325" cy="5727290"/>
+          </a:xfrm>
+          <a:prstGeom prst="rect">
+            <a:avLst/>
+          </a:prstGeom>
+        </p:spPr>
+      </p:pic>
+    </p:spTree>
+    <p:extLst>
+      <p:ext uri="{BB962C8B-B14F-4D97-AF65-F5344CB8AC3E}">
+        <p14:creationId xmlns:p14="http://schemas.microsoft.com/office/powerpoint/2010/main" val="522449260"/>
+      </p:ext>
+    </p:extLst>
+  </p:cSld>
+  <p:clrMapOvr>
+    <a:masterClrMapping/>
+  </p:clrMapOvr>
+  <p:timing>
+    <p:tnLst>
+      <p:par>
+        <p:cTn id="1" dur="indefinite" restart="never" nodeType="tmRoot">
+          <p:childTnLst>
+            <p:seq concurrent="1" nextAc="seek">
+              <p:cTn id="2" dur="indefinite" nodeType="mainSeq">
+                <p:childTnLst>
+                  <p:par>
+                    <p:cTn id="3" fill="hold">
+                      <p:stCondLst>
+                        <p:cond delay="indefinite"/>
+                      </p:stCondLst>
+                      <p:childTnLst>
+                        <p:par>
+                          <p:cTn id="4" fill="hold">
+                            <p:stCondLst>
+                              <p:cond delay="0"/>
+                            </p:stCondLst>
+                            <p:childTnLst>
+                              <p:par>
+                                <p:cTn id="5" presetID="16" presetClass="entr" presetSubtype="21" fill="hold" grpId="0" nodeType="clickEffect">
+                                  <p:stCondLst>
+                                    <p:cond delay="0"/>
+                                  </p:stCondLst>
+                                  <p:childTnLst>
+                                    <p:set>
+                                      <p:cBhvr>
+                                        <p:cTn id="6" dur="1" fill="hold">
+                                          <p:stCondLst>
+                                            <p:cond delay="0"/>
+                                          </p:stCondLst>
+                                        </p:cTn>
+                                        <p:tgtEl>
+                                          <p:spTgt spid="2"/>
+                                        </p:tgtEl>
+                                        <p:attrNameLst>
+                                          <p:attrName>style.visibility</p:attrName>
+                                        </p:attrNameLst>
+                                      </p:cBhvr>
+                                      <p:to>
+                                        <p:strVal val="visible"/>
+                                      </p:to>
+                                    </p:set>
+                                    <p:animEffect transition="in" filter="barn(inVertical)">
+                                      <p:cBhvr>
+                                        <p:cTn id="7" dur="500"/>
+                                        <p:tgtEl>
+                                          <p:spTgt spid="2"/>
+                                        </p:tgtEl>
+                                      </p:cBhvr>
+                                    </p:animEffect>
+                                  </p:childTnLst>
+                                </p:cTn>
+                              </p:par>
+                            </p:childTnLst>
+                          </p:cTn>
+                        </p:par>
+                      </p:childTnLst>
+                    </p:cTn>
+                  </p:par>
+                  <p:par>
+                    <p:cTn id="8" fill="hold">
+                      <p:stCondLst>
+                        <p:cond delay="indefinite"/>
+                      </p:stCondLst>
+                      <p:childTnLst>
+                        <p:par>
+                          <p:cTn id="9" fill="hold">
+                            <p:stCondLst>
+                              <p:cond delay="0"/>
+                            </p:stCondLst>
+                            <p:childTnLst>
+                              <p:par>
+                                <p:cTn id="10" presetID="10" presetClass="entr" presetSubtype="0" fill="hold" nodeType="clickEffect">
+                                  <p:stCondLst>
+                                    <p:cond delay="0"/>
+                                  </p:stCondLst>
+                                  <p:childTnLst>
+                                    <p:set>
+                                      <p:cBhvr>
+                                        <p:cTn id="11" dur="1" fill="hold">
+                                          <p:stCondLst>
+                                            <p:cond delay="0"/>
+                                          </p:stCondLst>
+                                        </p:cTn>
+                                        <p:tgtEl>
+                                          <p:spTgt spid="4"/>
+                                        </p:tgtEl>
+                                        <p:attrNameLst>
+                                          <p:attrName>style.visibility</p:attrName>
+                                        </p:attrNameLst>
+                                      </p:cBhvr>
+                                      <p:to>
+                                        <p:strVal val="visible"/>
+                                      </p:to>
+                                    </p:set>
+                                    <p:animEffect transition="in" filter="fade">
+                                      <p:cBhvr>
+                                        <p:cTn id="12" dur="500"/>
+                                        <p:tgtEl>
+                                          <p:spTgt spid="4"/>
+                                        </p:tgtEl>
+                                      </p:cBhvr>
+                                    </p:animEffect>
+                                  </p:childTnLst>
+                                </p:cTn>
+                              </p:par>
+                            </p:childTnLst>
+                          </p:cTn>
+                        </p:par>
+                      </p:childTnLst>
+                    </p:cTn>
+                  </p:par>
+                </p:childTnLst>
+              </p:cTn>
+              <p:prevCondLst>
+                <p:cond evt="onPrev" delay="0">
+                  <p:tgtEl>
+                    <p:sldTgt/>
+                  </p:tgtEl>
+                </p:cond>
+              </p:prevCondLst>
+              <p:nextCondLst>
+                <p:cond evt="onNext" delay="0">
+                  <p:tgtEl>
+                    <p:sldTgt/>
+                  </p:tgtEl>
+                </p:cond>
+              </p:nextCondLst>
+            </p:seq>
+          </p:childTnLst>
+        </p:cTn>
+      </p:par>
+    </p:tnLst>
+    <p:bldLst>
+      <p:bldP spid="2" grpId="0"/>
+    </p:bldLst>
+  </p:timing>
+</p:sld>
+</file>
+
+<file path=ppt/slides/slide5.xml><?xml version="1.0" encoding="utf-8"?>
+<p:sld xmlns:a="http://schemas.openxmlformats.org/drawingml/2006/main" xmlns:r="http://schemas.openxmlformats.org/officeDocument/2006/relationships" xmlns:p="http://schemas.openxmlformats.org/presentationml/2006/main">
+  <p:cSld>
+    <p:spTree>
+      <p:nvGrpSpPr>
+        <p:cNvPr id="1" name=""/>
+        <p:cNvGrpSpPr/>
+        <p:nvPr/>
+      </p:nvGrpSpPr>
+      <p:grpSpPr>
+        <a:xfrm>
+          <a:off x="0" y="0"/>
+          <a:ext cx="0" cy="0"/>
+          <a:chOff x="0" y="0"/>
+          <a:chExt cx="0" cy="0"/>
+        </a:xfrm>
+      </p:grpSpPr>
+      <p:sp>
+        <p:nvSpPr>
+          <p:cNvPr id="2" name="Title 1">
+            <a:extLst>
+              <a:ext uri="{FF2B5EF4-FFF2-40B4-BE49-F238E27FC236}">
                 <a16:creationId xmlns:a16="http://schemas.microsoft.com/office/drawing/2014/main" id="{437CC97E-EDF8-3FF5-8C8F-7DAA1A490A72}"/>
               </a:ext>
             </a:extLst>
@@ -9395,7 +10389,7 @@
 </p:sld>
 </file>
 
-<file path=ppt/slides/slide4.xml><?xml version="1.0" encoding="utf-8"?>
+<file path=ppt/slides/slide6.xml><?xml version="1.0" encoding="utf-8"?>
 <p:sld xmlns:a="http://schemas.openxmlformats.org/drawingml/2006/main" xmlns:r="http://schemas.openxmlformats.org/officeDocument/2006/relationships" xmlns:p="http://schemas.openxmlformats.org/presentationml/2006/main">
   <p:cSld>
     <p:spTree>
@@ -9694,7 +10688,7 @@
 </p:sld>
 </file>
 
-<file path=ppt/slides/slide5.xml><?xml version="1.0" encoding="utf-8"?>
+<file path=ppt/slides/slide7.xml><?xml version="1.0" encoding="utf-8"?>
 <p:sld xmlns:a="http://schemas.openxmlformats.org/drawingml/2006/main" xmlns:r="http://schemas.openxmlformats.org/officeDocument/2006/relationships" xmlns:p="http://schemas.openxmlformats.org/presentationml/2006/main">
   <p:cSld>
     <p:spTree>
@@ -9926,7 +10920,7 @@
 </p:sld>
 </file>
 
-<file path=ppt/slides/slide6.xml><?xml version="1.0" encoding="utf-8"?>
+<file path=ppt/slides/slide8.xml><?xml version="1.0" encoding="utf-8"?>
 <p:sld xmlns:a="http://schemas.openxmlformats.org/drawingml/2006/main" xmlns:r="http://schemas.openxmlformats.org/officeDocument/2006/relationships" xmlns:p="http://schemas.openxmlformats.org/presentationml/2006/main">
   <p:cSld>
     <p:spTree>
@@ -10663,7 +11657,7 @@
 </p:sld>
 </file>
 
-<file path=ppt/slides/slide7.xml><?xml version="1.0" encoding="utf-8"?>
+<file path=ppt/slides/slide9.xml><?xml version="1.0" encoding="utf-8"?>
 <p:sld xmlns:a="http://schemas.openxmlformats.org/drawingml/2006/main" xmlns:r="http://schemas.openxmlformats.org/officeDocument/2006/relationships" xmlns:p="http://schemas.openxmlformats.org/presentationml/2006/main">
   <p:cSld>
     <p:spTree>
@@ -10906,524 +11900,6 @@
         </p:cTn>
       </p:par>
     </p:tnLst>
-  </p:timing>
-</p:sld>
-</file>
-
-<file path=ppt/slides/slide8.xml><?xml version="1.0" encoding="utf-8"?>
-<p:sld xmlns:a="http://schemas.openxmlformats.org/drawingml/2006/main" xmlns:r="http://schemas.openxmlformats.org/officeDocument/2006/relationships" xmlns:p="http://schemas.openxmlformats.org/presentationml/2006/main">
-  <p:cSld>
-    <p:spTree>
-      <p:nvGrpSpPr>
-        <p:cNvPr id="1" name=""/>
-        <p:cNvGrpSpPr/>
-        <p:nvPr/>
-      </p:nvGrpSpPr>
-      <p:grpSpPr>
-        <a:xfrm>
-          <a:off x="0" y="0"/>
-          <a:ext cx="0" cy="0"/>
-          <a:chOff x="0" y="0"/>
-          <a:chExt cx="0" cy="0"/>
-        </a:xfrm>
-      </p:grpSpPr>
-      <p:sp>
-        <p:nvSpPr>
-          <p:cNvPr id="2" name="Title 1">
-            <a:extLst>
-              <a:ext uri="{FF2B5EF4-FFF2-40B4-BE49-F238E27FC236}">
-                <a16:creationId xmlns:a16="http://schemas.microsoft.com/office/drawing/2014/main" id="{44CF171D-2B56-4ED9-151A-7775F4853279}"/>
-              </a:ext>
-            </a:extLst>
-          </p:cNvPr>
-          <p:cNvSpPr>
-            <a:spLocks noGrp="1"/>
-          </p:cNvSpPr>
-          <p:nvPr>
-            <p:ph type="title"/>
-          </p:nvPr>
-        </p:nvSpPr>
-        <p:spPr>
-          <a:xfrm>
-            <a:off x="609600" y="173320"/>
-            <a:ext cx="10972800" cy="844989"/>
-          </a:xfrm>
-        </p:spPr>
-        <p:txBody>
-          <a:bodyPr/>
-          <a:lstStyle/>
-          <a:p>
-            <a:pPr algn="ctr"/>
-            <a:r>
-              <a:rPr lang="en-US" dirty="0"/>
-              <a:t>Peak Season Analysis (2019 vs 2020)</a:t>
-            </a:r>
-          </a:p>
-        </p:txBody>
-      </p:sp>
-      <p:grpSp>
-        <p:nvGrpSpPr>
-          <p:cNvPr id="28" name="Group 27">
-            <a:extLst>
-              <a:ext uri="{FF2B5EF4-FFF2-40B4-BE49-F238E27FC236}">
-                <a16:creationId xmlns:a16="http://schemas.microsoft.com/office/drawing/2014/main" id="{A4AA3BA3-9499-73CA-987F-E0911B2B66C0}"/>
-              </a:ext>
-            </a:extLst>
-          </p:cNvPr>
-          <p:cNvGrpSpPr/>
-          <p:nvPr/>
-        </p:nvGrpSpPr>
-        <p:grpSpPr>
-          <a:xfrm>
-            <a:off x="431440" y="1018309"/>
-            <a:ext cx="11495376" cy="5839691"/>
-            <a:chOff x="265185" y="928117"/>
-            <a:chExt cx="11495376" cy="5929883"/>
-          </a:xfrm>
-        </p:grpSpPr>
-        <p:pic>
-          <p:nvPicPr>
-            <p:cNvPr id="26" name="Picture 25">
-              <a:extLst>
-                <a:ext uri="{FF2B5EF4-FFF2-40B4-BE49-F238E27FC236}">
-                  <a16:creationId xmlns:a16="http://schemas.microsoft.com/office/drawing/2014/main" id="{DEBB884E-886A-074B-B9D5-796C5FEB7A45}"/>
-                </a:ext>
-              </a:extLst>
-            </p:cNvPr>
-            <p:cNvPicPr>
-              <a:picLocks noChangeAspect="1"/>
-            </p:cNvPicPr>
-            <p:nvPr/>
-          </p:nvPicPr>
-          <p:blipFill>
-            <a:blip r:embed="rId2"/>
-            <a:stretch>
-              <a:fillRect/>
-            </a:stretch>
-          </p:blipFill>
-          <p:spPr>
-            <a:xfrm>
-              <a:off x="265185" y="928117"/>
-              <a:ext cx="11495376" cy="5839691"/>
-            </a:xfrm>
-            <a:prstGeom prst="rect">
-              <a:avLst/>
-            </a:prstGeom>
-          </p:spPr>
-        </p:pic>
-        <p:pic>
-          <p:nvPicPr>
-            <p:cNvPr id="16" name="Picture 15">
-              <a:extLst>
-                <a:ext uri="{FF2B5EF4-FFF2-40B4-BE49-F238E27FC236}">
-                  <a16:creationId xmlns:a16="http://schemas.microsoft.com/office/drawing/2014/main" id="{8B344489-F898-A33F-CECF-C21735A8005B}"/>
-                </a:ext>
-              </a:extLst>
-            </p:cNvPr>
-            <p:cNvPicPr>
-              <a:picLocks noChangeAspect="1"/>
-            </p:cNvPicPr>
-            <p:nvPr/>
-          </p:nvPicPr>
-          <p:blipFill>
-            <a:blip r:embed="rId3"/>
-            <a:stretch>
-              <a:fillRect/>
-            </a:stretch>
-          </p:blipFill>
-          <p:spPr>
-            <a:xfrm>
-              <a:off x="6729846" y="5638938"/>
-              <a:ext cx="3143250" cy="1219062"/>
-            </a:xfrm>
-            <a:prstGeom prst="rect">
-              <a:avLst/>
-            </a:prstGeom>
-          </p:spPr>
-        </p:pic>
-      </p:grpSp>
-    </p:spTree>
-    <p:extLst>
-      <p:ext uri="{BB962C8B-B14F-4D97-AF65-F5344CB8AC3E}">
-        <p14:creationId xmlns:p14="http://schemas.microsoft.com/office/powerpoint/2010/main" val="3306896646"/>
-      </p:ext>
-    </p:extLst>
-  </p:cSld>
-  <p:clrMapOvr>
-    <a:masterClrMapping/>
-  </p:clrMapOvr>
-  <p:timing>
-    <p:tnLst>
-      <p:par>
-        <p:cTn id="1" dur="indefinite" restart="never" nodeType="tmRoot">
-          <p:childTnLst>
-            <p:seq concurrent="1" nextAc="seek">
-              <p:cTn id="2" dur="indefinite" nodeType="mainSeq">
-                <p:childTnLst>
-                  <p:par>
-                    <p:cTn id="3" fill="hold">
-                      <p:stCondLst>
-                        <p:cond delay="indefinite"/>
-                      </p:stCondLst>
-                      <p:childTnLst>
-                        <p:par>
-                          <p:cTn id="4" fill="hold">
-                            <p:stCondLst>
-                              <p:cond delay="0"/>
-                            </p:stCondLst>
-                            <p:childTnLst>
-                              <p:par>
-                                <p:cTn id="5" presetID="16" presetClass="entr" presetSubtype="21" fill="hold" grpId="0" nodeType="clickEffect">
-                                  <p:stCondLst>
-                                    <p:cond delay="0"/>
-                                  </p:stCondLst>
-                                  <p:childTnLst>
-                                    <p:set>
-                                      <p:cBhvr>
-                                        <p:cTn id="6" dur="1" fill="hold">
-                                          <p:stCondLst>
-                                            <p:cond delay="0"/>
-                                          </p:stCondLst>
-                                        </p:cTn>
-                                        <p:tgtEl>
-                                          <p:spTgt spid="2"/>
-                                        </p:tgtEl>
-                                        <p:attrNameLst>
-                                          <p:attrName>style.visibility</p:attrName>
-                                        </p:attrNameLst>
-                                      </p:cBhvr>
-                                      <p:to>
-                                        <p:strVal val="visible"/>
-                                      </p:to>
-                                    </p:set>
-                                    <p:animEffect transition="in" filter="barn(inVertical)">
-                                      <p:cBhvr>
-                                        <p:cTn id="7" dur="500"/>
-                                        <p:tgtEl>
-                                          <p:spTgt spid="2"/>
-                                        </p:tgtEl>
-                                      </p:cBhvr>
-                                    </p:animEffect>
-                                  </p:childTnLst>
-                                </p:cTn>
-                              </p:par>
-                            </p:childTnLst>
-                          </p:cTn>
-                        </p:par>
-                      </p:childTnLst>
-                    </p:cTn>
-                  </p:par>
-                  <p:par>
-                    <p:cTn id="8" fill="hold">
-                      <p:stCondLst>
-                        <p:cond delay="indefinite"/>
-                      </p:stCondLst>
-                      <p:childTnLst>
-                        <p:par>
-                          <p:cTn id="9" fill="hold">
-                            <p:stCondLst>
-                              <p:cond delay="0"/>
-                            </p:stCondLst>
-                            <p:childTnLst>
-                              <p:par>
-                                <p:cTn id="10" presetID="10" presetClass="entr" presetSubtype="0" fill="hold" nodeType="clickEffect">
-                                  <p:stCondLst>
-                                    <p:cond delay="0"/>
-                                  </p:stCondLst>
-                                  <p:childTnLst>
-                                    <p:set>
-                                      <p:cBhvr>
-                                        <p:cTn id="11" dur="1" fill="hold">
-                                          <p:stCondLst>
-                                            <p:cond delay="0"/>
-                                          </p:stCondLst>
-                                        </p:cTn>
-                                        <p:tgtEl>
-                                          <p:spTgt spid="28"/>
-                                        </p:tgtEl>
-                                        <p:attrNameLst>
-                                          <p:attrName>style.visibility</p:attrName>
-                                        </p:attrNameLst>
-                                      </p:cBhvr>
-                                      <p:to>
-                                        <p:strVal val="visible"/>
-                                      </p:to>
-                                    </p:set>
-                                    <p:animEffect transition="in" filter="fade">
-                                      <p:cBhvr>
-                                        <p:cTn id="12" dur="500"/>
-                                        <p:tgtEl>
-                                          <p:spTgt spid="28"/>
-                                        </p:tgtEl>
-                                      </p:cBhvr>
-                                    </p:animEffect>
-                                  </p:childTnLst>
-                                </p:cTn>
-                              </p:par>
-                            </p:childTnLst>
-                          </p:cTn>
-                        </p:par>
-                      </p:childTnLst>
-                    </p:cTn>
-                  </p:par>
-                </p:childTnLst>
-              </p:cTn>
-              <p:prevCondLst>
-                <p:cond evt="onPrev" delay="0">
-                  <p:tgtEl>
-                    <p:sldTgt/>
-                  </p:tgtEl>
-                </p:cond>
-              </p:prevCondLst>
-              <p:nextCondLst>
-                <p:cond evt="onNext" delay="0">
-                  <p:tgtEl>
-                    <p:sldTgt/>
-                  </p:tgtEl>
-                </p:cond>
-              </p:nextCondLst>
-            </p:seq>
-          </p:childTnLst>
-        </p:cTn>
-      </p:par>
-    </p:tnLst>
-    <p:bldLst>
-      <p:bldP spid="2" grpId="0"/>
-    </p:bldLst>
-  </p:timing>
-</p:sld>
-</file>
-
-<file path=ppt/slides/slide9.xml><?xml version="1.0" encoding="utf-8"?>
-<p:sld xmlns:a="http://schemas.openxmlformats.org/drawingml/2006/main" xmlns:r="http://schemas.openxmlformats.org/officeDocument/2006/relationships" xmlns:p="http://schemas.openxmlformats.org/presentationml/2006/main">
-  <p:cSld>
-    <p:spTree>
-      <p:nvGrpSpPr>
-        <p:cNvPr id="1" name=""/>
-        <p:cNvGrpSpPr/>
-        <p:nvPr/>
-      </p:nvGrpSpPr>
-      <p:grpSpPr>
-        <a:xfrm>
-          <a:off x="0" y="0"/>
-          <a:ext cx="0" cy="0"/>
-          <a:chOff x="0" y="0"/>
-          <a:chExt cx="0" cy="0"/>
-        </a:xfrm>
-      </p:grpSpPr>
-      <p:sp>
-        <p:nvSpPr>
-          <p:cNvPr id="2" name="Title 1">
-            <a:extLst>
-              <a:ext uri="{FF2B5EF4-FFF2-40B4-BE49-F238E27FC236}">
-                <a16:creationId xmlns:a16="http://schemas.microsoft.com/office/drawing/2014/main" id="{F588A945-E1A5-C740-0749-7206BB505B89}"/>
-              </a:ext>
-            </a:extLst>
-          </p:cNvPr>
-          <p:cNvSpPr>
-            <a:spLocks noGrp="1"/>
-          </p:cNvSpPr>
-          <p:nvPr>
-            <p:ph type="title"/>
-          </p:nvPr>
-        </p:nvSpPr>
-        <p:spPr>
-          <a:xfrm>
-            <a:off x="609600" y="557784"/>
-            <a:ext cx="10972800" cy="1094371"/>
-          </a:xfrm>
-        </p:spPr>
-        <p:txBody>
-          <a:bodyPr>
-            <a:normAutofit fontScale="90000"/>
-          </a:bodyPr>
-          <a:lstStyle/>
-          <a:p>
-            <a:r>
-              <a:rPr lang="en-US" dirty="0"/>
-              <a:t>Peak Season Analysis (Pre-COVID and COVID Observation Period )</a:t>
-            </a:r>
-          </a:p>
-        </p:txBody>
-      </p:sp>
-      <p:pic>
-        <p:nvPicPr>
-          <p:cNvPr id="5" name="Picture 4">
-            <a:extLst>
-              <a:ext uri="{FF2B5EF4-FFF2-40B4-BE49-F238E27FC236}">
-                <a16:creationId xmlns:a16="http://schemas.microsoft.com/office/drawing/2014/main" id="{0A3A4FBF-BF19-CEEA-5C3A-EC711C3957F2}"/>
-              </a:ext>
-            </a:extLst>
-          </p:cNvPr>
-          <p:cNvPicPr>
-            <a:picLocks noChangeAspect="1"/>
-          </p:cNvPicPr>
-          <p:nvPr/>
-        </p:nvPicPr>
-        <p:blipFill>
-          <a:blip r:embed="rId2"/>
-          <a:stretch>
-            <a:fillRect/>
-          </a:stretch>
-        </p:blipFill>
-        <p:spPr>
-          <a:xfrm>
-            <a:off x="249382" y="1652154"/>
-            <a:ext cx="11565082" cy="5205845"/>
-          </a:xfrm>
-          <a:prstGeom prst="rect">
-            <a:avLst/>
-          </a:prstGeom>
-        </p:spPr>
-      </p:pic>
-    </p:spTree>
-    <p:extLst>
-      <p:ext uri="{BB962C8B-B14F-4D97-AF65-F5344CB8AC3E}">
-        <p14:creationId xmlns:p14="http://schemas.microsoft.com/office/powerpoint/2010/main" val="524735799"/>
-      </p:ext>
-    </p:extLst>
-  </p:cSld>
-  <p:clrMapOvr>
-    <a:masterClrMapping/>
-  </p:clrMapOvr>
-  <p:timing>
-    <p:tnLst>
-      <p:par>
-        <p:cTn id="1" dur="indefinite" restart="never" nodeType="tmRoot">
-          <p:childTnLst>
-            <p:seq concurrent="1" nextAc="seek">
-              <p:cTn id="2" dur="indefinite" nodeType="mainSeq">
-                <p:childTnLst>
-                  <p:par>
-                    <p:cTn id="3" fill="hold">
-                      <p:stCondLst>
-                        <p:cond delay="indefinite"/>
-                      </p:stCondLst>
-                      <p:childTnLst>
-                        <p:par>
-                          <p:cTn id="4" fill="hold">
-                            <p:stCondLst>
-                              <p:cond delay="0"/>
-                            </p:stCondLst>
-                            <p:childTnLst>
-                              <p:par>
-                                <p:cTn id="5" presetID="16" presetClass="entr" presetSubtype="21" fill="hold" grpId="0" nodeType="clickEffect">
-                                  <p:stCondLst>
-                                    <p:cond delay="0"/>
-                                  </p:stCondLst>
-                                  <p:childTnLst>
-                                    <p:set>
-                                      <p:cBhvr>
-                                        <p:cTn id="6" dur="1" fill="hold">
-                                          <p:stCondLst>
-                                            <p:cond delay="0"/>
-                                          </p:stCondLst>
-                                        </p:cTn>
-                                        <p:tgtEl>
-                                          <p:spTgt spid="2"/>
-                                        </p:tgtEl>
-                                        <p:attrNameLst>
-                                          <p:attrName>style.visibility</p:attrName>
-                                        </p:attrNameLst>
-                                      </p:cBhvr>
-                                      <p:to>
-                                        <p:strVal val="visible"/>
-                                      </p:to>
-                                    </p:set>
-                                    <p:animEffect transition="in" filter="barn(inVertical)">
-                                      <p:cBhvr>
-                                        <p:cTn id="7" dur="500"/>
-                                        <p:tgtEl>
-                                          <p:spTgt spid="2"/>
-                                        </p:tgtEl>
-                                      </p:cBhvr>
-                                    </p:animEffect>
-                                  </p:childTnLst>
-                                </p:cTn>
-                              </p:par>
-                            </p:childTnLst>
-                          </p:cTn>
-                        </p:par>
-                      </p:childTnLst>
-                    </p:cTn>
-                  </p:par>
-                  <p:par>
-                    <p:cTn id="8" fill="hold">
-                      <p:stCondLst>
-                        <p:cond delay="indefinite"/>
-                      </p:stCondLst>
-                      <p:childTnLst>
-                        <p:par>
-                          <p:cTn id="9" fill="hold">
-                            <p:stCondLst>
-                              <p:cond delay="0"/>
-                            </p:stCondLst>
-                            <p:childTnLst>
-                              <p:par>
-                                <p:cTn id="10" presetID="10" presetClass="entr" presetSubtype="0" fill="hold" nodeType="clickEffect">
-                                  <p:stCondLst>
-                                    <p:cond delay="0"/>
-                                  </p:stCondLst>
-                                  <p:childTnLst>
-                                    <p:set>
-                                      <p:cBhvr>
-                                        <p:cTn id="11" dur="1" fill="hold">
-                                          <p:stCondLst>
-                                            <p:cond delay="0"/>
-                                          </p:stCondLst>
-                                        </p:cTn>
-                                        <p:tgtEl>
-                                          <p:spTgt spid="5"/>
-                                        </p:tgtEl>
-                                        <p:attrNameLst>
-                                          <p:attrName>style.visibility</p:attrName>
-                                        </p:attrNameLst>
-                                      </p:cBhvr>
-                                      <p:to>
-                                        <p:strVal val="visible"/>
-                                      </p:to>
-                                    </p:set>
-                                    <p:animEffect transition="in" filter="fade">
-                                      <p:cBhvr>
-                                        <p:cTn id="12" dur="500"/>
-                                        <p:tgtEl>
-                                          <p:spTgt spid="5"/>
-                                        </p:tgtEl>
-                                      </p:cBhvr>
-                                    </p:animEffect>
-                                  </p:childTnLst>
-                                </p:cTn>
-                              </p:par>
-                            </p:childTnLst>
-                          </p:cTn>
-                        </p:par>
-                      </p:childTnLst>
-                    </p:cTn>
-                  </p:par>
-                </p:childTnLst>
-              </p:cTn>
-              <p:prevCondLst>
-                <p:cond evt="onPrev" delay="0">
-                  <p:tgtEl>
-                    <p:sldTgt/>
-                  </p:tgtEl>
-                </p:cond>
-              </p:prevCondLst>
-              <p:nextCondLst>
-                <p:cond evt="onNext" delay="0">
-                  <p:tgtEl>
-                    <p:sldTgt/>
-                  </p:tgtEl>
-                </p:cond>
-              </p:nextCondLst>
-            </p:seq>
-          </p:childTnLst>
-        </p:cTn>
-      </p:par>
-    </p:tnLst>
-    <p:bldLst>
-      <p:bldP spid="2" grpId="0"/>
-    </p:bldLst>
   </p:timing>
 </p:sld>
 </file>

</xml_diff>

<commit_message>
Adding updated power point
</commit_message>
<xml_diff>
--- a/Project.pptx
+++ b/Project.pptx
@@ -6590,36 +6590,36 @@
           </a:p>
         </p:txBody>
       </p:sp>
-      <p:sp>
-        <p:nvSpPr>
-          <p:cNvPr id="3" name="Content Placeholder 2">
+      <p:pic>
+        <p:nvPicPr>
+          <p:cNvPr id="9" name="Picture 8">
             <a:extLst>
               <a:ext uri="{FF2B5EF4-FFF2-40B4-BE49-F238E27FC236}">
-                <a16:creationId xmlns:a16="http://schemas.microsoft.com/office/drawing/2014/main" id="{7EB87852-6D79-6AA1-AB3B-D908405B2E69}"/>
+                <a16:creationId xmlns:a16="http://schemas.microsoft.com/office/drawing/2014/main" id="{48919FDA-43ED-C74F-EF31-0E4DCBD58B59}"/>
               </a:ext>
             </a:extLst>
           </p:cNvPr>
-          <p:cNvSpPr>
-            <a:spLocks noGrp="1"/>
-          </p:cNvSpPr>
-          <p:nvPr>
-            <p:ph idx="1"/>
-          </p:nvPr>
-        </p:nvSpPr>
+          <p:cNvPicPr>
+            <a:picLocks noChangeAspect="1"/>
+          </p:cNvPicPr>
+          <p:nvPr/>
+        </p:nvPicPr>
+        <p:blipFill>
+          <a:blip r:embed="rId2"/>
+          <a:stretch>
+            <a:fillRect/>
+          </a:stretch>
+        </p:blipFill>
         <p:spPr>
           <a:xfrm>
-            <a:off x="609600" y="1160206"/>
-            <a:ext cx="10972800" cy="4982532"/>
+            <a:off x="1244661" y="963562"/>
+            <a:ext cx="9702678" cy="5805926"/>
           </a:xfrm>
+          <a:prstGeom prst="rect">
+            <a:avLst/>
+          </a:prstGeom>
         </p:spPr>
-        <p:txBody>
-          <a:bodyPr/>
-          <a:lstStyle/>
-          <a:p>
-            <a:endParaRPr lang="en-US" dirty="0"/>
-          </a:p>
-        </p:txBody>
-      </p:sp>
+      </p:pic>
     </p:spTree>
     <p:extLst>
       <p:ext uri="{BB962C8B-B14F-4D97-AF65-F5344CB8AC3E}">
@@ -6630,6 +6630,145 @@
   <p:clrMapOvr>
     <a:masterClrMapping/>
   </p:clrMapOvr>
+  <p:timing>
+    <p:tnLst>
+      <p:par>
+        <p:cTn id="1" dur="indefinite" restart="never" nodeType="tmRoot">
+          <p:childTnLst>
+            <p:seq concurrent="1" nextAc="seek">
+              <p:cTn id="2" dur="indefinite" nodeType="mainSeq">
+                <p:childTnLst>
+                  <p:par>
+                    <p:cTn id="3" fill="hold">
+                      <p:stCondLst>
+                        <p:cond delay="indefinite"/>
+                      </p:stCondLst>
+                      <p:childTnLst>
+                        <p:par>
+                          <p:cTn id="4" fill="hold">
+                            <p:stCondLst>
+                              <p:cond delay="0"/>
+                            </p:stCondLst>
+                            <p:childTnLst>
+                              <p:par>
+                                <p:cTn id="5" presetID="16" presetClass="entr" presetSubtype="21" fill="hold" grpId="0" nodeType="clickEffect">
+                                  <p:stCondLst>
+                                    <p:cond delay="0"/>
+                                  </p:stCondLst>
+                                  <p:childTnLst>
+                                    <p:set>
+                                      <p:cBhvr>
+                                        <p:cTn id="6" dur="1" fill="hold">
+                                          <p:stCondLst>
+                                            <p:cond delay="0"/>
+                                          </p:stCondLst>
+                                        </p:cTn>
+                                        <p:tgtEl>
+                                          <p:spTgt spid="2"/>
+                                        </p:tgtEl>
+                                        <p:attrNameLst>
+                                          <p:attrName>style.visibility</p:attrName>
+                                        </p:attrNameLst>
+                                      </p:cBhvr>
+                                      <p:to>
+                                        <p:strVal val="visible"/>
+                                      </p:to>
+                                    </p:set>
+                                    <p:animEffect transition="in" filter="barn(inVertical)">
+                                      <p:cBhvr>
+                                        <p:cTn id="7" dur="500"/>
+                                        <p:tgtEl>
+                                          <p:spTgt spid="2"/>
+                                        </p:tgtEl>
+                                      </p:cBhvr>
+                                    </p:animEffect>
+                                  </p:childTnLst>
+                                </p:cTn>
+                              </p:par>
+                            </p:childTnLst>
+                          </p:cTn>
+                        </p:par>
+                      </p:childTnLst>
+                    </p:cTn>
+                  </p:par>
+                  <p:par>
+                    <p:cTn id="8" fill="hold">
+                      <p:stCondLst>
+                        <p:cond delay="indefinite"/>
+                      </p:stCondLst>
+                      <p:childTnLst>
+                        <p:par>
+                          <p:cTn id="9" fill="hold">
+                            <p:stCondLst>
+                              <p:cond delay="0"/>
+                            </p:stCondLst>
+                            <p:childTnLst>
+                              <p:par>
+                                <p:cTn id="10" presetID="10" presetClass="entr" presetSubtype="0" fill="hold" nodeType="clickEffect">
+                                  <p:stCondLst>
+                                    <p:cond delay="0"/>
+                                  </p:stCondLst>
+                                  <p:childTnLst>
+                                    <p:set>
+                                      <p:cBhvr>
+                                        <p:cTn id="11" dur="1" fill="hold">
+                                          <p:stCondLst>
+                                            <p:cond delay="0"/>
+                                          </p:stCondLst>
+                                        </p:cTn>
+                                        <p:tgtEl>
+                                          <p:spTgt spid="9"/>
+                                        </p:tgtEl>
+                                        <p:attrNameLst>
+                                          <p:attrName>style.visibility</p:attrName>
+                                        </p:attrNameLst>
+                                      </p:cBhvr>
+                                      <p:to>
+                                        <p:strVal val="visible"/>
+                                      </p:to>
+                                    </p:set>
+                                    <p:animEffect transition="in" filter="fade">
+                                      <p:cBhvr>
+                                        <p:cTn id="12" dur="500"/>
+                                        <p:tgtEl>
+                                          <p:spTgt spid="9"/>
+                                        </p:tgtEl>
+                                      </p:cBhvr>
+                                    </p:animEffect>
+                                  </p:childTnLst>
+                                </p:cTn>
+                              </p:par>
+                            </p:childTnLst>
+                          </p:cTn>
+                        </p:par>
+                      </p:childTnLst>
+                    </p:cTn>
+                  </p:par>
+                </p:childTnLst>
+              </p:cTn>
+              <p:prevCondLst>
+                <p:cond evt="onPrev" delay="0">
+                  <p:tgtEl>
+                    <p:sldTgt/>
+                  </p:tgtEl>
+                </p:cond>
+              </p:prevCondLst>
+              <p:nextCondLst>
+                <p:cond evt="onNext" delay="0">
+                  <p:tgtEl>
+                    <p:sldTgt/>
+                  </p:tgtEl>
+                </p:cond>
+              </p:nextCondLst>
+            </p:seq>
+          </p:childTnLst>
+        </p:cTn>
+      </p:par>
+    </p:tnLst>
+    <p:bldLst>
+      <p:bldP spid="2" grpId="0"/>
+    </p:bldLst>
+  </p:timing>
 </p:sld>
 </file>
 

</xml_diff>

<commit_message>
Update powerpoint - Mai Anh
</commit_message>
<xml_diff>
--- a/Project.pptx
+++ b/Project.pptx
@@ -8,22 +8,19 @@
     <p:sldId id="256" r:id="rId2"/>
     <p:sldId id="257" r:id="rId3"/>
     <p:sldId id="274" r:id="rId4"/>
-    <p:sldId id="275" r:id="rId5"/>
+    <p:sldId id="276" r:id="rId5"/>
     <p:sldId id="259" r:id="rId6"/>
     <p:sldId id="261" r:id="rId7"/>
-    <p:sldId id="271" r:id="rId8"/>
-    <p:sldId id="260" r:id="rId9"/>
-    <p:sldId id="262" r:id="rId10"/>
-    <p:sldId id="263" r:id="rId11"/>
-    <p:sldId id="264" r:id="rId12"/>
-    <p:sldId id="265" r:id="rId13"/>
-    <p:sldId id="266" r:id="rId14"/>
-    <p:sldId id="267" r:id="rId15"/>
-    <p:sldId id="268" r:id="rId16"/>
-    <p:sldId id="269" r:id="rId17"/>
-    <p:sldId id="270" r:id="rId18"/>
-    <p:sldId id="272" r:id="rId19"/>
-    <p:sldId id="273" r:id="rId20"/>
+    <p:sldId id="260" r:id="rId8"/>
+    <p:sldId id="263" r:id="rId9"/>
+    <p:sldId id="264" r:id="rId10"/>
+    <p:sldId id="266" r:id="rId11"/>
+    <p:sldId id="267" r:id="rId12"/>
+    <p:sldId id="268" r:id="rId13"/>
+    <p:sldId id="269" r:id="rId14"/>
+    <p:sldId id="270" r:id="rId15"/>
+    <p:sldId id="272" r:id="rId16"/>
+    <p:sldId id="273" r:id="rId17"/>
   </p:sldIdLst>
   <p:sldSz cx="12192000" cy="6858000"/>
   <p:notesSz cx="6858000" cy="9144000"/>
@@ -283,7 +280,7 @@
           <a:p>
             <a:fld id="{79C5A860-F335-4252-AA00-24FB67ED2982}" type="datetime1">
               <a:rPr lang="en-US" smtClean="0"/>
-              <a:t>4/21/2025</a:t>
+              <a:t>4/22/2025</a:t>
             </a:fld>
             <a:endParaRPr lang="en-US"/>
           </a:p>
@@ -482,7 +479,7 @@
           <a:p>
             <a:fld id="{46AB1048-0047-48CA-88BA-D69B470942CF}" type="datetime1">
               <a:rPr lang="en-US" smtClean="0"/>
-              <a:t>4/21/2025</a:t>
+              <a:t>4/22/2025</a:t>
             </a:fld>
             <a:endParaRPr lang="en-US"/>
           </a:p>
@@ -692,7 +689,7 @@
           <a:p>
             <a:fld id="{5BD83879-648C-49A9-81A2-0EF5946532D0}" type="datetime1">
               <a:rPr lang="en-US" smtClean="0"/>
-              <a:t>4/21/2025</a:t>
+              <a:t>4/22/2025</a:t>
             </a:fld>
             <a:endParaRPr lang="en-US"/>
           </a:p>
@@ -890,7 +887,7 @@
           <a:p>
             <a:fld id="{D04BC802-30E3-4658-9CCA-F873646FEC67}" type="datetime1">
               <a:rPr lang="en-US" smtClean="0"/>
-              <a:t>4/21/2025</a:t>
+              <a:t>4/22/2025</a:t>
             </a:fld>
             <a:endParaRPr lang="en-US"/>
           </a:p>
@@ -1168,7 +1165,7 @@
           <a:p>
             <a:fld id="{0AB227A3-19CE-4153-81CE-64EB7AB094B3}" type="datetime1">
               <a:rPr lang="en-US" smtClean="0"/>
-              <a:t>4/21/2025</a:t>
+              <a:t>4/22/2025</a:t>
             </a:fld>
             <a:endParaRPr lang="en-US"/>
           </a:p>
@@ -1435,7 +1432,7 @@
           <a:p>
             <a:fld id="{B819A100-10F6-477E-8847-29D479EF1C92}" type="datetime1">
               <a:rPr lang="en-US" smtClean="0"/>
-              <a:t>4/21/2025</a:t>
+              <a:t>4/22/2025</a:t>
             </a:fld>
             <a:endParaRPr lang="en-US"/>
           </a:p>
@@ -1849,7 +1846,7 @@
           <a:p>
             <a:fld id="{5DF128AB-198A-495F-8475-FDB360C9873F}" type="datetime1">
               <a:rPr lang="en-US" smtClean="0"/>
-              <a:t>4/21/2025</a:t>
+              <a:t>4/22/2025</a:t>
             </a:fld>
             <a:endParaRPr lang="en-US"/>
           </a:p>
@@ -1990,7 +1987,7 @@
           <a:p>
             <a:fld id="{021A235E-F8FD-479F-9FC7-18BE84110877}" type="datetime1">
               <a:rPr lang="en-US" smtClean="0"/>
-              <a:t>4/21/2025</a:t>
+              <a:t>4/22/2025</a:t>
             </a:fld>
             <a:endParaRPr lang="en-US"/>
           </a:p>
@@ -2103,7 +2100,7 @@
           <a:p>
             <a:fld id="{E890F09B-68DA-462E-9DB4-4C9ADAB8CBCC}" type="datetime1">
               <a:rPr lang="en-US" smtClean="0"/>
-              <a:t>4/21/2025</a:t>
+              <a:t>4/22/2025</a:t>
             </a:fld>
             <a:endParaRPr lang="en-US"/>
           </a:p>
@@ -2422,7 +2419,7 @@
           <a:p>
             <a:fld id="{17AC4E36-FABE-47EB-AA7F-C19A93824617}" type="datetime1">
               <a:rPr lang="en-US" smtClean="0"/>
-              <a:t>4/21/2025</a:t>
+              <a:t>4/22/2025</a:t>
             </a:fld>
             <a:endParaRPr lang="en-US"/>
           </a:p>
@@ -2719,7 +2716,7 @@
           <a:p>
             <a:fld id="{F199CE6B-5DE6-4A2D-B72E-5E8969F9F56F}" type="datetime1">
               <a:rPr lang="en-US" smtClean="0"/>
-              <a:t>4/21/2025</a:t>
+              <a:t>4/22/2025</a:t>
             </a:fld>
             <a:endParaRPr lang="en-US"/>
           </a:p>
@@ -3577,7 +3574,7 @@
           <a:p>
             <a:fld id="{F481A142-DA77-4A5F-AD1F-14E6C18F0F5F}" type="datetime1">
               <a:rPr lang="en-US" smtClean="0"/>
-              <a:t>4/21/2025</a:t>
+              <a:t>4/22/2025</a:t>
             </a:fld>
             <a:endParaRPr lang="en-US" dirty="0"/>
           </a:p>
@@ -4597,718 +4594,6 @@
           <p:cNvPr id="2" name="Title 1">
             <a:extLst>
               <a:ext uri="{FF2B5EF4-FFF2-40B4-BE49-F238E27FC236}">
-                <a16:creationId xmlns:a16="http://schemas.microsoft.com/office/drawing/2014/main" id="{44CF171D-2B56-4ED9-151A-7775F4853279}"/>
-              </a:ext>
-            </a:extLst>
-          </p:cNvPr>
-          <p:cNvSpPr>
-            <a:spLocks noGrp="1"/>
-          </p:cNvSpPr>
-          <p:nvPr>
-            <p:ph type="title"/>
-          </p:nvPr>
-        </p:nvSpPr>
-        <p:spPr>
-          <a:xfrm>
-            <a:off x="609600" y="173320"/>
-            <a:ext cx="10972800" cy="844989"/>
-          </a:xfrm>
-        </p:spPr>
-        <p:txBody>
-          <a:bodyPr/>
-          <a:lstStyle/>
-          <a:p>
-            <a:pPr algn="ctr"/>
-            <a:r>
-              <a:rPr lang="en-US" dirty="0"/>
-              <a:t>Peak Season Analysis (2019 vs 2020)</a:t>
-            </a:r>
-          </a:p>
-        </p:txBody>
-      </p:sp>
-      <p:grpSp>
-        <p:nvGrpSpPr>
-          <p:cNvPr id="28" name="Group 27">
-            <a:extLst>
-              <a:ext uri="{FF2B5EF4-FFF2-40B4-BE49-F238E27FC236}">
-                <a16:creationId xmlns:a16="http://schemas.microsoft.com/office/drawing/2014/main" id="{A4AA3BA3-9499-73CA-987F-E0911B2B66C0}"/>
-              </a:ext>
-            </a:extLst>
-          </p:cNvPr>
-          <p:cNvGrpSpPr/>
-          <p:nvPr/>
-        </p:nvGrpSpPr>
-        <p:grpSpPr>
-          <a:xfrm>
-            <a:off x="431440" y="1018309"/>
-            <a:ext cx="11495376" cy="5839691"/>
-            <a:chOff x="265185" y="928117"/>
-            <a:chExt cx="11495376" cy="5929883"/>
-          </a:xfrm>
-        </p:grpSpPr>
-        <p:pic>
-          <p:nvPicPr>
-            <p:cNvPr id="26" name="Picture 25">
-              <a:extLst>
-                <a:ext uri="{FF2B5EF4-FFF2-40B4-BE49-F238E27FC236}">
-                  <a16:creationId xmlns:a16="http://schemas.microsoft.com/office/drawing/2014/main" id="{DEBB884E-886A-074B-B9D5-796C5FEB7A45}"/>
-                </a:ext>
-              </a:extLst>
-            </p:cNvPr>
-            <p:cNvPicPr>
-              <a:picLocks noChangeAspect="1"/>
-            </p:cNvPicPr>
-            <p:nvPr/>
-          </p:nvPicPr>
-          <p:blipFill>
-            <a:blip r:embed="rId2"/>
-            <a:stretch>
-              <a:fillRect/>
-            </a:stretch>
-          </p:blipFill>
-          <p:spPr>
-            <a:xfrm>
-              <a:off x="265185" y="928117"/>
-              <a:ext cx="11495376" cy="5839691"/>
-            </a:xfrm>
-            <a:prstGeom prst="rect">
-              <a:avLst/>
-            </a:prstGeom>
-          </p:spPr>
-        </p:pic>
-        <p:pic>
-          <p:nvPicPr>
-            <p:cNvPr id="16" name="Picture 15">
-              <a:extLst>
-                <a:ext uri="{FF2B5EF4-FFF2-40B4-BE49-F238E27FC236}">
-                  <a16:creationId xmlns:a16="http://schemas.microsoft.com/office/drawing/2014/main" id="{8B344489-F898-A33F-CECF-C21735A8005B}"/>
-                </a:ext>
-              </a:extLst>
-            </p:cNvPr>
-            <p:cNvPicPr>
-              <a:picLocks noChangeAspect="1"/>
-            </p:cNvPicPr>
-            <p:nvPr/>
-          </p:nvPicPr>
-          <p:blipFill>
-            <a:blip r:embed="rId3"/>
-            <a:stretch>
-              <a:fillRect/>
-            </a:stretch>
-          </p:blipFill>
-          <p:spPr>
-            <a:xfrm>
-              <a:off x="6729846" y="5638938"/>
-              <a:ext cx="3143250" cy="1219062"/>
-            </a:xfrm>
-            <a:prstGeom prst="rect">
-              <a:avLst/>
-            </a:prstGeom>
-          </p:spPr>
-        </p:pic>
-      </p:grpSp>
-    </p:spTree>
-    <p:extLst>
-      <p:ext uri="{BB962C8B-B14F-4D97-AF65-F5344CB8AC3E}">
-        <p14:creationId xmlns:p14="http://schemas.microsoft.com/office/powerpoint/2010/main" val="3306896646"/>
-      </p:ext>
-    </p:extLst>
-  </p:cSld>
-  <p:clrMapOvr>
-    <a:masterClrMapping/>
-  </p:clrMapOvr>
-  <p:timing>
-    <p:tnLst>
-      <p:par>
-        <p:cTn id="1" dur="indefinite" restart="never" nodeType="tmRoot">
-          <p:childTnLst>
-            <p:seq concurrent="1" nextAc="seek">
-              <p:cTn id="2" dur="indefinite" nodeType="mainSeq">
-                <p:childTnLst>
-                  <p:par>
-                    <p:cTn id="3" fill="hold">
-                      <p:stCondLst>
-                        <p:cond delay="indefinite"/>
-                      </p:stCondLst>
-                      <p:childTnLst>
-                        <p:par>
-                          <p:cTn id="4" fill="hold">
-                            <p:stCondLst>
-                              <p:cond delay="0"/>
-                            </p:stCondLst>
-                            <p:childTnLst>
-                              <p:par>
-                                <p:cTn id="5" presetID="16" presetClass="entr" presetSubtype="21" fill="hold" grpId="0" nodeType="clickEffect">
-                                  <p:stCondLst>
-                                    <p:cond delay="0"/>
-                                  </p:stCondLst>
-                                  <p:childTnLst>
-                                    <p:set>
-                                      <p:cBhvr>
-                                        <p:cTn id="6" dur="1" fill="hold">
-                                          <p:stCondLst>
-                                            <p:cond delay="0"/>
-                                          </p:stCondLst>
-                                        </p:cTn>
-                                        <p:tgtEl>
-                                          <p:spTgt spid="2"/>
-                                        </p:tgtEl>
-                                        <p:attrNameLst>
-                                          <p:attrName>style.visibility</p:attrName>
-                                        </p:attrNameLst>
-                                      </p:cBhvr>
-                                      <p:to>
-                                        <p:strVal val="visible"/>
-                                      </p:to>
-                                    </p:set>
-                                    <p:animEffect transition="in" filter="barn(inVertical)">
-                                      <p:cBhvr>
-                                        <p:cTn id="7" dur="500"/>
-                                        <p:tgtEl>
-                                          <p:spTgt spid="2"/>
-                                        </p:tgtEl>
-                                      </p:cBhvr>
-                                    </p:animEffect>
-                                  </p:childTnLst>
-                                </p:cTn>
-                              </p:par>
-                            </p:childTnLst>
-                          </p:cTn>
-                        </p:par>
-                      </p:childTnLst>
-                    </p:cTn>
-                  </p:par>
-                  <p:par>
-                    <p:cTn id="8" fill="hold">
-                      <p:stCondLst>
-                        <p:cond delay="indefinite"/>
-                      </p:stCondLst>
-                      <p:childTnLst>
-                        <p:par>
-                          <p:cTn id="9" fill="hold">
-                            <p:stCondLst>
-                              <p:cond delay="0"/>
-                            </p:stCondLst>
-                            <p:childTnLst>
-                              <p:par>
-                                <p:cTn id="10" presetID="10" presetClass="entr" presetSubtype="0" fill="hold" nodeType="clickEffect">
-                                  <p:stCondLst>
-                                    <p:cond delay="0"/>
-                                  </p:stCondLst>
-                                  <p:childTnLst>
-                                    <p:set>
-                                      <p:cBhvr>
-                                        <p:cTn id="11" dur="1" fill="hold">
-                                          <p:stCondLst>
-                                            <p:cond delay="0"/>
-                                          </p:stCondLst>
-                                        </p:cTn>
-                                        <p:tgtEl>
-                                          <p:spTgt spid="28"/>
-                                        </p:tgtEl>
-                                        <p:attrNameLst>
-                                          <p:attrName>style.visibility</p:attrName>
-                                        </p:attrNameLst>
-                                      </p:cBhvr>
-                                      <p:to>
-                                        <p:strVal val="visible"/>
-                                      </p:to>
-                                    </p:set>
-                                    <p:animEffect transition="in" filter="fade">
-                                      <p:cBhvr>
-                                        <p:cTn id="12" dur="500"/>
-                                        <p:tgtEl>
-                                          <p:spTgt spid="28"/>
-                                        </p:tgtEl>
-                                      </p:cBhvr>
-                                    </p:animEffect>
-                                  </p:childTnLst>
-                                </p:cTn>
-                              </p:par>
-                            </p:childTnLst>
-                          </p:cTn>
-                        </p:par>
-                      </p:childTnLst>
-                    </p:cTn>
-                  </p:par>
-                </p:childTnLst>
-              </p:cTn>
-              <p:prevCondLst>
-                <p:cond evt="onPrev" delay="0">
-                  <p:tgtEl>
-                    <p:sldTgt/>
-                  </p:tgtEl>
-                </p:cond>
-              </p:prevCondLst>
-              <p:nextCondLst>
-                <p:cond evt="onNext" delay="0">
-                  <p:tgtEl>
-                    <p:sldTgt/>
-                  </p:tgtEl>
-                </p:cond>
-              </p:nextCondLst>
-            </p:seq>
-          </p:childTnLst>
-        </p:cTn>
-      </p:par>
-    </p:tnLst>
-    <p:bldLst>
-      <p:bldP spid="2" grpId="0"/>
-    </p:bldLst>
-  </p:timing>
-</p:sld>
-</file>
-
-<file path=ppt/slides/slide11.xml><?xml version="1.0" encoding="utf-8"?>
-<p:sld xmlns:a="http://schemas.openxmlformats.org/drawingml/2006/main" xmlns:r="http://schemas.openxmlformats.org/officeDocument/2006/relationships" xmlns:p="http://schemas.openxmlformats.org/presentationml/2006/main">
-  <p:cSld>
-    <p:spTree>
-      <p:nvGrpSpPr>
-        <p:cNvPr id="1" name=""/>
-        <p:cNvGrpSpPr/>
-        <p:nvPr/>
-      </p:nvGrpSpPr>
-      <p:grpSpPr>
-        <a:xfrm>
-          <a:off x="0" y="0"/>
-          <a:ext cx="0" cy="0"/>
-          <a:chOff x="0" y="0"/>
-          <a:chExt cx="0" cy="0"/>
-        </a:xfrm>
-      </p:grpSpPr>
-      <p:sp>
-        <p:nvSpPr>
-          <p:cNvPr id="2" name="Title 1">
-            <a:extLst>
-              <a:ext uri="{FF2B5EF4-FFF2-40B4-BE49-F238E27FC236}">
-                <a16:creationId xmlns:a16="http://schemas.microsoft.com/office/drawing/2014/main" id="{F588A945-E1A5-C740-0749-7206BB505B89}"/>
-              </a:ext>
-            </a:extLst>
-          </p:cNvPr>
-          <p:cNvSpPr>
-            <a:spLocks noGrp="1"/>
-          </p:cNvSpPr>
-          <p:nvPr>
-            <p:ph type="title"/>
-          </p:nvPr>
-        </p:nvSpPr>
-        <p:spPr>
-          <a:xfrm>
-            <a:off x="609600" y="557784"/>
-            <a:ext cx="10972800" cy="1094371"/>
-          </a:xfrm>
-        </p:spPr>
-        <p:txBody>
-          <a:bodyPr>
-            <a:normAutofit fontScale="90000"/>
-          </a:bodyPr>
-          <a:lstStyle/>
-          <a:p>
-            <a:r>
-              <a:rPr lang="en-US" dirty="0"/>
-              <a:t>Peak Season Analysis (Pre-COVID and COVID Observation Period )</a:t>
-            </a:r>
-          </a:p>
-        </p:txBody>
-      </p:sp>
-      <p:pic>
-        <p:nvPicPr>
-          <p:cNvPr id="5" name="Picture 4">
-            <a:extLst>
-              <a:ext uri="{FF2B5EF4-FFF2-40B4-BE49-F238E27FC236}">
-                <a16:creationId xmlns:a16="http://schemas.microsoft.com/office/drawing/2014/main" id="{0A3A4FBF-BF19-CEEA-5C3A-EC711C3957F2}"/>
-              </a:ext>
-            </a:extLst>
-          </p:cNvPr>
-          <p:cNvPicPr>
-            <a:picLocks noChangeAspect="1"/>
-          </p:cNvPicPr>
-          <p:nvPr/>
-        </p:nvPicPr>
-        <p:blipFill>
-          <a:blip r:embed="rId2"/>
-          <a:stretch>
-            <a:fillRect/>
-          </a:stretch>
-        </p:blipFill>
-        <p:spPr>
-          <a:xfrm>
-            <a:off x="249382" y="1652154"/>
-            <a:ext cx="11565082" cy="5205845"/>
-          </a:xfrm>
-          <a:prstGeom prst="rect">
-            <a:avLst/>
-          </a:prstGeom>
-        </p:spPr>
-      </p:pic>
-    </p:spTree>
-    <p:extLst>
-      <p:ext uri="{BB962C8B-B14F-4D97-AF65-F5344CB8AC3E}">
-        <p14:creationId xmlns:p14="http://schemas.microsoft.com/office/powerpoint/2010/main" val="524735799"/>
-      </p:ext>
-    </p:extLst>
-  </p:cSld>
-  <p:clrMapOvr>
-    <a:masterClrMapping/>
-  </p:clrMapOvr>
-  <p:timing>
-    <p:tnLst>
-      <p:par>
-        <p:cTn id="1" dur="indefinite" restart="never" nodeType="tmRoot">
-          <p:childTnLst>
-            <p:seq concurrent="1" nextAc="seek">
-              <p:cTn id="2" dur="indefinite" nodeType="mainSeq">
-                <p:childTnLst>
-                  <p:par>
-                    <p:cTn id="3" fill="hold">
-                      <p:stCondLst>
-                        <p:cond delay="indefinite"/>
-                      </p:stCondLst>
-                      <p:childTnLst>
-                        <p:par>
-                          <p:cTn id="4" fill="hold">
-                            <p:stCondLst>
-                              <p:cond delay="0"/>
-                            </p:stCondLst>
-                            <p:childTnLst>
-                              <p:par>
-                                <p:cTn id="5" presetID="16" presetClass="entr" presetSubtype="21" fill="hold" grpId="0" nodeType="clickEffect">
-                                  <p:stCondLst>
-                                    <p:cond delay="0"/>
-                                  </p:stCondLst>
-                                  <p:childTnLst>
-                                    <p:set>
-                                      <p:cBhvr>
-                                        <p:cTn id="6" dur="1" fill="hold">
-                                          <p:stCondLst>
-                                            <p:cond delay="0"/>
-                                          </p:stCondLst>
-                                        </p:cTn>
-                                        <p:tgtEl>
-                                          <p:spTgt spid="2"/>
-                                        </p:tgtEl>
-                                        <p:attrNameLst>
-                                          <p:attrName>style.visibility</p:attrName>
-                                        </p:attrNameLst>
-                                      </p:cBhvr>
-                                      <p:to>
-                                        <p:strVal val="visible"/>
-                                      </p:to>
-                                    </p:set>
-                                    <p:animEffect transition="in" filter="barn(inVertical)">
-                                      <p:cBhvr>
-                                        <p:cTn id="7" dur="500"/>
-                                        <p:tgtEl>
-                                          <p:spTgt spid="2"/>
-                                        </p:tgtEl>
-                                      </p:cBhvr>
-                                    </p:animEffect>
-                                  </p:childTnLst>
-                                </p:cTn>
-                              </p:par>
-                            </p:childTnLst>
-                          </p:cTn>
-                        </p:par>
-                      </p:childTnLst>
-                    </p:cTn>
-                  </p:par>
-                  <p:par>
-                    <p:cTn id="8" fill="hold">
-                      <p:stCondLst>
-                        <p:cond delay="indefinite"/>
-                      </p:stCondLst>
-                      <p:childTnLst>
-                        <p:par>
-                          <p:cTn id="9" fill="hold">
-                            <p:stCondLst>
-                              <p:cond delay="0"/>
-                            </p:stCondLst>
-                            <p:childTnLst>
-                              <p:par>
-                                <p:cTn id="10" presetID="10" presetClass="entr" presetSubtype="0" fill="hold" nodeType="clickEffect">
-                                  <p:stCondLst>
-                                    <p:cond delay="0"/>
-                                  </p:stCondLst>
-                                  <p:childTnLst>
-                                    <p:set>
-                                      <p:cBhvr>
-                                        <p:cTn id="11" dur="1" fill="hold">
-                                          <p:stCondLst>
-                                            <p:cond delay="0"/>
-                                          </p:stCondLst>
-                                        </p:cTn>
-                                        <p:tgtEl>
-                                          <p:spTgt spid="5"/>
-                                        </p:tgtEl>
-                                        <p:attrNameLst>
-                                          <p:attrName>style.visibility</p:attrName>
-                                        </p:attrNameLst>
-                                      </p:cBhvr>
-                                      <p:to>
-                                        <p:strVal val="visible"/>
-                                      </p:to>
-                                    </p:set>
-                                    <p:animEffect transition="in" filter="fade">
-                                      <p:cBhvr>
-                                        <p:cTn id="12" dur="500"/>
-                                        <p:tgtEl>
-                                          <p:spTgt spid="5"/>
-                                        </p:tgtEl>
-                                      </p:cBhvr>
-                                    </p:animEffect>
-                                  </p:childTnLst>
-                                </p:cTn>
-                              </p:par>
-                            </p:childTnLst>
-                          </p:cTn>
-                        </p:par>
-                      </p:childTnLst>
-                    </p:cTn>
-                  </p:par>
-                </p:childTnLst>
-              </p:cTn>
-              <p:prevCondLst>
-                <p:cond evt="onPrev" delay="0">
-                  <p:tgtEl>
-                    <p:sldTgt/>
-                  </p:tgtEl>
-                </p:cond>
-              </p:prevCondLst>
-              <p:nextCondLst>
-                <p:cond evt="onNext" delay="0">
-                  <p:tgtEl>
-                    <p:sldTgt/>
-                  </p:tgtEl>
-                </p:cond>
-              </p:nextCondLst>
-            </p:seq>
-          </p:childTnLst>
-        </p:cTn>
-      </p:par>
-    </p:tnLst>
-    <p:bldLst>
-      <p:bldP spid="2" grpId="0"/>
-    </p:bldLst>
-  </p:timing>
-</p:sld>
-</file>
-
-<file path=ppt/slides/slide12.xml><?xml version="1.0" encoding="utf-8"?>
-<p:sld xmlns:a="http://schemas.openxmlformats.org/drawingml/2006/main" xmlns:r="http://schemas.openxmlformats.org/officeDocument/2006/relationships" xmlns:p="http://schemas.openxmlformats.org/presentationml/2006/main">
-  <p:cSld>
-    <p:spTree>
-      <p:nvGrpSpPr>
-        <p:cNvPr id="1" name=""/>
-        <p:cNvGrpSpPr/>
-        <p:nvPr/>
-      </p:nvGrpSpPr>
-      <p:grpSpPr>
-        <a:xfrm>
-          <a:off x="0" y="0"/>
-          <a:ext cx="0" cy="0"/>
-          <a:chOff x="0" y="0"/>
-          <a:chExt cx="0" cy="0"/>
-        </a:xfrm>
-      </p:grpSpPr>
-      <p:sp>
-        <p:nvSpPr>
-          <p:cNvPr id="2" name="Title 1">
-            <a:extLst>
-              <a:ext uri="{FF2B5EF4-FFF2-40B4-BE49-F238E27FC236}">
-                <a16:creationId xmlns:a16="http://schemas.microsoft.com/office/drawing/2014/main" id="{F13E0346-52B1-DF36-E0FB-015BB0BC147A}"/>
-              </a:ext>
-            </a:extLst>
-          </p:cNvPr>
-          <p:cNvSpPr>
-            <a:spLocks noGrp="1"/>
-          </p:cNvSpPr>
-          <p:nvPr>
-            <p:ph type="title"/>
-          </p:nvPr>
-        </p:nvSpPr>
-        <p:spPr>
-          <a:xfrm>
-            <a:off x="609600" y="557784"/>
-            <a:ext cx="10972800" cy="751471"/>
-          </a:xfrm>
-        </p:spPr>
-        <p:txBody>
-          <a:bodyPr>
-            <a:normAutofit fontScale="90000"/>
-          </a:bodyPr>
-          <a:lstStyle/>
-          <a:p>
-            <a:r>
-              <a:rPr lang="en-US" dirty="0"/>
-              <a:t>Peak Season Analysis</a:t>
-            </a:r>
-          </a:p>
-        </p:txBody>
-      </p:sp>
-      <p:sp>
-        <p:nvSpPr>
-          <p:cNvPr id="3" name="Content Placeholder 2">
-            <a:extLst>
-              <a:ext uri="{FF2B5EF4-FFF2-40B4-BE49-F238E27FC236}">
-                <a16:creationId xmlns:a16="http://schemas.microsoft.com/office/drawing/2014/main" id="{6F3D3805-B2BD-A221-B15A-73FBC9F7103C}"/>
-              </a:ext>
-            </a:extLst>
-          </p:cNvPr>
-          <p:cNvSpPr>
-            <a:spLocks noGrp="1"/>
-          </p:cNvSpPr>
-          <p:nvPr>
-            <p:ph idx="1"/>
-          </p:nvPr>
-        </p:nvSpPr>
-        <p:spPr>
-          <a:xfrm>
-            <a:off x="609600" y="1846431"/>
-            <a:ext cx="10972800" cy="1146151"/>
-          </a:xfrm>
-        </p:spPr>
-        <p:txBody>
-          <a:bodyPr>
-            <a:normAutofit/>
-          </a:bodyPr>
-          <a:lstStyle/>
-          <a:p>
-            <a:r>
-              <a:rPr lang="en-US" sz="2400" b="1" dirty="0"/>
-              <a:t>→ COVID accelerated the e-commerce peak season, leading to a sharp increase in parcel demand</a:t>
-            </a:r>
-          </a:p>
-        </p:txBody>
-      </p:sp>
-    </p:spTree>
-    <p:extLst>
-      <p:ext uri="{BB962C8B-B14F-4D97-AF65-F5344CB8AC3E}">
-        <p14:creationId xmlns:p14="http://schemas.microsoft.com/office/powerpoint/2010/main" val="2801668312"/>
-      </p:ext>
-    </p:extLst>
-  </p:cSld>
-  <p:clrMapOvr>
-    <a:masterClrMapping/>
-  </p:clrMapOvr>
-  <p:timing>
-    <p:tnLst>
-      <p:par>
-        <p:cTn id="1" dur="indefinite" restart="never" nodeType="tmRoot">
-          <p:childTnLst>
-            <p:seq concurrent="1" nextAc="seek">
-              <p:cTn id="2" dur="indefinite" nodeType="mainSeq">
-                <p:childTnLst>
-                  <p:par>
-                    <p:cTn id="3" fill="hold">
-                      <p:stCondLst>
-                        <p:cond delay="indefinite"/>
-                      </p:stCondLst>
-                      <p:childTnLst>
-                        <p:par>
-                          <p:cTn id="4" fill="hold">
-                            <p:stCondLst>
-                              <p:cond delay="0"/>
-                            </p:stCondLst>
-                            <p:childTnLst>
-                              <p:par>
-                                <p:cTn id="5" presetID="14" presetClass="entr" presetSubtype="10" fill="hold" grpId="0" nodeType="clickEffect">
-                                  <p:stCondLst>
-                                    <p:cond delay="0"/>
-                                  </p:stCondLst>
-                                  <p:childTnLst>
-                                    <p:set>
-                                      <p:cBhvr>
-                                        <p:cTn id="6" dur="1" fill="hold">
-                                          <p:stCondLst>
-                                            <p:cond delay="0"/>
-                                          </p:stCondLst>
-                                        </p:cTn>
-                                        <p:tgtEl>
-                                          <p:spTgt spid="3">
-                                            <p:txEl>
-                                              <p:pRg st="0" end="0"/>
-                                            </p:txEl>
-                                          </p:spTgt>
-                                        </p:tgtEl>
-                                        <p:attrNameLst>
-                                          <p:attrName>style.visibility</p:attrName>
-                                        </p:attrNameLst>
-                                      </p:cBhvr>
-                                      <p:to>
-                                        <p:strVal val="visible"/>
-                                      </p:to>
-                                    </p:set>
-                                    <p:animEffect transition="in" filter="randombar(horizontal)">
-                                      <p:cBhvr>
-                                        <p:cTn id="7" dur="500"/>
-                                        <p:tgtEl>
-                                          <p:spTgt spid="3">
-                                            <p:txEl>
-                                              <p:pRg st="0" end="0"/>
-                                            </p:txEl>
-                                          </p:spTgt>
-                                        </p:tgtEl>
-                                      </p:cBhvr>
-                                    </p:animEffect>
-                                  </p:childTnLst>
-                                </p:cTn>
-                              </p:par>
-                            </p:childTnLst>
-                          </p:cTn>
-                        </p:par>
-                      </p:childTnLst>
-                    </p:cTn>
-                  </p:par>
-                </p:childTnLst>
-              </p:cTn>
-              <p:prevCondLst>
-                <p:cond evt="onPrev" delay="0">
-                  <p:tgtEl>
-                    <p:sldTgt/>
-                  </p:tgtEl>
-                </p:cond>
-              </p:prevCondLst>
-              <p:nextCondLst>
-                <p:cond evt="onNext" delay="0">
-                  <p:tgtEl>
-                    <p:sldTgt/>
-                  </p:tgtEl>
-                </p:cond>
-              </p:nextCondLst>
-            </p:seq>
-          </p:childTnLst>
-        </p:cTn>
-      </p:par>
-    </p:tnLst>
-    <p:bldLst>
-      <p:bldP spid="3" grpId="0" build="p"/>
-    </p:bldLst>
-  </p:timing>
-</p:sld>
-</file>
-
-<file path=ppt/slides/slide13.xml><?xml version="1.0" encoding="utf-8"?>
-<p:sld xmlns:a="http://schemas.openxmlformats.org/drawingml/2006/main" xmlns:r="http://schemas.openxmlformats.org/officeDocument/2006/relationships" xmlns:p="http://schemas.openxmlformats.org/presentationml/2006/main">
-  <p:cSld>
-    <p:spTree>
-      <p:nvGrpSpPr>
-        <p:cNvPr id="1" name=""/>
-        <p:cNvGrpSpPr/>
-        <p:nvPr/>
-      </p:nvGrpSpPr>
-      <p:grpSpPr>
-        <a:xfrm>
-          <a:off x="0" y="0"/>
-          <a:ext cx="0" cy="0"/>
-          <a:chOff x="0" y="0"/>
-          <a:chExt cx="0" cy="0"/>
-        </a:xfrm>
-      </p:grpSpPr>
-      <p:sp>
-        <p:nvSpPr>
-          <p:cNvPr id="2" name="Title 1">
-            <a:extLst>
-              <a:ext uri="{FF2B5EF4-FFF2-40B4-BE49-F238E27FC236}">
                 <a16:creationId xmlns:a16="http://schemas.microsoft.com/office/drawing/2014/main" id="{CFA92E39-2278-0B07-5AFB-136F530E6655}"/>
               </a:ext>
             </a:extLst>
@@ -5391,44 +4676,57 @@
         </p:blipFill>
         <p:spPr>
           <a:xfrm>
-            <a:off x="3168364" y="4615410"/>
-            <a:ext cx="2266950" cy="1666875"/>
+            <a:off x="1241240" y="4569796"/>
+            <a:ext cx="2878475" cy="2021364"/>
           </a:xfrm>
           <a:prstGeom prst="rect">
             <a:avLst/>
           </a:prstGeom>
         </p:spPr>
       </p:pic>
-      <p:pic>
-        <p:nvPicPr>
-          <p:cNvPr id="11" name="Picture 10">
+      <p:sp>
+        <p:nvSpPr>
+          <p:cNvPr id="4" name="TextBox 3">
             <a:extLst>
               <a:ext uri="{FF2B5EF4-FFF2-40B4-BE49-F238E27FC236}">
-                <a16:creationId xmlns:a16="http://schemas.microsoft.com/office/drawing/2014/main" id="{0C841849-57CF-C170-32A3-ACE16979BF68}"/>
+                <a16:creationId xmlns:a16="http://schemas.microsoft.com/office/drawing/2014/main" id="{1C57AC5F-55B5-6493-7314-8736EB61531E}"/>
               </a:ext>
             </a:extLst>
           </p:cNvPr>
-          <p:cNvPicPr>
-            <a:picLocks noChangeAspect="1"/>
-          </p:cNvPicPr>
+          <p:cNvSpPr txBox="1"/>
           <p:nvPr/>
-        </p:nvPicPr>
-        <p:blipFill>
-          <a:blip r:embed="rId4"/>
-          <a:stretch>
-            <a:fillRect/>
-          </a:stretch>
-        </p:blipFill>
+        </p:nvSpPr>
         <p:spPr>
           <a:xfrm>
-            <a:off x="5997719" y="4615410"/>
-            <a:ext cx="2981325" cy="1828800"/>
+            <a:off x="5024287" y="4980313"/>
+            <a:ext cx="6096000" cy="1200329"/>
           </a:xfrm>
           <a:prstGeom prst="rect">
             <a:avLst/>
           </a:prstGeom>
+          <a:noFill/>
         </p:spPr>
-      </p:pic>
+        <p:txBody>
+          <a:bodyPr wrap="square">
+            <a:spAutoFit/>
+          </a:bodyPr>
+          <a:lstStyle/>
+          <a:p>
+            <a:r>
+              <a:rPr lang="en-US" dirty="0"/>
+              <a:t>From 2019 to 2020, there was a </a:t>
+            </a:r>
+            <a:r>
+              <a:rPr lang="en-US" b="1" dirty="0"/>
+              <a:t>noticeable shift in customer size</a:t>
+            </a:r>
+            <a:r>
+              <a:rPr lang="en-US" dirty="0"/>
+              <a:t>: the Small segment declined while Medium and Large segments grew, indicating customer upgrades and a diversification in the client base</a:t>
+            </a:r>
+          </a:p>
+        </p:txBody>
+      </p:sp>
     </p:spTree>
     <p:extLst>
       <p:ext uri="{BB962C8B-B14F-4D97-AF65-F5344CB8AC3E}">
@@ -5600,41 +4898,6 @@
                                   </p:childTnLst>
                                 </p:cTn>
                               </p:par>
-                              <p:par>
-                                <p:cTn id="18" presetID="10" presetClass="entr" presetSubtype="0" fill="hold" nodeType="withEffect">
-                                  <p:stCondLst>
-                                    <p:cond delay="0"/>
-                                  </p:stCondLst>
-                                  <p:childTnLst>
-                                    <p:set>
-                                      <p:cBhvr>
-                                        <p:cTn id="19" dur="1" fill="hold">
-                                          <p:stCondLst>
-                                            <p:cond delay="0"/>
-                                          </p:stCondLst>
-                                        </p:cTn>
-                                        <p:tgtEl>
-                                          <p:spTgt spid="11"/>
-                                        </p:tgtEl>
-                                        <p:attrNameLst>
-                                          <p:attrName>style.visibility</p:attrName>
-                                        </p:attrNameLst>
-                                      </p:cBhvr>
-                                      <p:to>
-                                        <p:strVal val="visible"/>
-                                      </p:to>
-                                    </p:set>
-                                    <p:animEffect transition="in" filter="fade">
-                                      <p:cBhvr>
-                                        <p:cTn id="20" dur="500"/>
-                                        <p:tgtEl>
-                                          <p:spTgt spid="11"/>
-                                        </p:tgtEl>
-                                      </p:cBhvr>
-                                    </p:animEffect>
-                                  </p:childTnLst>
-                                </p:cTn>
-                              </p:par>
                             </p:childTnLst>
                           </p:cTn>
                         </p:par>
@@ -5669,7 +4932,7 @@
 </p:sld>
 </file>
 
-<file path=ppt/slides/slide14.xml><?xml version="1.0" encoding="utf-8"?>
+<file path=ppt/slides/slide11.xml><?xml version="1.0" encoding="utf-8"?>
 <p:sld xmlns:a="http://schemas.openxmlformats.org/drawingml/2006/main" xmlns:r="http://schemas.openxmlformats.org/officeDocument/2006/relationships" xmlns:p="http://schemas.openxmlformats.org/presentationml/2006/main">
   <p:cSld>
     <p:spTree>
@@ -5781,6 +5044,57 @@
           </a:prstGeom>
         </p:spPr>
       </p:pic>
+      <p:sp>
+        <p:nvSpPr>
+          <p:cNvPr id="4" name="TextBox 3">
+            <a:extLst>
+              <a:ext uri="{FF2B5EF4-FFF2-40B4-BE49-F238E27FC236}">
+                <a16:creationId xmlns:a16="http://schemas.microsoft.com/office/drawing/2014/main" id="{F0E6C0E6-0363-9D50-D5A5-26B419C701A7}"/>
+              </a:ext>
+            </a:extLst>
+          </p:cNvPr>
+          <p:cNvSpPr txBox="1"/>
+          <p:nvPr/>
+        </p:nvSpPr>
+        <p:spPr>
+          <a:xfrm>
+            <a:off x="3195331" y="5049507"/>
+            <a:ext cx="6096000" cy="1200329"/>
+          </a:xfrm>
+          <a:prstGeom prst="rect">
+            <a:avLst/>
+          </a:prstGeom>
+          <a:noFill/>
+        </p:spPr>
+        <p:txBody>
+          <a:bodyPr wrap="square">
+            <a:spAutoFit/>
+          </a:bodyPr>
+          <a:lstStyle/>
+          <a:p>
+            <a:r>
+              <a:rPr lang="en-US" dirty="0"/>
+              <a:t>Nearly </a:t>
+            </a:r>
+            <a:r>
+              <a:rPr lang="en-US" b="1" dirty="0"/>
+              <a:t>60% of customers were in decline</a:t>
+            </a:r>
+            <a:r>
+              <a:rPr lang="en-US" dirty="0"/>
+              <a:t>, with the </a:t>
+            </a:r>
+            <a:r>
+              <a:rPr lang="en-US" b="1" dirty="0"/>
+              <a:t>Small segment accounting for the highest drop-off</a:t>
+            </a:r>
+            <a:r>
+              <a:rPr lang="en-US" dirty="0"/>
+              <a:t>. This suggests retention challenges and emphasizes the need to focus on sustaining growth and reducing churn</a:t>
+            </a:r>
+          </a:p>
+        </p:txBody>
+      </p:sp>
     </p:spTree>
     <p:extLst>
       <p:ext uri="{BB962C8B-B14F-4D97-AF65-F5344CB8AC3E}">
@@ -5930,7 +5244,7 @@
 </p:sld>
 </file>
 
-<file path=ppt/slides/slide15.xml><?xml version="1.0" encoding="utf-8"?>
+<file path=ppt/slides/slide12.xml><?xml version="1.0" encoding="utf-8"?>
 <p:sld xmlns:a="http://schemas.openxmlformats.org/drawingml/2006/main" xmlns:r="http://schemas.openxmlformats.org/officeDocument/2006/relationships" xmlns:p="http://schemas.openxmlformats.org/presentationml/2006/main">
   <p:cSld>
     <p:spTree>
@@ -6538,7 +5852,7 @@
 </p:sld>
 </file>
 
-<file path=ppt/slides/slide16.xml><?xml version="1.0" encoding="utf-8"?>
+<file path=ppt/slides/slide13.xml><?xml version="1.0" encoding="utf-8"?>
 <p:sld xmlns:a="http://schemas.openxmlformats.org/drawingml/2006/main" xmlns:r="http://schemas.openxmlformats.org/officeDocument/2006/relationships" xmlns:p="http://schemas.openxmlformats.org/presentationml/2006/main">
   <p:cSld>
     <p:spTree>
@@ -6772,7 +6086,7 @@
 </p:sld>
 </file>
 
-<file path=ppt/slides/slide17.xml><?xml version="1.0" encoding="utf-8"?>
+<file path=ppt/slides/slide14.xml><?xml version="1.0" encoding="utf-8"?>
 <p:sld xmlns:a="http://schemas.openxmlformats.org/drawingml/2006/main" xmlns:r="http://schemas.openxmlformats.org/officeDocument/2006/relationships" xmlns:p="http://schemas.openxmlformats.org/presentationml/2006/main">
   <p:cSld>
     <p:spTree>
@@ -7931,7 +7245,7 @@
 </p:sld>
 </file>
 
-<file path=ppt/slides/slide18.xml><?xml version="1.0" encoding="utf-8"?>
+<file path=ppt/slides/slide15.xml><?xml version="1.0" encoding="utf-8"?>
 <p:sld xmlns:a="http://schemas.openxmlformats.org/drawingml/2006/main" xmlns:r="http://schemas.openxmlformats.org/officeDocument/2006/relationships" xmlns:p="http://schemas.openxmlformats.org/presentationml/2006/main">
   <p:cSld>
     <p:spTree>
@@ -8317,7 +7631,7 @@
 </p:sld>
 </file>
 
-<file path=ppt/slides/slide19.xml><?xml version="1.0" encoding="utf-8"?>
+<file path=ppt/slides/slide16.xml><?xml version="1.0" encoding="utf-8"?>
 <p:sld xmlns:a="http://schemas.openxmlformats.org/drawingml/2006/main" xmlns:r="http://schemas.openxmlformats.org/officeDocument/2006/relationships" xmlns:p="http://schemas.openxmlformats.org/presentationml/2006/main">
   <p:cSld>
     <p:bg>
@@ -9271,31 +8585,6 @@
             </a:r>
           </a:p>
           <a:p>
-            <a:r>
-              <a:rPr lang="en-US" dirty="0"/>
-              <a:t>- </a:t>
-            </a:r>
-            <a:r>
-              <a:rPr lang="en-US" b="1" dirty="0"/>
-              <a:t>Tools</a:t>
-            </a:r>
-            <a:r>
-              <a:rPr lang="en-US" dirty="0"/>
-              <a:t>: </a:t>
-            </a:r>
-            <a:r>
-              <a:rPr lang="en-US" dirty="0" err="1"/>
-              <a:t>Jupyter</a:t>
-            </a:r>
-            <a:r>
-              <a:rPr lang="en-US" dirty="0"/>
-              <a:t> Notebook, Power BI, Excel</a:t>
-            </a:r>
-          </a:p>
-          <a:p>
-            <a:endParaRPr lang="en-US" dirty="0"/>
-          </a:p>
-          <a:p>
             <a:endParaRPr lang="en-US" dirty="0"/>
           </a:p>
         </p:txBody>
@@ -9745,49 +9034,6 @@
                                   </p:childTnLst>
                                 </p:cTn>
                               </p:par>
-                              <p:par>
-                                <p:cTn id="36" presetID="10" presetClass="entr" presetSubtype="0" fill="hold" nodeType="withEffect">
-                                  <p:stCondLst>
-                                    <p:cond delay="0"/>
-                                  </p:stCondLst>
-                                  <p:childTnLst>
-                                    <p:set>
-                                      <p:cBhvr>
-                                        <p:cTn id="37" dur="1" fill="hold">
-                                          <p:stCondLst>
-                                            <p:cond delay="0"/>
-                                          </p:stCondLst>
-                                        </p:cTn>
-                                        <p:tgtEl>
-                                          <p:spTgt spid="3">
-                                            <p:txEl>
-                                              <p:pRg st="9" end="9"/>
-                                            </p:txEl>
-                                          </p:spTgt>
-                                        </p:tgtEl>
-                                        <p:attrNameLst>
-                                          <p:attrName>style.visibility</p:attrName>
-                                        </p:attrNameLst>
-                                      </p:cBhvr>
-                                      <p:to>
-                                        <p:strVal val="visible"/>
-                                      </p:to>
-                                    </p:set>
-                                    <p:animEffect transition="in" filter="fade">
-                                      <p:cBhvr>
-                                        <p:cTn id="38" dur="500"/>
-                                        <p:tgtEl>
-                                          <p:spTgt spid="3">
-                                            <p:txEl>
-                                              <p:pRg st="9" end="9"/>
-                                            </p:txEl>
-                                          </p:spTgt>
-                                        </p:tgtEl>
-                                      </p:cBhvr>
-                                    </p:animEffect>
-                                  </p:childTnLst>
-                                </p:cTn>
-                              </p:par>
                             </p:childTnLst>
                           </p:cTn>
                         </p:par>
@@ -9876,10 +9122,10 @@
       </p:sp>
       <p:pic>
         <p:nvPicPr>
-          <p:cNvPr id="7" name="Picture 6">
+          <p:cNvPr id="4" name="Picture 3">
             <a:extLst>
               <a:ext uri="{FF2B5EF4-FFF2-40B4-BE49-F238E27FC236}">
-                <a16:creationId xmlns:a16="http://schemas.microsoft.com/office/drawing/2014/main" id="{7BBFC01E-84F6-F02F-00AE-3989096AF6B0}"/>
+                <a16:creationId xmlns:a16="http://schemas.microsoft.com/office/drawing/2014/main" id="{9F7BCD0D-CFCB-9DE2-3707-5F4074BEB5A1}"/>
               </a:ext>
             </a:extLst>
           </p:cNvPr>
@@ -9896,8 +9142,38 @@
         </p:blipFill>
         <p:spPr>
           <a:xfrm>
-            <a:off x="753627" y="1130709"/>
-            <a:ext cx="10619224" cy="5651928"/>
+            <a:off x="793820" y="1130710"/>
+            <a:ext cx="10850492" cy="4647092"/>
+          </a:xfrm>
+          <a:prstGeom prst="rect">
+            <a:avLst/>
+          </a:prstGeom>
+        </p:spPr>
+      </p:pic>
+      <p:pic>
+        <p:nvPicPr>
+          <p:cNvPr id="6" name="Picture 5">
+            <a:extLst>
+              <a:ext uri="{FF2B5EF4-FFF2-40B4-BE49-F238E27FC236}">
+                <a16:creationId xmlns:a16="http://schemas.microsoft.com/office/drawing/2014/main" id="{912452BE-D400-27B2-847F-DDB5F4554D82}"/>
+              </a:ext>
+            </a:extLst>
+          </p:cNvPr>
+          <p:cNvPicPr>
+            <a:picLocks noChangeAspect="1"/>
+          </p:cNvPicPr>
+          <p:nvPr/>
+        </p:nvPicPr>
+        <p:blipFill>
+          <a:blip r:embed="rId3"/>
+          <a:stretch>
+            <a:fillRect/>
+          </a:stretch>
+        </p:blipFill>
+        <p:spPr>
+          <a:xfrm>
+            <a:off x="2705675" y="5760144"/>
+            <a:ext cx="6619875" cy="838200"/>
           </a:xfrm>
           <a:prstGeom prst="rect">
             <a:avLst/>
@@ -10001,7 +9277,7 @@
                                           </p:stCondLst>
                                         </p:cTn>
                                         <p:tgtEl>
-                                          <p:spTgt spid="7"/>
+                                          <p:spTgt spid="4"/>
                                         </p:tgtEl>
                                         <p:attrNameLst>
                                           <p:attrName>style.visibility</p:attrName>
@@ -10015,7 +9291,42 @@
                                       <p:cBhvr>
                                         <p:cTn id="12" dur="500"/>
                                         <p:tgtEl>
-                                          <p:spTgt spid="7"/>
+                                          <p:spTgt spid="4"/>
+                                        </p:tgtEl>
+                                      </p:cBhvr>
+                                    </p:animEffect>
+                                  </p:childTnLst>
+                                </p:cTn>
+                              </p:par>
+                              <p:par>
+                                <p:cTn id="13" presetID="10" presetClass="entr" presetSubtype="0" fill="hold" nodeType="withEffect">
+                                  <p:stCondLst>
+                                    <p:cond delay="0"/>
+                                  </p:stCondLst>
+                                  <p:childTnLst>
+                                    <p:set>
+                                      <p:cBhvr>
+                                        <p:cTn id="14" dur="1" fill="hold">
+                                          <p:stCondLst>
+                                            <p:cond delay="0"/>
+                                          </p:stCondLst>
+                                        </p:cTn>
+                                        <p:tgtEl>
+                                          <p:spTgt spid="6"/>
+                                        </p:tgtEl>
+                                        <p:attrNameLst>
+                                          <p:attrName>style.visibility</p:attrName>
+                                        </p:attrNameLst>
+                                      </p:cBhvr>
+                                      <p:to>
+                                        <p:strVal val="visible"/>
+                                      </p:to>
+                                    </p:set>
+                                    <p:animEffect transition="in" filter="fade">
+                                      <p:cBhvr>
+                                        <p:cTn id="15" dur="500"/>
+                                        <p:tgtEl>
+                                          <p:spTgt spid="6"/>
                                         </p:tgtEl>
                                       </p:cBhvr>
                                     </p:animEffect>
@@ -10064,7 +9375,7 @@
         <p:cNvPr id="1" name="">
           <a:extLst>
             <a:ext uri="{FF2B5EF4-FFF2-40B4-BE49-F238E27FC236}">
-              <a16:creationId xmlns:a16="http://schemas.microsoft.com/office/drawing/2014/main" id="{1962DAA4-FCBA-B58A-535F-73E92EE86F71}"/>
+              <a16:creationId xmlns:a16="http://schemas.microsoft.com/office/drawing/2014/main" id="{6B7B88A9-E0B3-CB4E-802C-004185783186}"/>
             </a:ext>
           </a:extLst>
         </p:cNvPr>
@@ -10084,7 +9395,7 @@
           <p:cNvPr id="2" name="Title 1">
             <a:extLst>
               <a:ext uri="{FF2B5EF4-FFF2-40B4-BE49-F238E27FC236}">
-                <a16:creationId xmlns:a16="http://schemas.microsoft.com/office/drawing/2014/main" id="{0E7D0B1F-17CE-7200-0B25-DF3163CD9264}"/>
+                <a16:creationId xmlns:a16="http://schemas.microsoft.com/office/drawing/2014/main" id="{92C70E87-802F-9950-A7BC-B848ABC295DF}"/>
               </a:ext>
             </a:extLst>
           </p:cNvPr>
@@ -10097,19 +9408,19 @@
         </p:nvSpPr>
         <p:spPr>
           <a:xfrm>
-            <a:off x="609600" y="292313"/>
-            <a:ext cx="10972800" cy="838397"/>
+            <a:off x="542925" y="282265"/>
+            <a:ext cx="10972800" cy="612039"/>
           </a:xfrm>
         </p:spPr>
         <p:txBody>
           <a:bodyPr>
-            <a:normAutofit/>
+            <a:noAutofit/>
           </a:bodyPr>
           <a:lstStyle/>
           <a:p>
             <a:r>
-              <a:rPr lang="en-US" dirty="0"/>
-              <a:t>Business Overview</a:t>
+              <a:rPr lang="en-US" sz="3200" dirty="0"/>
+              <a:t>Impact before and after COVID-19 Declaration</a:t>
             </a:r>
           </a:p>
         </p:txBody>
@@ -10119,7 +9430,7 @@
           <p:cNvPr id="4" name="Picture 3">
             <a:extLst>
               <a:ext uri="{FF2B5EF4-FFF2-40B4-BE49-F238E27FC236}">
-                <a16:creationId xmlns:a16="http://schemas.microsoft.com/office/drawing/2014/main" id="{88D2E00C-7116-AFE7-78F7-8EC5EEAB2B20}"/>
+                <a16:creationId xmlns:a16="http://schemas.microsoft.com/office/drawing/2014/main" id="{4764D5B6-900A-37BE-A7F4-00BE3612B281}"/>
               </a:ext>
             </a:extLst>
           </p:cNvPr>
@@ -10136,8 +9447,8 @@
         </p:blipFill>
         <p:spPr>
           <a:xfrm>
-            <a:off x="795337" y="1130710"/>
-            <a:ext cx="10601325" cy="5727290"/>
+            <a:off x="542925" y="1034980"/>
+            <a:ext cx="10972800" cy="5697416"/>
           </a:xfrm>
           <a:prstGeom prst="rect">
             <a:avLst/>
@@ -10147,7 +9458,7 @@
     </p:spTree>
     <p:extLst>
       <p:ext uri="{BB962C8B-B14F-4D97-AF65-F5344CB8AC3E}">
-        <p14:creationId xmlns:p14="http://schemas.microsoft.com/office/powerpoint/2010/main" val="522449260"/>
+        <p14:creationId xmlns:p14="http://schemas.microsoft.com/office/powerpoint/2010/main" val="2386536973"/>
       </p:ext>
     </p:extLst>
   </p:cSld>
@@ -10849,7 +10160,7 @@
           <p:cNvPr id="2" name="Title 1">
             <a:extLst>
               <a:ext uri="{FF2B5EF4-FFF2-40B4-BE49-F238E27FC236}">
-                <a16:creationId xmlns:a16="http://schemas.microsoft.com/office/drawing/2014/main" id="{5E36E97A-30BA-0727-9682-955D7A348CEC}"/>
+                <a16:creationId xmlns:a16="http://schemas.microsoft.com/office/drawing/2014/main" id="{D90915F6-596C-17A4-8A35-CE84DFC63CB3}"/>
               </a:ext>
             </a:extLst>
           </p:cNvPr>
@@ -10863,11 +10174,13 @@
         <p:spPr>
           <a:xfrm>
             <a:off x="609600" y="557784"/>
-            <a:ext cx="10972800" cy="779403"/>
+            <a:ext cx="10972800" cy="761861"/>
           </a:xfrm>
         </p:spPr>
         <p:txBody>
-          <a:bodyPr/>
+          <a:bodyPr>
+            <a:noAutofit/>
+          </a:bodyPr>
           <a:lstStyle/>
           <a:p>
             <a:r>
@@ -10877,12 +10190,837 @@
           </a:p>
         </p:txBody>
       </p:sp>
+      <p:graphicFrame>
+        <p:nvGraphicFramePr>
+          <p:cNvPr id="9" name="Table 8">
+            <a:extLst>
+              <a:ext uri="{FF2B5EF4-FFF2-40B4-BE49-F238E27FC236}">
+                <a16:creationId xmlns:a16="http://schemas.microsoft.com/office/drawing/2014/main" id="{6FD19C98-96D1-56A4-31EE-D7AC73591A56}"/>
+              </a:ext>
+            </a:extLst>
+          </p:cNvPr>
+          <p:cNvGraphicFramePr>
+            <a:graphicFrameLocks noGrp="1"/>
+          </p:cNvGraphicFramePr>
+          <p:nvPr>
+            <p:extLst>
+              <p:ext uri="{D42A27DB-BD31-4B8C-83A1-F6EECF244321}">
+                <p14:modId xmlns:p14="http://schemas.microsoft.com/office/powerpoint/2010/main" val="776228562"/>
+              </p:ext>
+            </p:extLst>
+          </p:nvPr>
+        </p:nvGraphicFramePr>
+        <p:xfrm>
+          <a:off x="6941575" y="1450722"/>
+          <a:ext cx="4532670" cy="2323730"/>
+        </p:xfrm>
+        <a:graphic>
+          <a:graphicData uri="http://schemas.openxmlformats.org/drawingml/2006/table">
+            <a:tbl>
+              <a:tblPr firstRow="1" bandRow="1">
+                <a:tableStyleId>{9D7B26C5-4107-4FEC-AEDC-1716B250A1EF}</a:tableStyleId>
+              </a:tblPr>
+              <a:tblGrid>
+                <a:gridCol w="784435">
+                  <a:extLst>
+                    <a:ext uri="{9D8B030D-6E8A-4147-A177-3AD203B41FA5}">
+                      <a16:colId xmlns:a16="http://schemas.microsoft.com/office/drawing/2014/main" val="584425468"/>
+                    </a:ext>
+                  </a:extLst>
+                </a:gridCol>
+                <a:gridCol w="1288026">
+                  <a:extLst>
+                    <a:ext uri="{9D8B030D-6E8A-4147-A177-3AD203B41FA5}">
+                      <a16:colId xmlns:a16="http://schemas.microsoft.com/office/drawing/2014/main" val="3899221002"/>
+                    </a:ext>
+                  </a:extLst>
+                </a:gridCol>
+                <a:gridCol w="581717">
+                  <a:extLst>
+                    <a:ext uri="{9D8B030D-6E8A-4147-A177-3AD203B41FA5}">
+                      <a16:colId xmlns:a16="http://schemas.microsoft.com/office/drawing/2014/main" val="2768743516"/>
+                    </a:ext>
+                  </a:extLst>
+                </a:gridCol>
+                <a:gridCol w="696476">
+                  <a:extLst>
+                    <a:ext uri="{9D8B030D-6E8A-4147-A177-3AD203B41FA5}">
+                      <a16:colId xmlns:a16="http://schemas.microsoft.com/office/drawing/2014/main" val="3777036179"/>
+                    </a:ext>
+                  </a:extLst>
+                </a:gridCol>
+                <a:gridCol w="678425">
+                  <a:extLst>
+                    <a:ext uri="{9D8B030D-6E8A-4147-A177-3AD203B41FA5}">
+                      <a16:colId xmlns:a16="http://schemas.microsoft.com/office/drawing/2014/main" val="1452522966"/>
+                    </a:ext>
+                  </a:extLst>
+                </a:gridCol>
+                <a:gridCol w="503591">
+                  <a:extLst>
+                    <a:ext uri="{9D8B030D-6E8A-4147-A177-3AD203B41FA5}">
+                      <a16:colId xmlns:a16="http://schemas.microsoft.com/office/drawing/2014/main" val="3053037997"/>
+                    </a:ext>
+                  </a:extLst>
+                </a:gridCol>
+              </a:tblGrid>
+              <a:tr h="417408">
+                <a:tc>
+                  <a:txBody>
+                    <a:bodyPr/>
+                    <a:lstStyle/>
+                    <a:p>
+                      <a:r>
+                        <a:rPr lang="en-US" sz="1050" dirty="0"/>
+                        <a:t>Legend</a:t>
+                      </a:r>
+                    </a:p>
+                  </a:txBody>
+                  <a:tcPr/>
+                </a:tc>
+                <a:tc>
+                  <a:txBody>
+                    <a:bodyPr/>
+                    <a:lstStyle/>
+                    <a:p>
+                      <a:r>
+                        <a:rPr lang="en-US" sz="1050" dirty="0"/>
+                        <a:t>Event Label</a:t>
+                      </a:r>
+                    </a:p>
+                  </a:txBody>
+                  <a:tcPr/>
+                </a:tc>
+                <a:tc>
+                  <a:txBody>
+                    <a:bodyPr/>
+                    <a:lstStyle/>
+                    <a:p>
+                      <a:r>
+                        <a:rPr lang="en-US" sz="1050" dirty="0"/>
+                        <a:t>Year</a:t>
+                      </a:r>
+                    </a:p>
+                  </a:txBody>
+                  <a:tcPr/>
+                </a:tc>
+                <a:tc>
+                  <a:txBody>
+                    <a:bodyPr/>
+                    <a:lstStyle/>
+                    <a:p>
+                      <a:r>
+                        <a:rPr lang="en-US" sz="1050" dirty="0"/>
+                        <a:t>Month</a:t>
+                      </a:r>
+                    </a:p>
+                  </a:txBody>
+                  <a:tcPr/>
+                </a:tc>
+                <a:tc>
+                  <a:txBody>
+                    <a:bodyPr/>
+                    <a:lstStyle/>
+                    <a:p>
+                      <a:r>
+                        <a:rPr lang="en-US" sz="1050" dirty="0"/>
+                        <a:t>Week </a:t>
+                      </a:r>
+                    </a:p>
+                  </a:txBody>
+                  <a:tcPr/>
+                </a:tc>
+                <a:tc>
+                  <a:txBody>
+                    <a:bodyPr/>
+                    <a:lstStyle/>
+                    <a:p>
+                      <a:r>
+                        <a:rPr lang="en-US" sz="1050" dirty="0"/>
+                        <a:t>Day</a:t>
+                      </a:r>
+                    </a:p>
+                  </a:txBody>
+                  <a:tcPr/>
+                </a:tc>
+                <a:extLst>
+                  <a:ext uri="{0D108BD9-81ED-4DB2-BD59-A6C34878D82A}">
+                    <a16:rowId xmlns:a16="http://schemas.microsoft.com/office/drawing/2014/main" val="2458835153"/>
+                  </a:ext>
+                </a:extLst>
+              </a:tr>
+              <a:tr h="484805">
+                <a:tc>
+                  <a:txBody>
+                    <a:bodyPr/>
+                    <a:lstStyle/>
+                    <a:p>
+                      <a:endParaRPr lang="en-US" sz="1050" dirty="0"/>
+                    </a:p>
+                  </a:txBody>
+                  <a:tcPr/>
+                </a:tc>
+                <a:tc>
+                  <a:txBody>
+                    <a:bodyPr/>
+                    <a:lstStyle/>
+                    <a:p>
+                      <a:r>
+                        <a:rPr lang="en-US" sz="1050" dirty="0"/>
+                        <a:t>Pandemic Declared</a:t>
+                      </a:r>
+                    </a:p>
+                  </a:txBody>
+                  <a:tcPr/>
+                </a:tc>
+                <a:tc>
+                  <a:txBody>
+                    <a:bodyPr/>
+                    <a:lstStyle/>
+                    <a:p>
+                      <a:r>
+                        <a:rPr lang="en-US" sz="1050" dirty="0"/>
+                        <a:t>2020</a:t>
+                      </a:r>
+                    </a:p>
+                  </a:txBody>
+                  <a:tcPr/>
+                </a:tc>
+                <a:tc>
+                  <a:txBody>
+                    <a:bodyPr/>
+                    <a:lstStyle/>
+                    <a:p>
+                      <a:r>
+                        <a:rPr lang="en-US" sz="1050" dirty="0"/>
+                        <a:t>March </a:t>
+                      </a:r>
+                    </a:p>
+                  </a:txBody>
+                  <a:tcPr/>
+                </a:tc>
+                <a:tc>
+                  <a:txBody>
+                    <a:bodyPr/>
+                    <a:lstStyle/>
+                    <a:p>
+                      <a:r>
+                        <a:rPr lang="en-US" sz="1050" dirty="0"/>
+                        <a:t>11</a:t>
+                      </a:r>
+                    </a:p>
+                  </a:txBody>
+                  <a:tcPr/>
+                </a:tc>
+                <a:tc>
+                  <a:txBody>
+                    <a:bodyPr/>
+                    <a:lstStyle/>
+                    <a:p>
+                      <a:r>
+                        <a:rPr lang="en-US" sz="1050" dirty="0"/>
+                        <a:t>11</a:t>
+                      </a:r>
+                    </a:p>
+                  </a:txBody>
+                  <a:tcPr/>
+                </a:tc>
+                <a:extLst>
+                  <a:ext uri="{0D108BD9-81ED-4DB2-BD59-A6C34878D82A}">
+                    <a16:rowId xmlns:a16="http://schemas.microsoft.com/office/drawing/2014/main" val="4180699601"/>
+                  </a:ext>
+                </a:extLst>
+              </a:tr>
+              <a:tr h="320221">
+                <a:tc>
+                  <a:txBody>
+                    <a:bodyPr/>
+                    <a:lstStyle/>
+                    <a:p>
+                      <a:endParaRPr lang="en-US" sz="1050" dirty="0"/>
+                    </a:p>
+                  </a:txBody>
+                  <a:tcPr/>
+                </a:tc>
+                <a:tc>
+                  <a:txBody>
+                    <a:bodyPr/>
+                    <a:lstStyle/>
+                    <a:p>
+                      <a:r>
+                        <a:rPr lang="en-US" sz="1050" dirty="0"/>
+                        <a:t>WFH Urged </a:t>
+                      </a:r>
+                    </a:p>
+                  </a:txBody>
+                  <a:tcPr/>
+                </a:tc>
+                <a:tc>
+                  <a:txBody>
+                    <a:bodyPr/>
+                    <a:lstStyle/>
+                    <a:p>
+                      <a:r>
+                        <a:rPr lang="en-US" sz="1050" dirty="0"/>
+                        <a:t>2020</a:t>
+                      </a:r>
+                    </a:p>
+                  </a:txBody>
+                  <a:tcPr/>
+                </a:tc>
+                <a:tc>
+                  <a:txBody>
+                    <a:bodyPr/>
+                    <a:lstStyle/>
+                    <a:p>
+                      <a:r>
+                        <a:rPr lang="en-US" sz="1050" dirty="0"/>
+                        <a:t>March </a:t>
+                      </a:r>
+                    </a:p>
+                  </a:txBody>
+                  <a:tcPr/>
+                </a:tc>
+                <a:tc>
+                  <a:txBody>
+                    <a:bodyPr/>
+                    <a:lstStyle/>
+                    <a:p>
+                      <a:pPr marL="0" marR="0" lvl="0" indent="0" algn="l" defTabSz="914400" rtl="0" eaLnBrk="1" fontAlgn="auto" latinLnBrk="0" hangingPunct="1">
+                        <a:lnSpc>
+                          <a:spcPct val="100000"/>
+                        </a:lnSpc>
+                        <a:spcBef>
+                          <a:spcPts val="0"/>
+                        </a:spcBef>
+                        <a:spcAft>
+                          <a:spcPts val="0"/>
+                        </a:spcAft>
+                        <a:buClrTx/>
+                        <a:buSzTx/>
+                        <a:buFontTx/>
+                        <a:buNone/>
+                        <a:tabLst/>
+                        <a:defRPr/>
+                      </a:pPr>
+                      <a:r>
+                        <a:rPr lang="en-US" sz="1050" dirty="0"/>
+                        <a:t>12</a:t>
+                      </a:r>
+                    </a:p>
+                  </a:txBody>
+                  <a:tcPr/>
+                </a:tc>
+                <a:tc>
+                  <a:txBody>
+                    <a:bodyPr/>
+                    <a:lstStyle/>
+                    <a:p>
+                      <a:r>
+                        <a:rPr lang="en-US" sz="1050" dirty="0"/>
+                        <a:t>16</a:t>
+                      </a:r>
+                    </a:p>
+                  </a:txBody>
+                  <a:tcPr/>
+                </a:tc>
+                <a:extLst>
+                  <a:ext uri="{0D108BD9-81ED-4DB2-BD59-A6C34878D82A}">
+                    <a16:rowId xmlns:a16="http://schemas.microsoft.com/office/drawing/2014/main" val="1647277073"/>
+                  </a:ext>
+                </a:extLst>
+              </a:tr>
+              <a:tr h="320221">
+                <a:tc>
+                  <a:txBody>
+                    <a:bodyPr/>
+                    <a:lstStyle/>
+                    <a:p>
+                      <a:endParaRPr lang="en-US" sz="1050" dirty="0"/>
+                    </a:p>
+                  </a:txBody>
+                  <a:tcPr/>
+                </a:tc>
+                <a:tc>
+                  <a:txBody>
+                    <a:bodyPr/>
+                    <a:lstStyle/>
+                    <a:p>
+                      <a:r>
+                        <a:rPr lang="en-US" sz="1050" dirty="0"/>
+                        <a:t>Border Restriction</a:t>
+                      </a:r>
+                    </a:p>
+                  </a:txBody>
+                  <a:tcPr/>
+                </a:tc>
+                <a:tc>
+                  <a:txBody>
+                    <a:bodyPr/>
+                    <a:lstStyle/>
+                    <a:p>
+                      <a:r>
+                        <a:rPr lang="en-US" sz="1050" dirty="0"/>
+                        <a:t>2020</a:t>
+                      </a:r>
+                    </a:p>
+                  </a:txBody>
+                  <a:tcPr/>
+                </a:tc>
+                <a:tc>
+                  <a:txBody>
+                    <a:bodyPr/>
+                    <a:lstStyle/>
+                    <a:p>
+                      <a:r>
+                        <a:rPr lang="en-US" sz="1050" dirty="0"/>
+                        <a:t>March </a:t>
+                      </a:r>
+                    </a:p>
+                  </a:txBody>
+                  <a:tcPr/>
+                </a:tc>
+                <a:tc>
+                  <a:txBody>
+                    <a:bodyPr/>
+                    <a:lstStyle/>
+                    <a:p>
+                      <a:r>
+                        <a:rPr lang="en-US" sz="1050" dirty="0"/>
+                        <a:t>12</a:t>
+                      </a:r>
+                    </a:p>
+                  </a:txBody>
+                  <a:tcPr/>
+                </a:tc>
+                <a:tc>
+                  <a:txBody>
+                    <a:bodyPr/>
+                    <a:lstStyle/>
+                    <a:p>
+                      <a:r>
+                        <a:rPr lang="en-US" sz="1050" dirty="0"/>
+                        <a:t>18</a:t>
+                      </a:r>
+                    </a:p>
+                  </a:txBody>
+                  <a:tcPr/>
+                </a:tc>
+                <a:extLst>
+                  <a:ext uri="{0D108BD9-81ED-4DB2-BD59-A6C34878D82A}">
+                    <a16:rowId xmlns:a16="http://schemas.microsoft.com/office/drawing/2014/main" val="2320914290"/>
+                  </a:ext>
+                </a:extLst>
+              </a:tr>
+              <a:tr h="484805">
+                <a:tc>
+                  <a:txBody>
+                    <a:bodyPr/>
+                    <a:lstStyle/>
+                    <a:p>
+                      <a:endParaRPr lang="en-US" sz="1050" dirty="0"/>
+                    </a:p>
+                  </a:txBody>
+                  <a:tcPr/>
+                </a:tc>
+                <a:tc>
+                  <a:txBody>
+                    <a:bodyPr/>
+                    <a:lstStyle/>
+                    <a:p>
+                      <a:r>
+                        <a:rPr lang="en-US" sz="1050" dirty="0"/>
+                        <a:t>Covid Delivery Standard Began</a:t>
+                      </a:r>
+                    </a:p>
+                  </a:txBody>
+                  <a:tcPr/>
+                </a:tc>
+                <a:tc>
+                  <a:txBody>
+                    <a:bodyPr/>
+                    <a:lstStyle/>
+                    <a:p>
+                      <a:r>
+                        <a:rPr lang="en-US" sz="1050" dirty="0"/>
+                        <a:t>2020</a:t>
+                      </a:r>
+                    </a:p>
+                  </a:txBody>
+                  <a:tcPr/>
+                </a:tc>
+                <a:tc>
+                  <a:txBody>
+                    <a:bodyPr/>
+                    <a:lstStyle/>
+                    <a:p>
+                      <a:r>
+                        <a:rPr lang="en-US" sz="1050" dirty="0"/>
+                        <a:t>March </a:t>
+                      </a:r>
+                    </a:p>
+                  </a:txBody>
+                  <a:tcPr/>
+                </a:tc>
+                <a:tc>
+                  <a:txBody>
+                    <a:bodyPr/>
+                    <a:lstStyle/>
+                    <a:p>
+                      <a:r>
+                        <a:rPr lang="en-US" sz="1050" dirty="0"/>
+                        <a:t>13</a:t>
+                      </a:r>
+                    </a:p>
+                  </a:txBody>
+                  <a:tcPr/>
+                </a:tc>
+                <a:tc>
+                  <a:txBody>
+                    <a:bodyPr/>
+                    <a:lstStyle/>
+                    <a:p>
+                      <a:r>
+                        <a:rPr lang="en-US" sz="1050" dirty="0"/>
+                        <a:t>23</a:t>
+                      </a:r>
+                    </a:p>
+                  </a:txBody>
+                  <a:tcPr/>
+                </a:tc>
+                <a:extLst>
+                  <a:ext uri="{0D108BD9-81ED-4DB2-BD59-A6C34878D82A}">
+                    <a16:rowId xmlns:a16="http://schemas.microsoft.com/office/drawing/2014/main" val="3843480789"/>
+                  </a:ext>
+                </a:extLst>
+              </a:tr>
+              <a:tr h="296270">
+                <a:tc>
+                  <a:txBody>
+                    <a:bodyPr/>
+                    <a:lstStyle/>
+                    <a:p>
+                      <a:endParaRPr lang="en-US" sz="1050" dirty="0"/>
+                    </a:p>
+                  </a:txBody>
+                  <a:tcPr/>
+                </a:tc>
+                <a:tc>
+                  <a:txBody>
+                    <a:bodyPr/>
+                    <a:lstStyle/>
+                    <a:p>
+                      <a:r>
+                        <a:rPr lang="en-US" sz="1050" dirty="0"/>
+                        <a:t>C.E.R.B Launched</a:t>
+                      </a:r>
+                    </a:p>
+                  </a:txBody>
+                  <a:tcPr/>
+                </a:tc>
+                <a:tc>
+                  <a:txBody>
+                    <a:bodyPr/>
+                    <a:lstStyle/>
+                    <a:p>
+                      <a:r>
+                        <a:rPr lang="en-US" sz="1050" dirty="0"/>
+                        <a:t>2020</a:t>
+                      </a:r>
+                    </a:p>
+                  </a:txBody>
+                  <a:tcPr/>
+                </a:tc>
+                <a:tc>
+                  <a:txBody>
+                    <a:bodyPr/>
+                    <a:lstStyle/>
+                    <a:p>
+                      <a:r>
+                        <a:rPr lang="en-US" sz="1050" dirty="0"/>
+                        <a:t>April</a:t>
+                      </a:r>
+                    </a:p>
+                  </a:txBody>
+                  <a:tcPr/>
+                </a:tc>
+                <a:tc>
+                  <a:txBody>
+                    <a:bodyPr/>
+                    <a:lstStyle/>
+                    <a:p>
+                      <a:r>
+                        <a:rPr lang="en-US" sz="1050" dirty="0"/>
+                        <a:t>15</a:t>
+                      </a:r>
+                    </a:p>
+                  </a:txBody>
+                  <a:tcPr/>
+                </a:tc>
+                <a:tc>
+                  <a:txBody>
+                    <a:bodyPr/>
+                    <a:lstStyle/>
+                    <a:p>
+                      <a:r>
+                        <a:rPr lang="en-US" sz="1050" dirty="0"/>
+                        <a:t>6</a:t>
+                      </a:r>
+                    </a:p>
+                  </a:txBody>
+                  <a:tcPr/>
+                </a:tc>
+                <a:extLst>
+                  <a:ext uri="{0D108BD9-81ED-4DB2-BD59-A6C34878D82A}">
+                    <a16:rowId xmlns:a16="http://schemas.microsoft.com/office/drawing/2014/main" val="1325288423"/>
+                  </a:ext>
+                </a:extLst>
+              </a:tr>
+            </a:tbl>
+          </a:graphicData>
+        </a:graphic>
+      </p:graphicFrame>
+      <p:cxnSp>
+        <p:nvCxnSpPr>
+          <p:cNvPr id="4" name="Straight Connector 3">
+            <a:extLst>
+              <a:ext uri="{FF2B5EF4-FFF2-40B4-BE49-F238E27FC236}">
+                <a16:creationId xmlns:a16="http://schemas.microsoft.com/office/drawing/2014/main" id="{2B47827D-1C6B-DF57-E859-E74FAE2A8673}"/>
+              </a:ext>
+            </a:extLst>
+          </p:cNvPr>
+          <p:cNvCxnSpPr>
+            <a:cxnSpLocks/>
+          </p:cNvCxnSpPr>
+          <p:nvPr/>
+        </p:nvCxnSpPr>
+        <p:spPr>
+          <a:xfrm>
+            <a:off x="7101036" y="2113934"/>
+            <a:ext cx="563567" cy="0"/>
+          </a:xfrm>
+          <a:prstGeom prst="line">
+            <a:avLst/>
+          </a:prstGeom>
+          <a:ln w="19050" cap="flat" cmpd="sng" algn="ctr">
+            <a:solidFill>
+              <a:srgbClr val="D64550"/>
+            </a:solidFill>
+            <a:prstDash val="dash"/>
+            <a:round/>
+            <a:headEnd type="none" w="med" len="med"/>
+            <a:tailEnd type="none" w="med" len="med"/>
+          </a:ln>
+        </p:spPr>
+        <p:style>
+          <a:lnRef idx="0">
+            <a:scrgbClr r="0" g="0" b="0"/>
+          </a:lnRef>
+          <a:fillRef idx="0">
+            <a:scrgbClr r="0" g="0" b="0"/>
+          </a:fillRef>
+          <a:effectRef idx="0">
+            <a:scrgbClr r="0" g="0" b="0"/>
+          </a:effectRef>
+          <a:fontRef idx="minor">
+            <a:schemeClr val="tx1"/>
+          </a:fontRef>
+        </p:style>
+      </p:cxnSp>
+      <p:cxnSp>
+        <p:nvCxnSpPr>
+          <p:cNvPr id="6" name="Straight Connector 5">
+            <a:extLst>
+              <a:ext uri="{FF2B5EF4-FFF2-40B4-BE49-F238E27FC236}">
+                <a16:creationId xmlns:a16="http://schemas.microsoft.com/office/drawing/2014/main" id="{4CB51246-4BE7-1EEC-73AD-2FD849BC074C}"/>
+              </a:ext>
+            </a:extLst>
+          </p:cNvPr>
+          <p:cNvCxnSpPr>
+            <a:cxnSpLocks/>
+          </p:cNvCxnSpPr>
+          <p:nvPr/>
+        </p:nvCxnSpPr>
+        <p:spPr>
+          <a:xfrm>
+            <a:off x="7101036" y="2482644"/>
+            <a:ext cx="563567" cy="0"/>
+          </a:xfrm>
+          <a:prstGeom prst="line">
+            <a:avLst/>
+          </a:prstGeom>
+          <a:ln w="19050" cap="flat" cmpd="sng" algn="ctr">
+            <a:solidFill>
+              <a:srgbClr val="6B007B"/>
+            </a:solidFill>
+            <a:prstDash val="dash"/>
+            <a:round/>
+            <a:headEnd type="none" w="med" len="med"/>
+            <a:tailEnd type="none" w="med" len="med"/>
+          </a:ln>
+        </p:spPr>
+        <p:style>
+          <a:lnRef idx="0">
+            <a:scrgbClr r="0" g="0" b="0"/>
+          </a:lnRef>
+          <a:fillRef idx="0">
+            <a:scrgbClr r="0" g="0" b="0"/>
+          </a:fillRef>
+          <a:effectRef idx="0">
+            <a:scrgbClr r="0" g="0" b="0"/>
+          </a:effectRef>
+          <a:fontRef idx="minor">
+            <a:schemeClr val="tx1"/>
+          </a:fontRef>
+        </p:style>
+      </p:cxnSp>
+      <p:cxnSp>
+        <p:nvCxnSpPr>
+          <p:cNvPr id="8" name="Straight Connector 7">
+            <a:extLst>
+              <a:ext uri="{FF2B5EF4-FFF2-40B4-BE49-F238E27FC236}">
+                <a16:creationId xmlns:a16="http://schemas.microsoft.com/office/drawing/2014/main" id="{4BD2DBB9-4122-B065-5341-62465F606B37}"/>
+              </a:ext>
+            </a:extLst>
+          </p:cNvPr>
+          <p:cNvCxnSpPr>
+            <a:cxnSpLocks/>
+          </p:cNvCxnSpPr>
+          <p:nvPr/>
+        </p:nvCxnSpPr>
+        <p:spPr>
+          <a:xfrm>
+            <a:off x="7129326" y="3202858"/>
+            <a:ext cx="563567" cy="0"/>
+          </a:xfrm>
+          <a:prstGeom prst="line">
+            <a:avLst/>
+          </a:prstGeom>
+          <a:ln w="19050" cap="flat" cmpd="sng" algn="ctr">
+            <a:solidFill>
+              <a:srgbClr val="E1C233"/>
+            </a:solidFill>
+            <a:prstDash val="dash"/>
+            <a:round/>
+            <a:headEnd type="none" w="med" len="med"/>
+            <a:tailEnd type="none" w="med" len="med"/>
+          </a:ln>
+        </p:spPr>
+        <p:style>
+          <a:lnRef idx="0">
+            <a:scrgbClr r="0" g="0" b="0"/>
+          </a:lnRef>
+          <a:fillRef idx="0">
+            <a:scrgbClr r="0" g="0" b="0"/>
+          </a:fillRef>
+          <a:effectRef idx="0">
+            <a:scrgbClr r="0" g="0" b="0"/>
+          </a:effectRef>
+          <a:fontRef idx="minor">
+            <a:schemeClr val="tx1"/>
+          </a:fontRef>
+        </p:style>
+      </p:cxnSp>
+      <p:cxnSp>
+        <p:nvCxnSpPr>
+          <p:cNvPr id="10" name="Straight Connector 9">
+            <a:extLst>
+              <a:ext uri="{FF2B5EF4-FFF2-40B4-BE49-F238E27FC236}">
+                <a16:creationId xmlns:a16="http://schemas.microsoft.com/office/drawing/2014/main" id="{B27B2BEC-209F-9E9B-A40D-B48CEBB885BF}"/>
+              </a:ext>
+            </a:extLst>
+          </p:cNvPr>
+          <p:cNvCxnSpPr>
+            <a:cxnSpLocks/>
+          </p:cNvCxnSpPr>
+          <p:nvPr/>
+        </p:nvCxnSpPr>
+        <p:spPr>
+          <a:xfrm>
+            <a:off x="7101036" y="3633019"/>
+            <a:ext cx="563567" cy="0"/>
+          </a:xfrm>
+          <a:prstGeom prst="line">
+            <a:avLst/>
+          </a:prstGeom>
+          <a:ln w="19050" cap="flat" cmpd="sng" algn="ctr">
+            <a:solidFill>
+              <a:srgbClr val="E669B9"/>
+            </a:solidFill>
+            <a:prstDash val="dash"/>
+            <a:round/>
+            <a:headEnd type="none" w="med" len="med"/>
+            <a:tailEnd type="none" w="med" len="med"/>
+          </a:ln>
+        </p:spPr>
+        <p:style>
+          <a:lnRef idx="0">
+            <a:scrgbClr r="0" g="0" b="0"/>
+          </a:lnRef>
+          <a:fillRef idx="0">
+            <a:scrgbClr r="0" g="0" b="0"/>
+          </a:fillRef>
+          <a:effectRef idx="0">
+            <a:scrgbClr r="0" g="0" b="0"/>
+          </a:effectRef>
+          <a:fontRef idx="minor">
+            <a:schemeClr val="tx1"/>
+          </a:fontRef>
+        </p:style>
+      </p:cxnSp>
+      <p:cxnSp>
+        <p:nvCxnSpPr>
+          <p:cNvPr id="11" name="Straight Connector 10">
+            <a:extLst>
+              <a:ext uri="{FF2B5EF4-FFF2-40B4-BE49-F238E27FC236}">
+                <a16:creationId xmlns:a16="http://schemas.microsoft.com/office/drawing/2014/main" id="{27104BC2-213E-33A3-0A1F-72C84D00954B}"/>
+              </a:ext>
+            </a:extLst>
+          </p:cNvPr>
+          <p:cNvCxnSpPr>
+            <a:cxnSpLocks/>
+          </p:cNvCxnSpPr>
+          <p:nvPr/>
+        </p:nvCxnSpPr>
+        <p:spPr>
+          <a:xfrm>
+            <a:off x="7129326" y="2920179"/>
+            <a:ext cx="563567" cy="0"/>
+          </a:xfrm>
+          <a:prstGeom prst="line">
+            <a:avLst/>
+          </a:prstGeom>
+          <a:ln w="19050" cap="flat" cmpd="sng" algn="ctr">
+            <a:solidFill>
+              <a:srgbClr val="6B007B"/>
+            </a:solidFill>
+            <a:prstDash val="dash"/>
+            <a:round/>
+            <a:headEnd type="none" w="med" len="med"/>
+            <a:tailEnd type="none" w="med" len="med"/>
+          </a:ln>
+        </p:spPr>
+        <p:style>
+          <a:lnRef idx="0">
+            <a:scrgbClr r="0" g="0" b="0"/>
+          </a:lnRef>
+          <a:fillRef idx="0">
+            <a:scrgbClr r="0" g="0" b="0"/>
+          </a:fillRef>
+          <a:effectRef idx="0">
+            <a:scrgbClr r="0" g="0" b="0"/>
+          </a:effectRef>
+          <a:fontRef idx="minor">
+            <a:schemeClr val="tx1"/>
+          </a:fontRef>
+        </p:style>
+      </p:cxnSp>
       <p:pic>
         <p:nvPicPr>
-          <p:cNvPr id="9" name="Picture 8">
+          <p:cNvPr id="23" name="Picture 22">
             <a:extLst>
               <a:ext uri="{FF2B5EF4-FFF2-40B4-BE49-F238E27FC236}">
-                <a16:creationId xmlns:a16="http://schemas.microsoft.com/office/drawing/2014/main" id="{B9599B7A-502A-C4A9-7390-75D46F00D24A}"/>
+                <a16:creationId xmlns:a16="http://schemas.microsoft.com/office/drawing/2014/main" id="{083F4164-84A4-864D-3626-F74ACDA4DBAE}"/>
               </a:ext>
             </a:extLst>
           </p:cNvPr>
@@ -10899,18 +11037,396 @@
         </p:blipFill>
         <p:spPr>
           <a:xfrm>
-            <a:off x="773723" y="1337187"/>
-            <a:ext cx="10972800" cy="5400675"/>
+            <a:off x="69191" y="1450722"/>
+            <a:ext cx="6793726" cy="4916860"/>
           </a:xfrm>
           <a:prstGeom prst="rect">
             <a:avLst/>
           </a:prstGeom>
         </p:spPr>
       </p:pic>
+      <p:sp>
+        <p:nvSpPr>
+          <p:cNvPr id="24" name="TextBox 23">
+            <a:extLst>
+              <a:ext uri="{FF2B5EF4-FFF2-40B4-BE49-F238E27FC236}">
+                <a16:creationId xmlns:a16="http://schemas.microsoft.com/office/drawing/2014/main" id="{89AF8A89-BA15-3D09-07A5-B892EFFB0428}"/>
+              </a:ext>
+            </a:extLst>
+          </p:cNvPr>
+          <p:cNvSpPr txBox="1"/>
+          <p:nvPr/>
+        </p:nvSpPr>
+        <p:spPr>
+          <a:xfrm>
+            <a:off x="6862917" y="3811012"/>
+            <a:ext cx="5259892" cy="3046988"/>
+          </a:xfrm>
+          <a:prstGeom prst="rect">
+            <a:avLst/>
+          </a:prstGeom>
+          <a:noFill/>
+        </p:spPr>
+        <p:txBody>
+          <a:bodyPr wrap="square" rtlCol="0">
+            <a:spAutoFit/>
+          </a:bodyPr>
+          <a:lstStyle/>
+          <a:p>
+            <a:pPr marL="285750" indent="-285750">
+              <a:buFontTx/>
+              <a:buChar char="-"/>
+            </a:pPr>
+            <a:r>
+              <a:rPr lang="en-US" sz="1600" b="1" dirty="0"/>
+              <a:t>Volume spiked dramatically following a sequence of major COVID events</a:t>
+            </a:r>
+            <a:r>
+              <a:rPr lang="en-US" sz="1600" dirty="0"/>
+              <a:t>.</a:t>
+            </a:r>
+          </a:p>
+          <a:p>
+            <a:pPr marL="285750" indent="-285750">
+              <a:buFontTx/>
+              <a:buChar char="-"/>
+            </a:pPr>
+            <a:r>
+              <a:rPr lang="en-US" sz="1600" dirty="0"/>
+              <a:t>The pandemic was declared in Week 11. </a:t>
+            </a:r>
+            <a:r>
+              <a:rPr lang="en-US" sz="1600" b="1" dirty="0"/>
+              <a:t>WFH Urged and Border Restriction triggered a sharp increase in parcel volume</a:t>
+            </a:r>
+            <a:r>
+              <a:rPr lang="en-US" sz="1600" dirty="0"/>
+              <a:t> starting from Week 12.</a:t>
+            </a:r>
+          </a:p>
+          <a:p>
+            <a:pPr marL="285750" indent="-285750">
+              <a:buFontTx/>
+              <a:buChar char="-"/>
+            </a:pPr>
+            <a:r>
+              <a:rPr lang="en-US" sz="1600" dirty="0"/>
+              <a:t>In Week 13, the COVID Delivery Standard was introduced to ensure safer deliveries and Week 15, the launch of C.E.R.B. provided financial support, both contributing to sustained growth in parcel volume during the pandemic.</a:t>
+            </a:r>
+          </a:p>
+          <a:p>
+            <a:r>
+              <a:rPr lang="en-US" sz="1600" b="1" dirty="0">
+                <a:solidFill>
+                  <a:schemeClr val="accent5">
+                    <a:lumMod val="75000"/>
+                  </a:schemeClr>
+                </a:solidFill>
+              </a:rPr>
+              <a:t>→</a:t>
+            </a:r>
+            <a:r>
+              <a:rPr lang="en-US" sz="1600" b="1" dirty="0"/>
+              <a:t> </a:t>
+            </a:r>
+            <a:r>
+              <a:rPr lang="en-US" sz="1600" b="1" i="1" dirty="0">
+                <a:solidFill>
+                  <a:schemeClr val="accent5">
+                    <a:lumMod val="75000"/>
+                  </a:schemeClr>
+                </a:solidFill>
+              </a:rPr>
+              <a:t>This marks the turning point toward e-commerce reliance</a:t>
+            </a:r>
+            <a:endParaRPr lang="en-US" sz="1600" b="1" dirty="0">
+              <a:solidFill>
+                <a:schemeClr val="accent5">
+                  <a:lumMod val="75000"/>
+                </a:schemeClr>
+              </a:solidFill>
+            </a:endParaRPr>
+          </a:p>
+        </p:txBody>
+      </p:sp>
     </p:spTree>
     <p:extLst>
       <p:ext uri="{BB962C8B-B14F-4D97-AF65-F5344CB8AC3E}">
-        <p14:creationId xmlns:p14="http://schemas.microsoft.com/office/powerpoint/2010/main" val="1963768160"/>
+        <p14:creationId xmlns:p14="http://schemas.microsoft.com/office/powerpoint/2010/main" val="1648729207"/>
+      </p:ext>
+    </p:extLst>
+  </p:cSld>
+  <p:clrMapOvr>
+    <a:masterClrMapping/>
+  </p:clrMapOvr>
+  <p:timing>
+    <p:tnLst>
+      <p:par>
+        <p:cTn id="1" dur="indefinite" restart="never" nodeType="tmRoot">
+          <p:childTnLst>
+            <p:seq concurrent="1" nextAc="seek">
+              <p:cTn id="2" dur="indefinite" nodeType="mainSeq">
+                <p:childTnLst>
+                  <p:par>
+                    <p:cTn id="3" fill="hold">
+                      <p:stCondLst>
+                        <p:cond delay="indefinite"/>
+                        <p:cond evt="onBegin" delay="0">
+                          <p:tn val="2"/>
+                        </p:cond>
+                      </p:stCondLst>
+                      <p:childTnLst>
+                        <p:par>
+                          <p:cTn id="4" fill="hold">
+                            <p:stCondLst>
+                              <p:cond delay="0"/>
+                            </p:stCondLst>
+                            <p:childTnLst>
+                              <p:par>
+                                <p:cTn id="5" presetID="10" presetClass="entr" presetSubtype="0" fill="hold" nodeType="withEffect">
+                                  <p:stCondLst>
+                                    <p:cond delay="0"/>
+                                  </p:stCondLst>
+                                  <p:childTnLst>
+                                    <p:set>
+                                      <p:cBhvr>
+                                        <p:cTn id="6" dur="1" fill="hold">
+                                          <p:stCondLst>
+                                            <p:cond delay="0"/>
+                                          </p:stCondLst>
+                                        </p:cTn>
+                                        <p:tgtEl>
+                                          <p:spTgt spid="9"/>
+                                        </p:tgtEl>
+                                        <p:attrNameLst>
+                                          <p:attrName>style.visibility</p:attrName>
+                                        </p:attrNameLst>
+                                      </p:cBhvr>
+                                      <p:to>
+                                        <p:strVal val="visible"/>
+                                      </p:to>
+                                    </p:set>
+                                    <p:animEffect transition="in" filter="fade">
+                                      <p:cBhvr>
+                                        <p:cTn id="7" dur="500"/>
+                                        <p:tgtEl>
+                                          <p:spTgt spid="9"/>
+                                        </p:tgtEl>
+                                      </p:cBhvr>
+                                    </p:animEffect>
+                                  </p:childTnLst>
+                                </p:cTn>
+                              </p:par>
+                            </p:childTnLst>
+                          </p:cTn>
+                        </p:par>
+                      </p:childTnLst>
+                    </p:cTn>
+                  </p:par>
+                </p:childTnLst>
+              </p:cTn>
+              <p:prevCondLst>
+                <p:cond evt="onPrev" delay="0">
+                  <p:tgtEl>
+                    <p:sldTgt/>
+                  </p:tgtEl>
+                </p:cond>
+              </p:prevCondLst>
+              <p:nextCondLst>
+                <p:cond evt="onNext" delay="0">
+                  <p:tgtEl>
+                    <p:sldTgt/>
+                  </p:tgtEl>
+                </p:cond>
+              </p:nextCondLst>
+            </p:seq>
+          </p:childTnLst>
+        </p:cTn>
+      </p:par>
+    </p:tnLst>
+  </p:timing>
+</p:sld>
+</file>
+
+<file path=ppt/slides/slide8.xml><?xml version="1.0" encoding="utf-8"?>
+<p:sld xmlns:a="http://schemas.openxmlformats.org/drawingml/2006/main" xmlns:r="http://schemas.openxmlformats.org/officeDocument/2006/relationships" xmlns:p="http://schemas.openxmlformats.org/presentationml/2006/main">
+  <p:cSld>
+    <p:spTree>
+      <p:nvGrpSpPr>
+        <p:cNvPr id="1" name=""/>
+        <p:cNvGrpSpPr/>
+        <p:nvPr/>
+      </p:nvGrpSpPr>
+      <p:grpSpPr>
+        <a:xfrm>
+          <a:off x="0" y="0"/>
+          <a:ext cx="0" cy="0"/>
+          <a:chOff x="0" y="0"/>
+          <a:chExt cx="0" cy="0"/>
+        </a:xfrm>
+      </p:grpSpPr>
+      <p:sp>
+        <p:nvSpPr>
+          <p:cNvPr id="2" name="Title 1">
+            <a:extLst>
+              <a:ext uri="{FF2B5EF4-FFF2-40B4-BE49-F238E27FC236}">
+                <a16:creationId xmlns:a16="http://schemas.microsoft.com/office/drawing/2014/main" id="{44CF171D-2B56-4ED9-151A-7775F4853279}"/>
+              </a:ext>
+            </a:extLst>
+          </p:cNvPr>
+          <p:cNvSpPr>
+            <a:spLocks noGrp="1"/>
+          </p:cNvSpPr>
+          <p:nvPr>
+            <p:ph type="title"/>
+          </p:nvPr>
+        </p:nvSpPr>
+        <p:spPr>
+          <a:xfrm>
+            <a:off x="609600" y="173320"/>
+            <a:ext cx="10972800" cy="844989"/>
+          </a:xfrm>
+        </p:spPr>
+        <p:txBody>
+          <a:bodyPr/>
+          <a:lstStyle/>
+          <a:p>
+            <a:pPr algn="ctr"/>
+            <a:r>
+              <a:rPr lang="en-US" dirty="0"/>
+              <a:t>Peak Season Analysis (2019 vs 2020)</a:t>
+            </a:r>
+          </a:p>
+        </p:txBody>
+      </p:sp>
+      <p:sp>
+        <p:nvSpPr>
+          <p:cNvPr id="3" name="TextBox 2">
+            <a:extLst>
+              <a:ext uri="{FF2B5EF4-FFF2-40B4-BE49-F238E27FC236}">
+                <a16:creationId xmlns:a16="http://schemas.microsoft.com/office/drawing/2014/main" id="{B528C169-16C4-E182-B705-2F3562BD06C3}"/>
+              </a:ext>
+            </a:extLst>
+          </p:cNvPr>
+          <p:cNvSpPr txBox="1"/>
+          <p:nvPr/>
+        </p:nvSpPr>
+        <p:spPr>
+          <a:xfrm>
+            <a:off x="7943846" y="2231922"/>
+            <a:ext cx="4149213" cy="2031325"/>
+          </a:xfrm>
+          <a:prstGeom prst="rect">
+            <a:avLst/>
+          </a:prstGeom>
+          <a:noFill/>
+        </p:spPr>
+        <p:txBody>
+          <a:bodyPr wrap="square" rtlCol="0">
+            <a:spAutoFit/>
+          </a:bodyPr>
+          <a:lstStyle/>
+          <a:p>
+            <a:r>
+              <a:rPr lang="en-US" dirty="0"/>
+              <a:t>Parcel volume during the 2020 peak season </a:t>
+            </a:r>
+            <a:r>
+              <a:rPr lang="en-US" b="1" dirty="0"/>
+              <a:t>increased by 26.48% </a:t>
+            </a:r>
+            <a:r>
+              <a:rPr lang="en-US" dirty="0"/>
+              <a:t>compared to 2019, with December and November showing the most significant growth, highlighting the surge in online shopping demand driven by the pandemic</a:t>
+            </a:r>
+          </a:p>
+        </p:txBody>
+      </p:sp>
+      <p:grpSp>
+        <p:nvGrpSpPr>
+          <p:cNvPr id="8" name="Group 7">
+            <a:extLst>
+              <a:ext uri="{FF2B5EF4-FFF2-40B4-BE49-F238E27FC236}">
+                <a16:creationId xmlns:a16="http://schemas.microsoft.com/office/drawing/2014/main" id="{B087772F-E72A-3F7B-B02C-ACACE6CFACA6}"/>
+              </a:ext>
+            </a:extLst>
+          </p:cNvPr>
+          <p:cNvGrpSpPr/>
+          <p:nvPr/>
+        </p:nvGrpSpPr>
+        <p:grpSpPr>
+          <a:xfrm>
+            <a:off x="98941" y="1523683"/>
+            <a:ext cx="7785912" cy="4377916"/>
+            <a:chOff x="355198" y="1373955"/>
+            <a:chExt cx="7419929" cy="4110090"/>
+          </a:xfrm>
+        </p:grpSpPr>
+        <p:pic>
+          <p:nvPicPr>
+            <p:cNvPr id="5" name="Picture 4">
+              <a:extLst>
+                <a:ext uri="{FF2B5EF4-FFF2-40B4-BE49-F238E27FC236}">
+                  <a16:creationId xmlns:a16="http://schemas.microsoft.com/office/drawing/2014/main" id="{4B3D1E4D-6F50-893F-E3DE-E8586E918501}"/>
+                </a:ext>
+              </a:extLst>
+            </p:cNvPr>
+            <p:cNvPicPr>
+              <a:picLocks noChangeAspect="1"/>
+            </p:cNvPicPr>
+            <p:nvPr/>
+          </p:nvPicPr>
+          <p:blipFill>
+            <a:blip r:embed="rId2"/>
+            <a:stretch>
+              <a:fillRect/>
+            </a:stretch>
+          </p:blipFill>
+          <p:spPr>
+            <a:xfrm>
+              <a:off x="355198" y="1373955"/>
+              <a:ext cx="7419929" cy="4110090"/>
+            </a:xfrm>
+            <a:prstGeom prst="rect">
+              <a:avLst/>
+            </a:prstGeom>
+          </p:spPr>
+        </p:pic>
+        <p:pic>
+          <p:nvPicPr>
+            <p:cNvPr id="7" name="Picture 6">
+              <a:extLst>
+                <a:ext uri="{FF2B5EF4-FFF2-40B4-BE49-F238E27FC236}">
+                  <a16:creationId xmlns:a16="http://schemas.microsoft.com/office/drawing/2014/main" id="{4168449D-1385-D1FE-6D87-F88553480DBB}"/>
+                </a:ext>
+              </a:extLst>
+            </p:cNvPr>
+            <p:cNvPicPr>
+              <a:picLocks noChangeAspect="1"/>
+            </p:cNvPicPr>
+            <p:nvPr/>
+          </p:nvPicPr>
+          <p:blipFill>
+            <a:blip r:embed="rId3"/>
+            <a:stretch>
+              <a:fillRect/>
+            </a:stretch>
+          </p:blipFill>
+          <p:spPr>
+            <a:xfrm>
+              <a:off x="4301114" y="4922070"/>
+              <a:ext cx="1600200" cy="561975"/>
+            </a:xfrm>
+            <a:prstGeom prst="rect">
+              <a:avLst/>
+            </a:prstGeom>
+          </p:spPr>
+        </p:pic>
+      </p:grpSp>
+    </p:spTree>
+    <p:extLst>
+      <p:ext uri="{BB962C8B-B14F-4D97-AF65-F5344CB8AC3E}">
+        <p14:creationId xmlns:p14="http://schemas.microsoft.com/office/powerpoint/2010/main" val="3306896646"/>
       </p:ext>
     </p:extLst>
   </p:cSld>
@@ -10978,33 +11494,259 @@
                       </p:childTnLst>
                     </p:cTn>
                   </p:par>
+                </p:childTnLst>
+              </p:cTn>
+              <p:prevCondLst>
+                <p:cond evt="onPrev" delay="0">
+                  <p:tgtEl>
+                    <p:sldTgt/>
+                  </p:tgtEl>
+                </p:cond>
+              </p:prevCondLst>
+              <p:nextCondLst>
+                <p:cond evt="onNext" delay="0">
+                  <p:tgtEl>
+                    <p:sldTgt/>
+                  </p:tgtEl>
+                </p:cond>
+              </p:nextCondLst>
+            </p:seq>
+          </p:childTnLst>
+        </p:cTn>
+      </p:par>
+    </p:tnLst>
+    <p:bldLst>
+      <p:bldP spid="2" grpId="0"/>
+    </p:bldLst>
+  </p:timing>
+</p:sld>
+</file>
+
+<file path=ppt/slides/slide9.xml><?xml version="1.0" encoding="utf-8"?>
+<p:sld xmlns:a="http://schemas.openxmlformats.org/drawingml/2006/main" xmlns:r="http://schemas.openxmlformats.org/officeDocument/2006/relationships" xmlns:p="http://schemas.openxmlformats.org/presentationml/2006/main">
+  <p:cSld>
+    <p:spTree>
+      <p:nvGrpSpPr>
+        <p:cNvPr id="1" name=""/>
+        <p:cNvGrpSpPr/>
+        <p:nvPr/>
+      </p:nvGrpSpPr>
+      <p:grpSpPr>
+        <a:xfrm>
+          <a:off x="0" y="0"/>
+          <a:ext cx="0" cy="0"/>
+          <a:chOff x="0" y="0"/>
+          <a:chExt cx="0" cy="0"/>
+        </a:xfrm>
+      </p:grpSpPr>
+      <p:sp>
+        <p:nvSpPr>
+          <p:cNvPr id="2" name="Title 1">
+            <a:extLst>
+              <a:ext uri="{FF2B5EF4-FFF2-40B4-BE49-F238E27FC236}">
+                <a16:creationId xmlns:a16="http://schemas.microsoft.com/office/drawing/2014/main" id="{F588A945-E1A5-C740-0749-7206BB505B89}"/>
+              </a:ext>
+            </a:extLst>
+          </p:cNvPr>
+          <p:cNvSpPr>
+            <a:spLocks noGrp="1"/>
+          </p:cNvSpPr>
+          <p:nvPr>
+            <p:ph type="title"/>
+          </p:nvPr>
+        </p:nvSpPr>
+        <p:spPr>
+          <a:xfrm>
+            <a:off x="609600" y="557784"/>
+            <a:ext cx="10972800" cy="1094371"/>
+          </a:xfrm>
+        </p:spPr>
+        <p:txBody>
+          <a:bodyPr>
+            <a:normAutofit fontScale="90000"/>
+          </a:bodyPr>
+          <a:lstStyle/>
+          <a:p>
+            <a:r>
+              <a:rPr lang="en-US" dirty="0"/>
+              <a:t>Peak Season Analysis (Pre-COVID and COVID Observation Period )</a:t>
+            </a:r>
+          </a:p>
+        </p:txBody>
+      </p:sp>
+      <p:pic>
+        <p:nvPicPr>
+          <p:cNvPr id="4" name="Picture 3">
+            <a:extLst>
+              <a:ext uri="{FF2B5EF4-FFF2-40B4-BE49-F238E27FC236}">
+                <a16:creationId xmlns:a16="http://schemas.microsoft.com/office/drawing/2014/main" id="{9A7AE0EC-F559-6F41-087A-86A1CF471C07}"/>
+              </a:ext>
+            </a:extLst>
+          </p:cNvPr>
+          <p:cNvPicPr>
+            <a:picLocks noChangeAspect="1"/>
+          </p:cNvPicPr>
+          <p:nvPr/>
+        </p:nvPicPr>
+        <p:blipFill>
+          <a:blip r:embed="rId2"/>
+          <a:stretch>
+            <a:fillRect/>
+          </a:stretch>
+        </p:blipFill>
+        <p:spPr>
+          <a:xfrm>
+            <a:off x="200967" y="1652155"/>
+            <a:ext cx="8179358" cy="4768742"/>
+          </a:xfrm>
+          <a:prstGeom prst="rect">
+            <a:avLst/>
+          </a:prstGeom>
+        </p:spPr>
+      </p:pic>
+      <p:cxnSp>
+        <p:nvCxnSpPr>
+          <p:cNvPr id="7" name="Straight Connector 6">
+            <a:extLst>
+              <a:ext uri="{FF2B5EF4-FFF2-40B4-BE49-F238E27FC236}">
+                <a16:creationId xmlns:a16="http://schemas.microsoft.com/office/drawing/2014/main" id="{D4ED3DAE-D63D-0C04-A848-C2475A781C60}"/>
+              </a:ext>
+            </a:extLst>
+          </p:cNvPr>
+          <p:cNvCxnSpPr>
+            <a:cxnSpLocks/>
+          </p:cNvCxnSpPr>
+          <p:nvPr/>
+        </p:nvCxnSpPr>
+        <p:spPr>
+          <a:xfrm>
+            <a:off x="2159099" y="2123768"/>
+            <a:ext cx="0" cy="3292295"/>
+          </a:xfrm>
+          <a:prstGeom prst="line">
+            <a:avLst/>
+          </a:prstGeom>
+          <a:ln w="19050" cap="flat" cmpd="sng" algn="ctr">
+            <a:solidFill>
+              <a:schemeClr val="accent5"/>
+            </a:solidFill>
+            <a:prstDash val="dash"/>
+            <a:round/>
+            <a:headEnd type="none" w="med" len="med"/>
+            <a:tailEnd type="none" w="med" len="med"/>
+          </a:ln>
+        </p:spPr>
+        <p:style>
+          <a:lnRef idx="0">
+            <a:scrgbClr r="0" g="0" b="0"/>
+          </a:lnRef>
+          <a:fillRef idx="0">
+            <a:scrgbClr r="0" g="0" b="0"/>
+          </a:fillRef>
+          <a:effectRef idx="0">
+            <a:scrgbClr r="0" g="0" b="0"/>
+          </a:effectRef>
+          <a:fontRef idx="minor">
+            <a:schemeClr val="tx1"/>
+          </a:fontRef>
+        </p:style>
+      </p:cxnSp>
+      <p:sp>
+        <p:nvSpPr>
+          <p:cNvPr id="9" name="TextBox 8">
+            <a:extLst>
+              <a:ext uri="{FF2B5EF4-FFF2-40B4-BE49-F238E27FC236}">
+                <a16:creationId xmlns:a16="http://schemas.microsoft.com/office/drawing/2014/main" id="{29E2BAAC-EDA0-7E6C-11EE-E0A39BC9D8C7}"/>
+              </a:ext>
+            </a:extLst>
+          </p:cNvPr>
+          <p:cNvSpPr txBox="1"/>
+          <p:nvPr/>
+        </p:nvSpPr>
+        <p:spPr>
+          <a:xfrm>
+            <a:off x="8380324" y="1956619"/>
+            <a:ext cx="3811675" cy="2308324"/>
+          </a:xfrm>
+          <a:prstGeom prst="rect">
+            <a:avLst/>
+          </a:prstGeom>
+          <a:noFill/>
+        </p:spPr>
+        <p:txBody>
+          <a:bodyPr wrap="square" rtlCol="0">
+            <a:spAutoFit/>
+          </a:bodyPr>
+          <a:lstStyle/>
+          <a:p>
+            <a:r>
+              <a:rPr lang="en-US" dirty="0"/>
+              <a:t>After March 11 (Week 11), parcel volume </a:t>
+            </a:r>
+            <a:r>
+              <a:rPr lang="en-US" b="1" dirty="0"/>
+              <a:t>surged dramatically</a:t>
+            </a:r>
+            <a:r>
+              <a:rPr lang="en-US" dirty="0"/>
+              <a:t>, rising from 9M during the pre-COVID period to 65M post-COVID, </a:t>
+            </a:r>
+            <a:r>
+              <a:rPr lang="en-US" b="1" dirty="0"/>
+              <a:t>marking a 630% increase</a:t>
+            </a:r>
+            <a:r>
+              <a:rPr lang="en-US" dirty="0"/>
+              <a:t>. This highlights the pandemic's significant role in accelerating parcel demand</a:t>
+            </a:r>
+          </a:p>
+        </p:txBody>
+      </p:sp>
+    </p:spTree>
+    <p:extLst>
+      <p:ext uri="{BB962C8B-B14F-4D97-AF65-F5344CB8AC3E}">
+        <p14:creationId xmlns:p14="http://schemas.microsoft.com/office/powerpoint/2010/main" val="524735799"/>
+      </p:ext>
+    </p:extLst>
+  </p:cSld>
+  <p:clrMapOvr>
+    <a:masterClrMapping/>
+  </p:clrMapOvr>
+  <p:timing>
+    <p:tnLst>
+      <p:par>
+        <p:cTn id="1" dur="indefinite" restart="never" nodeType="tmRoot">
+          <p:childTnLst>
+            <p:seq concurrent="1" nextAc="seek">
+              <p:cTn id="2" dur="indefinite" nodeType="mainSeq">
+                <p:childTnLst>
                   <p:par>
-                    <p:cTn id="8" fill="hold">
+                    <p:cTn id="3" fill="hold">
                       <p:stCondLst>
                         <p:cond delay="indefinite"/>
                       </p:stCondLst>
                       <p:childTnLst>
                         <p:par>
-                          <p:cTn id="9" fill="hold">
+                          <p:cTn id="4" fill="hold">
                             <p:stCondLst>
                               <p:cond delay="0"/>
                             </p:stCondLst>
                             <p:childTnLst>
                               <p:par>
-                                <p:cTn id="10" presetID="10" presetClass="entr" presetSubtype="0" fill="hold" nodeType="clickEffect">
+                                <p:cTn id="5" presetID="16" presetClass="entr" presetSubtype="21" fill="hold" grpId="0" nodeType="clickEffect">
                                   <p:stCondLst>
                                     <p:cond delay="0"/>
                                   </p:stCondLst>
                                   <p:childTnLst>
                                     <p:set>
                                       <p:cBhvr>
-                                        <p:cTn id="11" dur="1" fill="hold">
+                                        <p:cTn id="6" dur="1" fill="hold">
                                           <p:stCondLst>
                                             <p:cond delay="0"/>
                                           </p:stCondLst>
                                         </p:cTn>
                                         <p:tgtEl>
-                                          <p:spTgt spid="9"/>
+                                          <p:spTgt spid="2"/>
                                         </p:tgtEl>
                                         <p:attrNameLst>
                                           <p:attrName>style.visibility</p:attrName>
@@ -11014,11 +11756,11 @@
                                         <p:strVal val="visible"/>
                                       </p:to>
                                     </p:set>
-                                    <p:animEffect transition="in" filter="fade">
+                                    <p:animEffect transition="in" filter="barn(inVertical)">
                                       <p:cBhvr>
-                                        <p:cTn id="12" dur="500"/>
+                                        <p:cTn id="7" dur="500"/>
                                         <p:tgtEl>
-                                          <p:spTgt spid="9"/>
+                                          <p:spTgt spid="2"/>
                                         </p:tgtEl>
                                       </p:cBhvr>
                                     </p:animEffect>
@@ -11055,990 +11797,6 @@
     <p:bldLst>
       <p:bldP spid="2" grpId="0"/>
     </p:bldLst>
-  </p:timing>
-</p:sld>
-</file>
-
-<file path=ppt/slides/slide8.xml><?xml version="1.0" encoding="utf-8"?>
-<p:sld xmlns:a="http://schemas.openxmlformats.org/drawingml/2006/main" xmlns:r="http://schemas.openxmlformats.org/officeDocument/2006/relationships" xmlns:p="http://schemas.openxmlformats.org/presentationml/2006/main">
-  <p:cSld>
-    <p:spTree>
-      <p:nvGrpSpPr>
-        <p:cNvPr id="1" name=""/>
-        <p:cNvGrpSpPr/>
-        <p:nvPr/>
-      </p:nvGrpSpPr>
-      <p:grpSpPr>
-        <a:xfrm>
-          <a:off x="0" y="0"/>
-          <a:ext cx="0" cy="0"/>
-          <a:chOff x="0" y="0"/>
-          <a:chExt cx="0" cy="0"/>
-        </a:xfrm>
-      </p:grpSpPr>
-      <p:pic>
-        <p:nvPicPr>
-          <p:cNvPr id="4" name="Picture 3">
-            <a:extLst>
-              <a:ext uri="{FF2B5EF4-FFF2-40B4-BE49-F238E27FC236}">
-                <a16:creationId xmlns:a16="http://schemas.microsoft.com/office/drawing/2014/main" id="{787C8572-E57B-2F50-3D92-C29A2B0918F8}"/>
-              </a:ext>
-            </a:extLst>
-          </p:cNvPr>
-          <p:cNvPicPr>
-            <a:picLocks noChangeAspect="1"/>
-          </p:cNvPicPr>
-          <p:nvPr/>
-        </p:nvPicPr>
-        <p:blipFill>
-          <a:blip r:embed="rId2"/>
-          <a:stretch>
-            <a:fillRect/>
-          </a:stretch>
-        </p:blipFill>
-        <p:spPr>
-          <a:xfrm>
-            <a:off x="632102" y="1319645"/>
-            <a:ext cx="10972800" cy="5471711"/>
-          </a:xfrm>
-          <a:prstGeom prst="rect">
-            <a:avLst/>
-          </a:prstGeom>
-        </p:spPr>
-      </p:pic>
-      <p:sp>
-        <p:nvSpPr>
-          <p:cNvPr id="2" name="Title 1">
-            <a:extLst>
-              <a:ext uri="{FF2B5EF4-FFF2-40B4-BE49-F238E27FC236}">
-                <a16:creationId xmlns:a16="http://schemas.microsoft.com/office/drawing/2014/main" id="{D90915F6-596C-17A4-8A35-CE84DFC63CB3}"/>
-              </a:ext>
-            </a:extLst>
-          </p:cNvPr>
-          <p:cNvSpPr>
-            <a:spLocks noGrp="1"/>
-          </p:cNvSpPr>
-          <p:nvPr>
-            <p:ph type="title"/>
-          </p:nvPr>
-        </p:nvSpPr>
-        <p:spPr>
-          <a:xfrm>
-            <a:off x="609600" y="557784"/>
-            <a:ext cx="10972800" cy="761861"/>
-          </a:xfrm>
-        </p:spPr>
-        <p:txBody>
-          <a:bodyPr>
-            <a:noAutofit/>
-          </a:bodyPr>
-          <a:lstStyle/>
-          <a:p>
-            <a:r>
-              <a:rPr lang="en-US" dirty="0"/>
-              <a:t>COVID Timeline vs Volume Spike</a:t>
-            </a:r>
-          </a:p>
-        </p:txBody>
-      </p:sp>
-      <p:graphicFrame>
-        <p:nvGraphicFramePr>
-          <p:cNvPr id="9" name="Table 8">
-            <a:extLst>
-              <a:ext uri="{FF2B5EF4-FFF2-40B4-BE49-F238E27FC236}">
-                <a16:creationId xmlns:a16="http://schemas.microsoft.com/office/drawing/2014/main" id="{6FD19C98-96D1-56A4-31EE-D7AC73591A56}"/>
-              </a:ext>
-            </a:extLst>
-          </p:cNvPr>
-          <p:cNvGraphicFramePr>
-            <a:graphicFrameLocks noGrp="1"/>
-          </p:cNvGraphicFramePr>
-          <p:nvPr>
-            <p:extLst>
-              <p:ext uri="{D42A27DB-BD31-4B8C-83A1-F6EECF244321}">
-                <p14:modId xmlns:p14="http://schemas.microsoft.com/office/powerpoint/2010/main" val="2796335087"/>
-              </p:ext>
-            </p:extLst>
-          </p:nvPr>
-        </p:nvGraphicFramePr>
-        <p:xfrm>
-          <a:off x="5165013" y="1383357"/>
-          <a:ext cx="4441211" cy="1785665"/>
-        </p:xfrm>
-        <a:graphic>
-          <a:graphicData uri="http://schemas.openxmlformats.org/drawingml/2006/table">
-            <a:tbl>
-              <a:tblPr firstRow="1" bandRow="1">
-                <a:tableStyleId>{9D7B26C5-4107-4FEC-AEDC-1716B250A1EF}</a:tableStyleId>
-              </a:tblPr>
-              <a:tblGrid>
-                <a:gridCol w="1606687">
-                  <a:extLst>
-                    <a:ext uri="{9D8B030D-6E8A-4147-A177-3AD203B41FA5}">
-                      <a16:colId xmlns:a16="http://schemas.microsoft.com/office/drawing/2014/main" val="584425468"/>
-                    </a:ext>
-                  </a:extLst>
-                </a:gridCol>
-                <a:gridCol w="667550">
-                  <a:extLst>
-                    <a:ext uri="{9D8B030D-6E8A-4147-A177-3AD203B41FA5}">
-                      <a16:colId xmlns:a16="http://schemas.microsoft.com/office/drawing/2014/main" val="2768743516"/>
-                    </a:ext>
-                  </a:extLst>
-                </a:gridCol>
-                <a:gridCol w="741116">
-                  <a:extLst>
-                    <a:ext uri="{9D8B030D-6E8A-4147-A177-3AD203B41FA5}">
-                      <a16:colId xmlns:a16="http://schemas.microsoft.com/office/drawing/2014/main" val="2304160170"/>
-                    </a:ext>
-                  </a:extLst>
-                </a:gridCol>
-                <a:gridCol w="722309">
-                  <a:extLst>
-                    <a:ext uri="{9D8B030D-6E8A-4147-A177-3AD203B41FA5}">
-                      <a16:colId xmlns:a16="http://schemas.microsoft.com/office/drawing/2014/main" val="3777036179"/>
-                    </a:ext>
-                  </a:extLst>
-                </a:gridCol>
-                <a:gridCol w="703549">
-                  <a:extLst>
-                    <a:ext uri="{9D8B030D-6E8A-4147-A177-3AD203B41FA5}">
-                      <a16:colId xmlns:a16="http://schemas.microsoft.com/office/drawing/2014/main" val="3053037997"/>
-                    </a:ext>
-                  </a:extLst>
-                </a:gridCol>
-              </a:tblGrid>
-              <a:tr h="271789">
-                <a:tc>
-                  <a:txBody>
-                    <a:bodyPr/>
-                    <a:lstStyle/>
-                    <a:p>
-                      <a:r>
-                        <a:rPr lang="en-US" sz="1100" dirty="0" err="1"/>
-                        <a:t>Event_Label</a:t>
-                      </a:r>
-                      <a:endParaRPr lang="en-US" sz="1100" dirty="0"/>
-                    </a:p>
-                  </a:txBody>
-                  <a:tcPr/>
-                </a:tc>
-                <a:tc>
-                  <a:txBody>
-                    <a:bodyPr/>
-                    <a:lstStyle/>
-                    <a:p>
-                      <a:r>
-                        <a:rPr lang="en-US" sz="1100" dirty="0"/>
-                        <a:t>Year</a:t>
-                      </a:r>
-                    </a:p>
-                  </a:txBody>
-                  <a:tcPr/>
-                </a:tc>
-                <a:tc>
-                  <a:txBody>
-                    <a:bodyPr/>
-                    <a:lstStyle/>
-                    <a:p>
-                      <a:r>
-                        <a:rPr lang="en-US" sz="1100" dirty="0"/>
-                        <a:t>Quarter </a:t>
-                      </a:r>
-                    </a:p>
-                  </a:txBody>
-                  <a:tcPr/>
-                </a:tc>
-                <a:tc>
-                  <a:txBody>
-                    <a:bodyPr/>
-                    <a:lstStyle/>
-                    <a:p>
-                      <a:r>
-                        <a:rPr lang="en-US" sz="1100" dirty="0"/>
-                        <a:t>Month</a:t>
-                      </a:r>
-                    </a:p>
-                  </a:txBody>
-                  <a:tcPr/>
-                </a:tc>
-                <a:tc>
-                  <a:txBody>
-                    <a:bodyPr/>
-                    <a:lstStyle/>
-                    <a:p>
-                      <a:r>
-                        <a:rPr lang="en-US" sz="1100" dirty="0"/>
-                        <a:t>Day</a:t>
-                      </a:r>
-                    </a:p>
-                  </a:txBody>
-                  <a:tcPr/>
-                </a:tc>
-                <a:extLst>
-                  <a:ext uri="{0D108BD9-81ED-4DB2-BD59-A6C34878D82A}">
-                    <a16:rowId xmlns:a16="http://schemas.microsoft.com/office/drawing/2014/main" val="2458835153"/>
-                  </a:ext>
-                </a:extLst>
-              </a:tr>
-              <a:tr h="271789">
-                <a:tc>
-                  <a:txBody>
-                    <a:bodyPr/>
-                    <a:lstStyle/>
-                    <a:p>
-                      <a:r>
-                        <a:rPr lang="en-US" sz="1100" dirty="0"/>
-                        <a:t>Pandemic Declared</a:t>
-                      </a:r>
-                    </a:p>
-                  </a:txBody>
-                  <a:tcPr/>
-                </a:tc>
-                <a:tc>
-                  <a:txBody>
-                    <a:bodyPr/>
-                    <a:lstStyle/>
-                    <a:p>
-                      <a:r>
-                        <a:rPr lang="en-US" sz="1100" dirty="0"/>
-                        <a:t>2020</a:t>
-                      </a:r>
-                    </a:p>
-                  </a:txBody>
-                  <a:tcPr/>
-                </a:tc>
-                <a:tc>
-                  <a:txBody>
-                    <a:bodyPr/>
-                    <a:lstStyle/>
-                    <a:p>
-                      <a:r>
-                        <a:rPr lang="en-US" sz="1100" dirty="0" err="1"/>
-                        <a:t>Qtr</a:t>
-                      </a:r>
-                      <a:r>
-                        <a:rPr lang="en-US" sz="1100" dirty="0"/>
-                        <a:t> 1</a:t>
-                      </a:r>
-                    </a:p>
-                  </a:txBody>
-                  <a:tcPr/>
-                </a:tc>
-                <a:tc>
-                  <a:txBody>
-                    <a:bodyPr/>
-                    <a:lstStyle/>
-                    <a:p>
-                      <a:r>
-                        <a:rPr lang="en-US" sz="1100" dirty="0"/>
-                        <a:t>March </a:t>
-                      </a:r>
-                    </a:p>
-                  </a:txBody>
-                  <a:tcPr/>
-                </a:tc>
-                <a:tc>
-                  <a:txBody>
-                    <a:bodyPr/>
-                    <a:lstStyle/>
-                    <a:p>
-                      <a:r>
-                        <a:rPr lang="en-US" sz="1100" dirty="0"/>
-                        <a:t>11</a:t>
-                      </a:r>
-                    </a:p>
-                  </a:txBody>
-                  <a:tcPr/>
-                </a:tc>
-                <a:extLst>
-                  <a:ext uri="{0D108BD9-81ED-4DB2-BD59-A6C34878D82A}">
-                    <a16:rowId xmlns:a16="http://schemas.microsoft.com/office/drawing/2014/main" val="4180699601"/>
-                  </a:ext>
-                </a:extLst>
-              </a:tr>
-              <a:tr h="271789">
-                <a:tc>
-                  <a:txBody>
-                    <a:bodyPr/>
-                    <a:lstStyle/>
-                    <a:p>
-                      <a:r>
-                        <a:rPr lang="en-US" sz="1100" dirty="0"/>
-                        <a:t>WFH Urged </a:t>
-                      </a:r>
-                    </a:p>
-                  </a:txBody>
-                  <a:tcPr/>
-                </a:tc>
-                <a:tc>
-                  <a:txBody>
-                    <a:bodyPr/>
-                    <a:lstStyle/>
-                    <a:p>
-                      <a:r>
-                        <a:rPr lang="en-US" sz="1100" dirty="0"/>
-                        <a:t>2020</a:t>
-                      </a:r>
-                    </a:p>
-                  </a:txBody>
-                  <a:tcPr/>
-                </a:tc>
-                <a:tc>
-                  <a:txBody>
-                    <a:bodyPr/>
-                    <a:lstStyle/>
-                    <a:p>
-                      <a:r>
-                        <a:rPr lang="en-US" sz="1100" dirty="0" err="1"/>
-                        <a:t>Qtr</a:t>
-                      </a:r>
-                      <a:r>
-                        <a:rPr lang="en-US" sz="1100" dirty="0"/>
-                        <a:t> 1</a:t>
-                      </a:r>
-                    </a:p>
-                  </a:txBody>
-                  <a:tcPr/>
-                </a:tc>
-                <a:tc>
-                  <a:txBody>
-                    <a:bodyPr/>
-                    <a:lstStyle/>
-                    <a:p>
-                      <a:r>
-                        <a:rPr lang="en-US" sz="1100" dirty="0"/>
-                        <a:t>March </a:t>
-                      </a:r>
-                    </a:p>
-                  </a:txBody>
-                  <a:tcPr/>
-                </a:tc>
-                <a:tc>
-                  <a:txBody>
-                    <a:bodyPr/>
-                    <a:lstStyle/>
-                    <a:p>
-                      <a:r>
-                        <a:rPr lang="en-US" sz="1100" dirty="0"/>
-                        <a:t>16</a:t>
-                      </a:r>
-                    </a:p>
-                  </a:txBody>
-                  <a:tcPr/>
-                </a:tc>
-                <a:extLst>
-                  <a:ext uri="{0D108BD9-81ED-4DB2-BD59-A6C34878D82A}">
-                    <a16:rowId xmlns:a16="http://schemas.microsoft.com/office/drawing/2014/main" val="1647277073"/>
-                  </a:ext>
-                </a:extLst>
-              </a:tr>
-              <a:tr h="271789">
-                <a:tc>
-                  <a:txBody>
-                    <a:bodyPr/>
-                    <a:lstStyle/>
-                    <a:p>
-                      <a:r>
-                        <a:rPr lang="en-US" sz="1100" dirty="0"/>
-                        <a:t>Border Restriction</a:t>
-                      </a:r>
-                    </a:p>
-                  </a:txBody>
-                  <a:tcPr/>
-                </a:tc>
-                <a:tc>
-                  <a:txBody>
-                    <a:bodyPr/>
-                    <a:lstStyle/>
-                    <a:p>
-                      <a:r>
-                        <a:rPr lang="en-US" sz="1100" dirty="0"/>
-                        <a:t>2020</a:t>
-                      </a:r>
-                    </a:p>
-                  </a:txBody>
-                  <a:tcPr/>
-                </a:tc>
-                <a:tc>
-                  <a:txBody>
-                    <a:bodyPr/>
-                    <a:lstStyle/>
-                    <a:p>
-                      <a:r>
-                        <a:rPr lang="en-US" sz="1100" dirty="0" err="1"/>
-                        <a:t>Qtr</a:t>
-                      </a:r>
-                      <a:r>
-                        <a:rPr lang="en-US" sz="1100" dirty="0"/>
-                        <a:t> 1</a:t>
-                      </a:r>
-                    </a:p>
-                  </a:txBody>
-                  <a:tcPr/>
-                </a:tc>
-                <a:tc>
-                  <a:txBody>
-                    <a:bodyPr/>
-                    <a:lstStyle/>
-                    <a:p>
-                      <a:r>
-                        <a:rPr lang="en-US" sz="1100" dirty="0"/>
-                        <a:t>March </a:t>
-                      </a:r>
-                    </a:p>
-                  </a:txBody>
-                  <a:tcPr/>
-                </a:tc>
-                <a:tc>
-                  <a:txBody>
-                    <a:bodyPr/>
-                    <a:lstStyle/>
-                    <a:p>
-                      <a:r>
-                        <a:rPr lang="en-US" sz="1100" dirty="0"/>
-                        <a:t>18</a:t>
-                      </a:r>
-                    </a:p>
-                  </a:txBody>
-                  <a:tcPr/>
-                </a:tc>
-                <a:extLst>
-                  <a:ext uri="{0D108BD9-81ED-4DB2-BD59-A6C34878D82A}">
-                    <a16:rowId xmlns:a16="http://schemas.microsoft.com/office/drawing/2014/main" val="2320914290"/>
-                  </a:ext>
-                </a:extLst>
-              </a:tr>
-              <a:tr h="407509">
-                <a:tc>
-                  <a:txBody>
-                    <a:bodyPr/>
-                    <a:lstStyle/>
-                    <a:p>
-                      <a:r>
-                        <a:rPr lang="en-US" sz="1100" dirty="0"/>
-                        <a:t>Covid Delivery Standard Began</a:t>
-                      </a:r>
-                    </a:p>
-                  </a:txBody>
-                  <a:tcPr/>
-                </a:tc>
-                <a:tc>
-                  <a:txBody>
-                    <a:bodyPr/>
-                    <a:lstStyle/>
-                    <a:p>
-                      <a:r>
-                        <a:rPr lang="en-US" sz="1100" dirty="0"/>
-                        <a:t>2020</a:t>
-                      </a:r>
-                    </a:p>
-                  </a:txBody>
-                  <a:tcPr/>
-                </a:tc>
-                <a:tc>
-                  <a:txBody>
-                    <a:bodyPr/>
-                    <a:lstStyle/>
-                    <a:p>
-                      <a:r>
-                        <a:rPr lang="en-US" sz="1100" dirty="0" err="1"/>
-                        <a:t>Qtr</a:t>
-                      </a:r>
-                      <a:r>
-                        <a:rPr lang="en-US" sz="1100" dirty="0"/>
-                        <a:t> 1</a:t>
-                      </a:r>
-                    </a:p>
-                  </a:txBody>
-                  <a:tcPr/>
-                </a:tc>
-                <a:tc>
-                  <a:txBody>
-                    <a:bodyPr/>
-                    <a:lstStyle/>
-                    <a:p>
-                      <a:r>
-                        <a:rPr lang="en-US" sz="1100" dirty="0"/>
-                        <a:t>March </a:t>
-                      </a:r>
-                    </a:p>
-                  </a:txBody>
-                  <a:tcPr/>
-                </a:tc>
-                <a:tc>
-                  <a:txBody>
-                    <a:bodyPr/>
-                    <a:lstStyle/>
-                    <a:p>
-                      <a:r>
-                        <a:rPr lang="en-US" sz="1100" dirty="0"/>
-                        <a:t>23</a:t>
-                      </a:r>
-                    </a:p>
-                  </a:txBody>
-                  <a:tcPr/>
-                </a:tc>
-                <a:extLst>
-                  <a:ext uri="{0D108BD9-81ED-4DB2-BD59-A6C34878D82A}">
-                    <a16:rowId xmlns:a16="http://schemas.microsoft.com/office/drawing/2014/main" val="3843480789"/>
-                  </a:ext>
-                </a:extLst>
-              </a:tr>
-              <a:tr h="271789">
-                <a:tc>
-                  <a:txBody>
-                    <a:bodyPr/>
-                    <a:lstStyle/>
-                    <a:p>
-                      <a:r>
-                        <a:rPr lang="en-US" sz="1100" dirty="0"/>
-                        <a:t>C.E.R.B Launched</a:t>
-                      </a:r>
-                    </a:p>
-                  </a:txBody>
-                  <a:tcPr/>
-                </a:tc>
-                <a:tc>
-                  <a:txBody>
-                    <a:bodyPr/>
-                    <a:lstStyle/>
-                    <a:p>
-                      <a:r>
-                        <a:rPr lang="en-US" sz="1100" dirty="0"/>
-                        <a:t>2020</a:t>
-                      </a:r>
-                    </a:p>
-                  </a:txBody>
-                  <a:tcPr/>
-                </a:tc>
-                <a:tc>
-                  <a:txBody>
-                    <a:bodyPr/>
-                    <a:lstStyle/>
-                    <a:p>
-                      <a:r>
-                        <a:rPr lang="en-US" sz="1100" dirty="0" err="1"/>
-                        <a:t>Qtr</a:t>
-                      </a:r>
-                      <a:r>
-                        <a:rPr lang="en-US" sz="1100" dirty="0"/>
-                        <a:t> 2</a:t>
-                      </a:r>
-                    </a:p>
-                  </a:txBody>
-                  <a:tcPr/>
-                </a:tc>
-                <a:tc>
-                  <a:txBody>
-                    <a:bodyPr/>
-                    <a:lstStyle/>
-                    <a:p>
-                      <a:r>
-                        <a:rPr lang="en-US" sz="1100" dirty="0"/>
-                        <a:t>April</a:t>
-                      </a:r>
-                    </a:p>
-                  </a:txBody>
-                  <a:tcPr/>
-                </a:tc>
-                <a:tc>
-                  <a:txBody>
-                    <a:bodyPr/>
-                    <a:lstStyle/>
-                    <a:p>
-                      <a:r>
-                        <a:rPr lang="en-US" sz="1100" dirty="0"/>
-                        <a:t>6</a:t>
-                      </a:r>
-                    </a:p>
-                  </a:txBody>
-                  <a:tcPr/>
-                </a:tc>
-                <a:extLst>
-                  <a:ext uri="{0D108BD9-81ED-4DB2-BD59-A6C34878D82A}">
-                    <a16:rowId xmlns:a16="http://schemas.microsoft.com/office/drawing/2014/main" val="1325288423"/>
-                  </a:ext>
-                </a:extLst>
-              </a:tr>
-            </a:tbl>
-          </a:graphicData>
-        </a:graphic>
-      </p:graphicFrame>
-    </p:spTree>
-    <p:extLst>
-      <p:ext uri="{BB962C8B-B14F-4D97-AF65-F5344CB8AC3E}">
-        <p14:creationId xmlns:p14="http://schemas.microsoft.com/office/powerpoint/2010/main" val="1648729207"/>
-      </p:ext>
-    </p:extLst>
-  </p:cSld>
-  <p:clrMapOvr>
-    <a:masterClrMapping/>
-  </p:clrMapOvr>
-  <p:timing>
-    <p:tnLst>
-      <p:par>
-        <p:cTn id="1" dur="indefinite" restart="never" nodeType="tmRoot">
-          <p:childTnLst>
-            <p:seq concurrent="1" nextAc="seek">
-              <p:cTn id="2" dur="indefinite" nodeType="mainSeq">
-                <p:childTnLst>
-                  <p:par>
-                    <p:cTn id="3" fill="hold">
-                      <p:stCondLst>
-                        <p:cond delay="indefinite"/>
-                      </p:stCondLst>
-                      <p:childTnLst>
-                        <p:par>
-                          <p:cTn id="4" fill="hold">
-                            <p:stCondLst>
-                              <p:cond delay="0"/>
-                            </p:stCondLst>
-                            <p:childTnLst>
-                              <p:par>
-                                <p:cTn id="5" presetID="10" presetClass="entr" presetSubtype="0" fill="hold" nodeType="clickEffect">
-                                  <p:stCondLst>
-                                    <p:cond delay="0"/>
-                                  </p:stCondLst>
-                                  <p:childTnLst>
-                                    <p:set>
-                                      <p:cBhvr>
-                                        <p:cTn id="6" dur="1" fill="hold">
-                                          <p:stCondLst>
-                                            <p:cond delay="0"/>
-                                          </p:stCondLst>
-                                        </p:cTn>
-                                        <p:tgtEl>
-                                          <p:spTgt spid="4"/>
-                                        </p:tgtEl>
-                                        <p:attrNameLst>
-                                          <p:attrName>style.visibility</p:attrName>
-                                        </p:attrNameLst>
-                                      </p:cBhvr>
-                                      <p:to>
-                                        <p:strVal val="visible"/>
-                                      </p:to>
-                                    </p:set>
-                                    <p:animEffect transition="in" filter="fade">
-                                      <p:cBhvr>
-                                        <p:cTn id="7" dur="500"/>
-                                        <p:tgtEl>
-                                          <p:spTgt spid="4"/>
-                                        </p:tgtEl>
-                                      </p:cBhvr>
-                                    </p:animEffect>
-                                  </p:childTnLst>
-                                </p:cTn>
-                              </p:par>
-                              <p:par>
-                                <p:cTn id="8" presetID="10" presetClass="entr" presetSubtype="0" fill="hold" nodeType="withEffect">
-                                  <p:stCondLst>
-                                    <p:cond delay="0"/>
-                                  </p:stCondLst>
-                                  <p:childTnLst>
-                                    <p:set>
-                                      <p:cBhvr>
-                                        <p:cTn id="9" dur="1" fill="hold">
-                                          <p:stCondLst>
-                                            <p:cond delay="0"/>
-                                          </p:stCondLst>
-                                        </p:cTn>
-                                        <p:tgtEl>
-                                          <p:spTgt spid="9"/>
-                                        </p:tgtEl>
-                                        <p:attrNameLst>
-                                          <p:attrName>style.visibility</p:attrName>
-                                        </p:attrNameLst>
-                                      </p:cBhvr>
-                                      <p:to>
-                                        <p:strVal val="visible"/>
-                                      </p:to>
-                                    </p:set>
-                                    <p:animEffect transition="in" filter="fade">
-                                      <p:cBhvr>
-                                        <p:cTn id="10" dur="500"/>
-                                        <p:tgtEl>
-                                          <p:spTgt spid="9"/>
-                                        </p:tgtEl>
-                                      </p:cBhvr>
-                                    </p:animEffect>
-                                  </p:childTnLst>
-                                </p:cTn>
-                              </p:par>
-                            </p:childTnLst>
-                          </p:cTn>
-                        </p:par>
-                      </p:childTnLst>
-                    </p:cTn>
-                  </p:par>
-                </p:childTnLst>
-              </p:cTn>
-              <p:prevCondLst>
-                <p:cond evt="onPrev" delay="0">
-                  <p:tgtEl>
-                    <p:sldTgt/>
-                  </p:tgtEl>
-                </p:cond>
-              </p:prevCondLst>
-              <p:nextCondLst>
-                <p:cond evt="onNext" delay="0">
-                  <p:tgtEl>
-                    <p:sldTgt/>
-                  </p:tgtEl>
-                </p:cond>
-              </p:nextCondLst>
-            </p:seq>
-          </p:childTnLst>
-        </p:cTn>
-      </p:par>
-    </p:tnLst>
-  </p:timing>
-</p:sld>
-</file>
-
-<file path=ppt/slides/slide9.xml><?xml version="1.0" encoding="utf-8"?>
-<p:sld xmlns:a="http://schemas.openxmlformats.org/drawingml/2006/main" xmlns:r="http://schemas.openxmlformats.org/officeDocument/2006/relationships" xmlns:p="http://schemas.openxmlformats.org/presentationml/2006/main">
-  <p:cSld>
-    <p:spTree>
-      <p:nvGrpSpPr>
-        <p:cNvPr id="1" name=""/>
-        <p:cNvGrpSpPr/>
-        <p:nvPr/>
-      </p:nvGrpSpPr>
-      <p:grpSpPr>
-        <a:xfrm>
-          <a:off x="0" y="0"/>
-          <a:ext cx="0" cy="0"/>
-          <a:chOff x="0" y="0"/>
-          <a:chExt cx="0" cy="0"/>
-        </a:xfrm>
-      </p:grpSpPr>
-      <p:sp>
-        <p:nvSpPr>
-          <p:cNvPr id="3" name="Content Placeholder 2">
-            <a:extLst>
-              <a:ext uri="{FF2B5EF4-FFF2-40B4-BE49-F238E27FC236}">
-                <a16:creationId xmlns:a16="http://schemas.microsoft.com/office/drawing/2014/main" id="{C002E309-B90F-6599-7FA2-AC787F181720}"/>
-              </a:ext>
-            </a:extLst>
-          </p:cNvPr>
-          <p:cNvSpPr>
-            <a:spLocks noGrp="1"/>
-          </p:cNvSpPr>
-          <p:nvPr>
-            <p:ph idx="1"/>
-          </p:nvPr>
-        </p:nvSpPr>
-        <p:spPr/>
-        <p:txBody>
-          <a:bodyPr/>
-          <a:lstStyle/>
-          <a:p>
-            <a:pPr algn="ctr"/>
-            <a:r>
-              <a:rPr lang="en-US" b="1" dirty="0"/>
-              <a:t>Volume increased significantly from Week 12</a:t>
-            </a:r>
-            <a:r>
-              <a:rPr lang="en-US" dirty="0"/>
-              <a:t>, right after WHO’s pandemic declaration and nationwide lockdown.</a:t>
-            </a:r>
-          </a:p>
-          <a:p>
-            <a:pPr algn="ctr"/>
-            <a:br>
-              <a:rPr lang="en-US" dirty="0"/>
-            </a:br>
-            <a:r>
-              <a:rPr lang="en-US" sz="2400" b="1" dirty="0"/>
-              <a:t>→ </a:t>
-            </a:r>
-            <a:r>
-              <a:rPr lang="en-US" sz="2400" b="1" i="1" dirty="0"/>
-              <a:t>This marks the turning point toward e-commerce reliance.</a:t>
-            </a:r>
-            <a:endParaRPr lang="en-US" b="1" dirty="0"/>
-          </a:p>
-        </p:txBody>
-      </p:sp>
-      <p:sp>
-        <p:nvSpPr>
-          <p:cNvPr id="4" name="Title 1">
-            <a:extLst>
-              <a:ext uri="{FF2B5EF4-FFF2-40B4-BE49-F238E27FC236}">
-                <a16:creationId xmlns:a16="http://schemas.microsoft.com/office/drawing/2014/main" id="{CA39C557-C068-99AB-E8F1-5D505FC91FB1}"/>
-              </a:ext>
-            </a:extLst>
-          </p:cNvPr>
-          <p:cNvSpPr>
-            <a:spLocks noGrp="1"/>
-          </p:cNvSpPr>
-          <p:nvPr>
-            <p:ph type="title"/>
-          </p:nvPr>
-        </p:nvSpPr>
-        <p:spPr>
-          <a:xfrm>
-            <a:off x="609600" y="439226"/>
-            <a:ext cx="10972800" cy="907905"/>
-          </a:xfrm>
-        </p:spPr>
-        <p:txBody>
-          <a:bodyPr>
-            <a:normAutofit/>
-          </a:bodyPr>
-          <a:lstStyle/>
-          <a:p>
-            <a:r>
-              <a:rPr lang="en-US" dirty="0"/>
-              <a:t>COVID Timeline vs Volume Spike</a:t>
-            </a:r>
-          </a:p>
-        </p:txBody>
-      </p:sp>
-    </p:spTree>
-    <p:extLst>
-      <p:ext uri="{BB962C8B-B14F-4D97-AF65-F5344CB8AC3E}">
-        <p14:creationId xmlns:p14="http://schemas.microsoft.com/office/powerpoint/2010/main" val="3873075680"/>
-      </p:ext>
-    </p:extLst>
-  </p:cSld>
-  <p:clrMapOvr>
-    <a:masterClrMapping/>
-  </p:clrMapOvr>
-  <p:timing>
-    <p:tnLst>
-      <p:par>
-        <p:cTn id="1" dur="indefinite" restart="never" nodeType="tmRoot">
-          <p:childTnLst>
-            <p:seq concurrent="1" nextAc="seek">
-              <p:cTn id="2" dur="indefinite" nodeType="mainSeq">
-                <p:childTnLst>
-                  <p:par>
-                    <p:cTn id="3" fill="hold">
-                      <p:stCondLst>
-                        <p:cond delay="indefinite"/>
-                      </p:stCondLst>
-                      <p:childTnLst>
-                        <p:par>
-                          <p:cTn id="4" fill="hold">
-                            <p:stCondLst>
-                              <p:cond delay="0"/>
-                            </p:stCondLst>
-                            <p:childTnLst>
-                              <p:par>
-                                <p:cTn id="5" presetID="16" presetClass="entr" presetSubtype="21" fill="hold" nodeType="clickEffect">
-                                  <p:stCondLst>
-                                    <p:cond delay="0"/>
-                                  </p:stCondLst>
-                                  <p:childTnLst>
-                                    <p:set>
-                                      <p:cBhvr>
-                                        <p:cTn id="6" dur="1" fill="hold">
-                                          <p:stCondLst>
-                                            <p:cond delay="0"/>
-                                          </p:stCondLst>
-                                        </p:cTn>
-                                        <p:tgtEl>
-                                          <p:spTgt spid="3">
-                                            <p:txEl>
-                                              <p:pRg st="0" end="0"/>
-                                            </p:txEl>
-                                          </p:spTgt>
-                                        </p:tgtEl>
-                                        <p:attrNameLst>
-                                          <p:attrName>style.visibility</p:attrName>
-                                        </p:attrNameLst>
-                                      </p:cBhvr>
-                                      <p:to>
-                                        <p:strVal val="visible"/>
-                                      </p:to>
-                                    </p:set>
-                                    <p:animEffect transition="in" filter="barn(inVertical)">
-                                      <p:cBhvr>
-                                        <p:cTn id="7" dur="500"/>
-                                        <p:tgtEl>
-                                          <p:spTgt spid="3">
-                                            <p:txEl>
-                                              <p:pRg st="0" end="0"/>
-                                            </p:txEl>
-                                          </p:spTgt>
-                                        </p:tgtEl>
-                                      </p:cBhvr>
-                                    </p:animEffect>
-                                  </p:childTnLst>
-                                </p:cTn>
-                              </p:par>
-                              <p:par>
-                                <p:cTn id="8" presetID="16" presetClass="entr" presetSubtype="21" fill="hold" nodeType="withEffect">
-                                  <p:stCondLst>
-                                    <p:cond delay="0"/>
-                                  </p:stCondLst>
-                                  <p:childTnLst>
-                                    <p:set>
-                                      <p:cBhvr>
-                                        <p:cTn id="9" dur="1" fill="hold">
-                                          <p:stCondLst>
-                                            <p:cond delay="0"/>
-                                          </p:stCondLst>
-                                        </p:cTn>
-                                        <p:tgtEl>
-                                          <p:spTgt spid="3">
-                                            <p:txEl>
-                                              <p:pRg st="1" end="1"/>
-                                            </p:txEl>
-                                          </p:spTgt>
-                                        </p:tgtEl>
-                                        <p:attrNameLst>
-                                          <p:attrName>style.visibility</p:attrName>
-                                        </p:attrNameLst>
-                                      </p:cBhvr>
-                                      <p:to>
-                                        <p:strVal val="visible"/>
-                                      </p:to>
-                                    </p:set>
-                                    <p:animEffect transition="in" filter="barn(inVertical)">
-                                      <p:cBhvr>
-                                        <p:cTn id="10" dur="500"/>
-                                        <p:tgtEl>
-                                          <p:spTgt spid="3">
-                                            <p:txEl>
-                                              <p:pRg st="1" end="1"/>
-                                            </p:txEl>
-                                          </p:spTgt>
-                                        </p:tgtEl>
-                                      </p:cBhvr>
-                                    </p:animEffect>
-                                  </p:childTnLst>
-                                </p:cTn>
-                              </p:par>
-                            </p:childTnLst>
-                          </p:cTn>
-                        </p:par>
-                      </p:childTnLst>
-                    </p:cTn>
-                  </p:par>
-                </p:childTnLst>
-              </p:cTn>
-              <p:prevCondLst>
-                <p:cond evt="onPrev" delay="0">
-                  <p:tgtEl>
-                    <p:sldTgt/>
-                  </p:tgtEl>
-                </p:cond>
-              </p:prevCondLst>
-              <p:nextCondLst>
-                <p:cond evt="onNext" delay="0">
-                  <p:tgtEl>
-                    <p:sldTgt/>
-                  </p:tgtEl>
-                </p:cond>
-              </p:nextCondLst>
-            </p:seq>
-          </p:childTnLst>
-        </p:cTn>
-      </p:par>
-    </p:tnLst>
   </p:timing>
 </p:sld>
 </file>

</xml_diff>